<commit_message>
NavMesh Agent Obstacle Tutorial Renewal
- Apply and set occlusion culling

- Each PPT data update

- Delete and add resource data
</commit_message>
<xml_diff>
--- a/Assets/Class/Animation Retargeting/PPT Data/Animation Retargeting Example.pptx
+++ b/Assets/Class/Animation Retargeting/PPT Data/Animation Retargeting Example.pptx
@@ -2,29 +2,28 @@
 <file path=ppt/presentation.xml><?xml version="1.0" encoding="utf-8"?>
 <p:presentation xmlns:a="http://schemas.openxmlformats.org/drawingml/2006/main" xmlns:r="http://schemas.openxmlformats.org/officeDocument/2006/relationships" xmlns:p="http://schemas.openxmlformats.org/presentationml/2006/main" xmlns:p14="http://schemas.microsoft.com/office/powerpoint/2010/main" saveSubsetFonts="1" firstSlideNum="0">
   <p:sldMasterIdLst>
-    <p:sldMasterId id="2147486921" r:id="rId12"/>
+    <p:sldMasterId id="2147486940" r:id="rId12"/>
   </p:sldMasterIdLst>
   <p:notesMasterIdLst>
     <p:notesMasterId r:id="rId14"/>
   </p:notesMasterIdLst>
   <p:sldIdLst>
     <p:sldId id="315" r:id="rId16"/>
-    <p:sldId id="319" r:id="rId17"/>
-    <p:sldId id="320" r:id="rId18"/>
-    <p:sldId id="334" r:id="rId19"/>
-    <p:sldId id="321" r:id="rId20"/>
-    <p:sldId id="333" r:id="rId21"/>
-    <p:sldId id="335" r:id="rId22"/>
-    <p:sldId id="336" r:id="rId23"/>
-    <p:sldId id="337" r:id="rId24"/>
-    <p:sldId id="338" r:id="rId25"/>
-    <p:sldId id="339" r:id="rId26"/>
-    <p:sldId id="340" r:id="rId27"/>
-    <p:sldId id="341" r:id="rId28"/>
-    <p:sldId id="342" r:id="rId29"/>
-    <p:sldId id="343" r:id="rId31"/>
-    <p:sldId id="344" r:id="rId32"/>
-    <p:sldId id="345" r:id="rId34"/>
+    <p:sldId id="319" r:id="rId18"/>
+    <p:sldId id="320" r:id="rId20"/>
+    <p:sldId id="334" r:id="rId22"/>
+    <p:sldId id="321" r:id="rId23"/>
+    <p:sldId id="333" r:id="rId25"/>
+    <p:sldId id="335" r:id="rId26"/>
+    <p:sldId id="336" r:id="rId28"/>
+    <p:sldId id="337" r:id="rId30"/>
+    <p:sldId id="338" r:id="rId32"/>
+    <p:sldId id="339" r:id="rId34"/>
+    <p:sldId id="340" r:id="rId36"/>
+    <p:sldId id="341" r:id="rId37"/>
+    <p:sldId id="342" r:id="rId38"/>
+    <p:sldId id="346" r:id="rId39"/>
+    <p:sldId id="345" r:id="rId40"/>
   </p:sldIdLst>
   <p:sldSz cx="12192000" cy="6858000"/>
   <p:notesSz cx="6858000" cy="9144000"/>
@@ -1507,148 +1506,6 @@
         <p:spPr>
           <a:xfrm rot="0">
             <a:off x="685800" y="1143000"/>
-            <a:ext cx="5496560" cy="3096260"/>
-          </a:xfrm>
-          <a:prstGeom prst="rect"/>
-          <a:noFill/>
-          <a:ln w="12700" cap="flat" cmpd="sng">
-            <a:solidFill>
-              <a:srgbClr val="000000">
-                <a:alpha val="100000"/>
-              </a:srgbClr>
-            </a:solidFill>
-            <a:prstDash val="solid"/>
-          </a:ln>
-        </p:spPr>
-        <p:txBody>
-          <a:bodyPr wrap="square" lIns="91440" tIns="45720" rIns="91440" bIns="45720" numCol="1" vert="horz" anchor="ctr">
-            <a:noAutofit/>
-          </a:bodyPr>
-          <a:lstStyle/>
-          <a:p>
-            <a:pPr marL="0" indent="0" latinLnBrk="0">
-              <a:buFontTx/>
-              <a:buNone/>
-            </a:pPr>
-          </a:p>
-        </p:txBody>
-      </p:sp>
-      <p:sp>
-        <p:nvSpPr>
-          <p:cNvPr id="3" name="슬라이드 노트 개체 틀 4"/>
-          <p:cNvSpPr txBox="1">
-            <a:spLocks/>
-          </p:cNvSpPr>
-          <p:nvPr>
-            <p:ph type="body" idx="3"/>
-          </p:nvPr>
-        </p:nvSpPr>
-        <p:spPr>
-          <a:xfrm rot="0">
-            <a:off x="685800" y="4400550"/>
-            <a:ext cx="5496560" cy="3610610"/>
-          </a:xfrm>
-          <a:prstGeom prst="rect"/>
-        </p:spPr>
-        <p:txBody>
-          <a:bodyPr wrap="square" lIns="91440" tIns="45720" rIns="91440" bIns="45720" numCol="1" vert="horz" anchor="t">
-            <a:noAutofit/>
-          </a:bodyPr>
-          <a:lstStyle/>
-          <a:p>
-            <a:pPr marL="0" indent="0" latinLnBrk="0">
-              <a:buFontTx/>
-              <a:buNone/>
-            </a:pPr>
-          </a:p>
-        </p:txBody>
-      </p:sp>
-      <p:sp>
-        <p:nvSpPr>
-          <p:cNvPr id="4" name="슬라이드 번호 개체 틀 6"/>
-          <p:cNvSpPr txBox="1">
-            <a:spLocks/>
-          </p:cNvSpPr>
-          <p:nvPr>
-            <p:ph type="sldNum" idx="5"/>
-          </p:nvPr>
-        </p:nvSpPr>
-        <p:spPr>
-          <a:xfrm rot="0">
-            <a:off x="3884930" y="8685530"/>
-            <a:ext cx="2981960" cy="468630"/>
-          </a:xfrm>
-          <a:prstGeom prst="rect"/>
-        </p:spPr>
-        <p:txBody>
-          <a:bodyPr wrap="square" lIns="91440" tIns="45720" rIns="91440" bIns="45720" numCol="1" vert="horz" anchor="b">
-            <a:noAutofit/>
-          </a:bodyPr>
-          <a:lstStyle>
-            <a:lvl1pPr marL="0" indent="0" algn="r" latinLnBrk="0">
-              <a:buFontTx/>
-              <a:buNone/>
-              <a:defRPr lang="en-GB" altLang="en-US" sz="1200"/>
-            </a:lvl1pPr>
-          </a:lstStyle>
-          <a:p>
-            <a:pPr marL="0" indent="0" latinLnBrk="0">
-              <a:buFontTx/>
-              <a:buNone/>
-            </a:pPr>
-            <a:fld id="{B9320F77-B9A0-41C5-862A-B4B631284C64}" type="slidenum">
-              <a:rPr lang="ko-KR" altLang="en-US"/>
-              <a:t>‹#›</a:t>
-            </a:fld>
-          </a:p>
-        </p:txBody>
-      </p:sp>
-    </p:spTree>
-  </p:cSld>
-  <p:clrMapOvr>
-    <a:masterClrMapping/>
-  </p:clrMapOvr>
-  <mc:AlternateContent xmlns:mc="http://schemas.openxmlformats.org/markup-compatibility/2006">
-    <mc:Choice xmlns:p14="http://schemas.microsoft.com/office/powerpoint/2010/main" Requires="p14">
-      <p:transition spd="slow" p14:dur="0"/>
-    </mc:Choice>
-    <mc:Fallback>
-      <p:transition spd="slow"/>
-    </mc:Fallback>
-  </mc:AlternateContent>
-</p:notes>
-</file>
-
-<file path=ppt/notesSlides/notesSlide17.xml><?xml version="1.0" encoding="utf-8"?>
-<p:notes xmlns:a="http://schemas.openxmlformats.org/drawingml/2006/main" xmlns:r="http://schemas.openxmlformats.org/officeDocument/2006/relationships" xmlns:p="http://schemas.openxmlformats.org/presentationml/2006/main">
-  <p:cSld>
-    <p:spTree>
-      <p:nvGrpSpPr>
-        <p:cNvPr id="1" name=""/>
-        <p:cNvGrpSpPr/>
-        <p:nvPr/>
-      </p:nvGrpSpPr>
-      <p:grpSpPr>
-        <a:xfrm>
-          <a:off x="0" y="0"/>
-          <a:ext cx="0" cy="0"/>
-          <a:chOff x="0" y="0"/>
-          <a:chExt cx="0" cy="0"/>
-        </a:xfrm>
-      </p:grpSpPr>
-      <p:sp>
-        <p:nvSpPr>
-          <p:cNvPr id="2" name="슬라이드 이미지 개체 틀 3"/>
-          <p:cNvSpPr>
-            <a:spLocks noChangeAspect="1"/>
-          </p:cNvSpPr>
-          <p:nvPr>
-            <p:ph type="sldImg" idx="2"/>
-          </p:nvPr>
-        </p:nvSpPr>
-        <p:spPr>
-          <a:xfrm rot="0">
-            <a:off x="685800" y="1143000"/>
             <a:ext cx="5497195" cy="3096895"/>
           </a:xfrm>
           <a:prstGeom prst="rect"/>
@@ -9054,8 +8911,8 @@
         </p:nvSpPr>
         <p:spPr>
           <a:xfrm rot="0">
-            <a:off x="1238250" y="4184650"/>
-            <a:ext cx="4143375" cy="2031365"/>
+            <a:off x="1238250" y="5304155"/>
+            <a:ext cx="4144010" cy="923925"/>
           </a:xfrm>
           <a:prstGeom prst="rect"/>
           <a:noFill/>
@@ -9082,17 +8939,7 @@
                 <a:latin typeface="맑은 고딕" charset="0"/>
                 <a:ea typeface="맑은 고딕" charset="0"/>
               </a:rPr>
-              <a:t>29</a:t>
-            </a:r>
-            <a:r>
-              <a:rPr sz="1800" b="1">
-                <a:solidFill>
-                  <a:srgbClr val="0611F2"/>
-                </a:solidFill>
-                <a:latin typeface="맑은 고딕" charset="0"/>
-                <a:ea typeface="맑은 고딕" charset="0"/>
-              </a:rPr>
-              <a:t>.</a:t>
+              <a:t>29.</a:t>
             </a:r>
             <a:r>
               <a:rPr sz="1800">
@@ -9106,53 +8953,201 @@
                 <a:latin typeface="맑은 고딕" charset="0"/>
                 <a:ea typeface="맑은 고딕" charset="0"/>
               </a:rPr>
-              <a:t>런 다음</a:t>
+              <a:t>다음</a:t>
             </a:r>
             <a:r>
               <a:rPr sz="1800">
                 <a:latin typeface="맑은 고딕" charset="0"/>
                 <a:ea typeface="맑은 고딕" charset="0"/>
               </a:rPr>
-              <a:t> 빈 게임 오브젝트를 생성하</a:t>
-            </a:r>
-            <a:r>
-              <a:rPr lang="ko-KR" sz="1800">
-                <a:latin typeface="맑은 고딕" charset="0"/>
-                <a:ea typeface="맑은 고딕" charset="0"/>
-              </a:rPr>
-              <a:t>고</a:t>
+              <a:t> UI에서 Button </a:t>
             </a:r>
             <a:r>
               <a:rPr sz="1800">
                 <a:latin typeface="맑은 고딕" charset="0"/>
                 <a:ea typeface="맑은 고딕" charset="0"/>
               </a:rPr>
+              <a:t>오브젝트</a:t>
+            </a:r>
+            <a:r>
+              <a:rPr lang="ko-KR" sz="1800">
+                <a:latin typeface="맑은 고딕" charset="0"/>
+                <a:ea typeface="맑은 고딕" charset="0"/>
+              </a:rPr>
+              <a:t>를</a:t>
+            </a:r>
+            <a:r>
+              <a:rPr sz="1800">
+                <a:latin typeface="맑은 고딕" charset="0"/>
+                <a:ea typeface="맑은 고딕" charset="0"/>
+              </a:rPr>
               <a:t> </a:t>
             </a:r>
             <a:r>
-              <a:rPr lang="ko-KR" sz="1800">
-                <a:latin typeface="맑은 고딕" charset="0"/>
-                <a:ea typeface="맑은 고딕" charset="0"/>
-              </a:rPr>
-              <a:t>Data System이라는</a:t>
-            </a:r>
-            <a:r>
               <a:rPr sz="1800">
                 <a:latin typeface="맑은 고딕" charset="0"/>
                 <a:ea typeface="맑은 고딕" charset="0"/>
               </a:rPr>
-              <a:t> 이름을 정의합니다.</a:t>
+              <a:t>생성하고</a:t>
+            </a:r>
+            <a:r>
+              <a:rPr sz="1800">
+                <a:latin typeface="맑은 고딕" charset="0"/>
+                <a:ea typeface="맑은 고딕" charset="0"/>
+              </a:rPr>
+              <a:t> Animation </a:t>
+            </a:r>
+            <a:r>
+              <a:rPr sz="1800">
+                <a:latin typeface="맑은 고딕" charset="0"/>
+                <a:ea typeface="맑은 고딕" charset="0"/>
+              </a:rPr>
+              <a:t>Speed</a:t>
+            </a:r>
+            <a:r>
+              <a:rPr sz="1800">
+                <a:latin typeface="맑은 고딕" charset="0"/>
+                <a:ea typeface="맑은 고딕" charset="0"/>
+              </a:rPr>
+              <a:t> </a:t>
+            </a:r>
+            <a:r>
+              <a:rPr sz="1800">
+                <a:latin typeface="맑은 고딕" charset="0"/>
+                <a:ea typeface="맑은 고딕" charset="0"/>
+              </a:rPr>
+              <a:t>Button이라는</a:t>
+            </a:r>
+            <a:r>
+              <a:rPr sz="1800">
+                <a:latin typeface="맑은 고딕" charset="0"/>
+                <a:ea typeface="맑은 고딕" charset="0"/>
+              </a:rPr>
+              <a:t> 이름으로 정의합니</a:t>
+            </a:r>
+            <a:r>
+              <a:rPr sz="1800">
+                <a:latin typeface="맑은 고딕" charset="0"/>
+                <a:ea typeface="맑은 고딕" charset="0"/>
+              </a:rPr>
+              <a:t>다.</a:t>
             </a:r>
             <a:endParaRPr lang="ko-KR" altLang="en-US" sz="1800">
               <a:latin typeface="맑은 고딕" charset="0"/>
               <a:ea typeface="맑은 고딕" charset="0"/>
             </a:endParaRPr>
           </a:p>
-          <a:p>
-            <a:pPr marL="0" indent="0" rtl="0" algn="l" defTabSz="914400" eaLnBrk="1" latinLnBrk="0" hangingPunct="1">
-              <a:buFontTx/>
-              <a:buNone/>
-            </a:pPr>
+        </p:txBody>
+      </p:sp>
+      <p:sp>
+        <p:nvSpPr>
+          <p:cNvPr id="89" name="Rect 0"/>
+          <p:cNvSpPr txBox="1">
+            <a:spLocks/>
+          </p:cNvSpPr>
+          <p:nvPr/>
+        </p:nvSpPr>
+        <p:spPr>
+          <a:xfrm rot="0">
+            <a:off x="6804660" y="5306060"/>
+            <a:ext cx="4152265" cy="922020"/>
+          </a:xfrm>
+          <a:prstGeom prst="rect"/>
+          <a:noFill/>
+        </p:spPr>
+        <p:txBody>
+          <a:bodyPr wrap="square" lIns="0" tIns="0" rIns="0" bIns="0" numCol="1" vert="horz" anchor="t">
+            <a:noAutofit/>
+          </a:bodyPr>
+          <a:lstStyle/>
+          <a:p>
+            <a:pPr marL="0" indent="0" algn="l" latinLnBrk="0" hangingPunct="1">
+              <a:buFontTx/>
+              <a:buNone/>
+            </a:pPr>
+            <a:r>
+              <a:rPr lang="ko-KR" sz="2000" b="1">
+                <a:solidFill>
+                  <a:srgbClr val="0611F2"/>
+                </a:solidFill>
+                <a:latin typeface="맑은 고딕" charset="0"/>
+                <a:ea typeface="맑은 고딕" charset="0"/>
+              </a:rPr>
+              <a:t>30.</a:t>
+            </a:r>
+            <a:r>
+              <a:rPr lang="ko-KR" sz="2000">
+                <a:solidFill>
+                  <a:srgbClr val="0611F2"/>
+                </a:solidFill>
+                <a:latin typeface="맑은 고딕" charset="0"/>
+                <a:ea typeface="맑은 고딕" charset="0"/>
+              </a:rPr>
+              <a:t> </a:t>
+            </a:r>
+            <a:r>
+              <a:rPr sz="1800">
+                <a:latin typeface="맑은 고딕" charset="0"/>
+                <a:ea typeface="맑은 고딕" charset="0"/>
+              </a:rPr>
+              <a:t>그런 다음 UI에서 Button </a:t>
+            </a:r>
+            <a:r>
+              <a:rPr sz="1800">
+                <a:latin typeface="맑은 고딕" charset="0"/>
+                <a:ea typeface="맑은 고딕" charset="0"/>
+              </a:rPr>
+              <a:t>오브젝트</a:t>
+            </a:r>
+            <a:r>
+              <a:rPr lang="ko-KR" sz="1800">
+                <a:latin typeface="맑은 고딕" charset="0"/>
+                <a:ea typeface="맑은 고딕" charset="0"/>
+              </a:rPr>
+              <a:t>를</a:t>
+            </a:r>
+            <a:r>
+              <a:rPr sz="1800">
+                <a:latin typeface="맑은 고딕" charset="0"/>
+                <a:ea typeface="맑은 고딕" charset="0"/>
+              </a:rPr>
+              <a:t> </a:t>
+            </a:r>
+            <a:r>
+              <a:rPr sz="1800">
+                <a:latin typeface="맑은 고딕" charset="0"/>
+                <a:ea typeface="맑은 고딕" charset="0"/>
+              </a:rPr>
+              <a:t>생성하고</a:t>
+            </a:r>
+            <a:r>
+              <a:rPr sz="1800">
+                <a:latin typeface="맑은 고딕" charset="0"/>
+                <a:ea typeface="맑은 고딕" charset="0"/>
+              </a:rPr>
+              <a:t> Character Culling </a:t>
+            </a:r>
+            <a:r>
+              <a:rPr sz="1800">
+                <a:latin typeface="맑은 고딕" charset="0"/>
+                <a:ea typeface="맑은 고딕" charset="0"/>
+              </a:rPr>
+              <a:t>Button이라는</a:t>
+            </a:r>
+            <a:r>
+              <a:rPr sz="1800">
+                <a:latin typeface="맑은 고딕" charset="0"/>
+                <a:ea typeface="맑은 고딕" charset="0"/>
+              </a:rPr>
+              <a:t> 이름으로 정의합니</a:t>
+            </a:r>
+            <a:r>
+              <a:rPr sz="1800">
+                <a:latin typeface="맑은 고딕" charset="0"/>
+                <a:ea typeface="맑은 고딕" charset="0"/>
+              </a:rPr>
+              <a:t>다.</a:t>
+            </a:r>
             <a:endParaRPr lang="ko-KR" altLang="en-US" sz="1800">
               <a:latin typeface="맑은 고딕" charset="0"/>
               <a:ea typeface="맑은 고딕" charset="0"/>
@@ -9163,76 +9158,6 @@
               <a:buFontTx/>
               <a:buNone/>
             </a:pPr>
-            <a:r>
-              <a:rPr sz="1800">
-                <a:latin typeface="맑은 고딕" charset="0"/>
-                <a:ea typeface="맑은 고딕" charset="0"/>
-              </a:rPr>
-              <a:t>그</a:t>
-            </a:r>
-            <a:r>
-              <a:rPr sz="1800">
-                <a:latin typeface="맑은 고딕" charset="0"/>
-                <a:ea typeface="맑은 고딕" charset="0"/>
-              </a:rPr>
-              <a:t>러</a:t>
-            </a:r>
-            <a:r>
-              <a:rPr lang="ko-KR" sz="1800">
-                <a:latin typeface="맑은 고딕" charset="0"/>
-                <a:ea typeface="맑은 고딕" charset="0"/>
-              </a:rPr>
-              <a:t>고 나서</a:t>
-            </a:r>
-            <a:r>
-              <a:rPr sz="1800">
-                <a:latin typeface="맑은 고딕" charset="0"/>
-                <a:ea typeface="맑은 고딕" charset="0"/>
-              </a:rPr>
-              <a:t> </a:t>
-            </a:r>
-            <a:r>
-              <a:rPr lang="ko-KR" sz="1800">
-                <a:latin typeface="맑은 고딕" charset="0"/>
-                <a:ea typeface="맑은 고딕" charset="0"/>
-              </a:rPr>
-              <a:t>DataSystem</a:t>
-            </a:r>
-            <a:r>
-              <a:rPr sz="1800">
-                <a:latin typeface="맑은 고딕" charset="0"/>
-                <a:ea typeface="맑은 고딕" charset="0"/>
-              </a:rPr>
-              <a:t> 스크립트를 생성</a:t>
-            </a:r>
-            <a:r>
-              <a:rPr lang="ko-KR" sz="1800">
-                <a:latin typeface="맑은 고딕" charset="0"/>
-                <a:ea typeface="맑은 고딕" charset="0"/>
-              </a:rPr>
-              <a:t>한 다음</a:t>
-            </a:r>
-            <a:r>
-              <a:rPr sz="1800">
-                <a:latin typeface="맑은 고딕" charset="0"/>
-                <a:ea typeface="맑은 고딕" charset="0"/>
-              </a:rPr>
-              <a:t> </a:t>
-            </a:r>
-            <a:r>
-              <a:rPr lang="ko-KR" sz="1800">
-                <a:latin typeface="맑은 고딕" charset="0"/>
-                <a:ea typeface="맑은 고딕" charset="0"/>
-              </a:rPr>
-              <a:t>Data System</a:t>
-            </a:r>
-            <a:r>
-              <a:rPr sz="1800">
-                <a:latin typeface="맑은 고딕" charset="0"/>
-                <a:ea typeface="맑은 고딕" charset="0"/>
-              </a:rPr>
-              <a:t> 오브젝트에 넣어줍니다.</a:t>
-            </a:r>
             <a:endParaRPr lang="ko-KR" altLang="en-US" sz="1800">
               <a:latin typeface="맑은 고딕" charset="0"/>
               <a:ea typeface="맑은 고딕" charset="0"/>
@@ -9240,294 +9165,9 @@
           </a:p>
         </p:txBody>
       </p:sp>
-      <p:sp>
-        <p:nvSpPr>
-          <p:cNvPr id="89" name="Rect 0"/>
-          <p:cNvSpPr txBox="1">
-            <a:spLocks/>
-          </p:cNvSpPr>
-          <p:nvPr/>
-        </p:nvSpPr>
-        <p:spPr>
-          <a:xfrm rot="0">
-            <a:off x="6830060" y="4194810"/>
-            <a:ext cx="4124325" cy="2032000"/>
-          </a:xfrm>
-          <a:prstGeom prst="rect"/>
-          <a:noFill/>
-        </p:spPr>
-        <p:txBody>
-          <a:bodyPr wrap="square" lIns="0" tIns="0" rIns="0" bIns="0" numCol="1" vert="horz" anchor="t">
-            <a:noAutofit/>
-          </a:bodyPr>
-          <a:lstStyle/>
-          <a:p>
-            <a:pPr marL="0" indent="0" algn="l" latinLnBrk="0" hangingPunct="1">
-              <a:buFontTx/>
-              <a:buNone/>
-            </a:pPr>
-            <a:r>
-              <a:rPr lang="ko-KR" sz="2000" b="1">
-                <a:solidFill>
-                  <a:srgbClr val="0611F2"/>
-                </a:solidFill>
-                <a:latin typeface="맑은 고딕" charset="0"/>
-                <a:ea typeface="맑은 고딕" charset="0"/>
-              </a:rPr>
-              <a:t>30.</a:t>
-            </a:r>
-            <a:r>
-              <a:rPr lang="ko-KR" sz="2000">
-                <a:solidFill>
-                  <a:srgbClr val="0611F2"/>
-                </a:solidFill>
-                <a:latin typeface="맑은 고딕" charset="0"/>
-                <a:ea typeface="맑은 고딕" charset="0"/>
-              </a:rPr>
-              <a:t> </a:t>
-            </a:r>
-            <a:r>
-              <a:rPr sz="1800">
-                <a:latin typeface="맑은 고딕" charset="0"/>
-                <a:ea typeface="맑은 고딕" charset="0"/>
-              </a:rPr>
-              <a:t>그다음으</a:t>
-            </a:r>
-            <a:r>
-              <a:rPr lang="ko-KR" sz="1800">
-                <a:latin typeface="맑은 고딕" charset="0"/>
-                <a:ea typeface="맑은 고딕" charset="0"/>
-              </a:rPr>
-              <a:t>로</a:t>
-            </a:r>
-            <a:r>
-              <a:rPr sz="1800">
-                <a:latin typeface="맑은 고딕" charset="0"/>
-                <a:ea typeface="맑은 고딕" charset="0"/>
-              </a:rPr>
-              <a:t> UI에 Button 오브젝트</a:t>
-            </a:r>
-            <a:r>
-              <a:rPr lang="ko-KR" sz="1800">
-                <a:latin typeface="맑은 고딕" charset="0"/>
-                <a:ea typeface="맑은 고딕" charset="0"/>
-              </a:rPr>
-              <a:t>를</a:t>
-            </a:r>
-            <a:r>
-              <a:rPr sz="1800">
-                <a:latin typeface="맑은 고딕" charset="0"/>
-                <a:ea typeface="맑은 고딕" charset="0"/>
-              </a:rPr>
-              <a:t> 생성합니다.</a:t>
-            </a:r>
-            <a:endParaRPr lang="ko-KR" altLang="en-US" sz="1800">
-              <a:latin typeface="맑은 고딕" charset="0"/>
-              <a:ea typeface="맑은 고딕" charset="0"/>
-            </a:endParaRPr>
-          </a:p>
-          <a:p>
-            <a:pPr marL="0" indent="0" rtl="0" algn="l" defTabSz="914400" eaLnBrk="1" latinLnBrk="0" hangingPunct="1">
-              <a:buFontTx/>
-              <a:buNone/>
-            </a:pPr>
-            <a:endParaRPr lang="ko-KR" altLang="en-US" sz="1800">
-              <a:latin typeface="맑은 고딕" charset="0"/>
-              <a:ea typeface="맑은 고딕" charset="0"/>
-            </a:endParaRPr>
-          </a:p>
-          <a:p>
-            <a:pPr marL="0" indent="0" rtl="0" algn="l" defTabSz="914400" eaLnBrk="1" latinLnBrk="0" hangingPunct="1">
-              <a:buFontTx/>
-              <a:buNone/>
-            </a:pPr>
-            <a:r>
-              <a:rPr lang="ko-KR" sz="1800">
-                <a:latin typeface="맑은 고딕" charset="0"/>
-                <a:ea typeface="맑은 고딕" charset="0"/>
-              </a:rPr>
-              <a:t>마지막으로</a:t>
-            </a:r>
-            <a:r>
-              <a:rPr sz="1800">
-                <a:latin typeface="맑은 고딕" charset="0"/>
-                <a:ea typeface="맑은 고딕" charset="0"/>
-              </a:rPr>
-              <a:t> Animation Speed Button 이라</a:t>
-            </a:r>
-            <a:r>
-              <a:rPr lang="ko-KR" sz="1800">
-                <a:latin typeface="맑은 고딕" charset="0"/>
-                <a:ea typeface="맑은 고딕" charset="0"/>
-              </a:rPr>
-              <a:t>는</a:t>
-            </a:r>
-            <a:r>
-              <a:rPr sz="1800">
-                <a:latin typeface="맑은 고딕" charset="0"/>
-                <a:ea typeface="맑은 고딕" charset="0"/>
-              </a:rPr>
-              <a:t> 이름으</a:t>
-            </a:r>
-            <a:r>
-              <a:rPr lang="ko-KR" sz="1800">
-                <a:latin typeface="맑은 고딕" charset="0"/>
-                <a:ea typeface="맑은 고딕" charset="0"/>
-              </a:rPr>
-              <a:t>로</a:t>
-            </a:r>
-            <a:r>
-              <a:rPr sz="1800">
-                <a:latin typeface="맑은 고딕" charset="0"/>
-                <a:ea typeface="맑은 고딕" charset="0"/>
-              </a:rPr>
-              <a:t> 정의하</a:t>
-            </a:r>
-            <a:r>
-              <a:rPr lang="ko-KR" sz="1800">
-                <a:latin typeface="맑은 고딕" charset="0"/>
-                <a:ea typeface="맑은 고딕" charset="0"/>
-              </a:rPr>
-              <a:t>고 하위 오브젝트의 텍스트에 Animation Speed Text라는 이름으로 정의합니다.</a:t>
-            </a:r>
-            <a:endParaRPr lang="ko-KR" altLang="en-US" sz="1800">
-              <a:latin typeface="맑은 고딕" charset="0"/>
-              <a:ea typeface="맑은 고딕" charset="0"/>
-            </a:endParaRPr>
-          </a:p>
-        </p:txBody>
-      </p:sp>
       <p:pic>
         <p:nvPicPr>
-          <p:cNvPr id="91" name="그림 19" descr="C:/Users/Admin1/AppData/Roaming/PolarisOffice/ETemp/20852_9486176/fImage85062589358.png"/>
-          <p:cNvPicPr>
-            <a:picLocks noChangeAspect="1"/>
-          </p:cNvPicPr>
-          <p:nvPr/>
-        </p:nvPicPr>
-        <p:blipFill rotWithShape="1">
-          <a:blip r:embed="rId2" cstate="hqprint">
-            <a:extLst>
-              <a:ext uri="{28A0092B-C50C-407E-A947-70E740481C1C}">
-                <a14:useLocalDpi xmlns:a14="http://schemas.microsoft.com/office/drawing/2010/main"/>
-              </a:ext>
-            </a:extLst>
-          </a:blip>
-          <a:stretch>
-            <a:fillRect/>
-          </a:stretch>
-        </p:blipFill>
-        <p:spPr>
-          <a:xfrm rot="0">
-            <a:off x="1229995" y="1454785"/>
-            <a:ext cx="2525395" cy="2550795"/>
-          </a:xfrm>
-          <a:prstGeom prst="roundRect"/>
-          <a:solidFill>
-            <a:srgbClr val="EDEDED"/>
-          </a:solidFill>
-        </p:spPr>
-      </p:pic>
-      <p:pic>
-        <p:nvPicPr>
-          <p:cNvPr id="92" name="그림 20" descr="C:/Users/Admin1/AppData/Roaming/PolarisOffice/ETemp/20852_9486176/fImage76052596962.png"/>
-          <p:cNvPicPr>
-            <a:picLocks noChangeAspect="1"/>
-          </p:cNvPicPr>
-          <p:nvPr/>
-        </p:nvPicPr>
-        <p:blipFill rotWithShape="1">
-          <a:blip r:embed="rId3" cstate="hqprint">
-            <a:extLst>
-              <a:ext uri="{28A0092B-C50C-407E-A947-70E740481C1C}">
-                <a14:useLocalDpi xmlns:a14="http://schemas.microsoft.com/office/drawing/2010/main"/>
-              </a:ext>
-            </a:extLst>
-          </a:blip>
-          <a:stretch>
-            <a:fillRect/>
-          </a:stretch>
-        </p:blipFill>
-        <p:spPr>
-          <a:xfrm rot="0">
-            <a:off x="3970020" y="1454785"/>
-            <a:ext cx="1419225" cy="1374775"/>
-          </a:xfrm>
-          <a:prstGeom prst="roundRect"/>
-          <a:solidFill>
-            <a:srgbClr val="EDEDED"/>
-          </a:solidFill>
-        </p:spPr>
-      </p:pic>
-      <p:pic>
-        <p:nvPicPr>
-          <p:cNvPr id="93" name="그림 23" descr="C:/Users/Admin1/AppData/Roaming/PolarisOffice/ETemp/20852_9486176/fImage23102604464.png"/>
-          <p:cNvPicPr>
-            <a:picLocks noChangeAspect="1"/>
-          </p:cNvPicPr>
-          <p:nvPr/>
-        </p:nvPicPr>
-        <p:blipFill rotWithShape="1">
-          <a:blip r:embed="rId4" cstate="hqprint">
-            <a:extLst>
-              <a:ext uri="{28A0092B-C50C-407E-A947-70E740481C1C}">
-                <a14:useLocalDpi xmlns:a14="http://schemas.microsoft.com/office/drawing/2010/main"/>
-              </a:ext>
-            </a:extLst>
-          </a:blip>
-          <a:stretch>
-            <a:fillRect/>
-          </a:stretch>
-        </p:blipFill>
-        <p:spPr>
-          <a:xfrm rot="0">
-            <a:off x="4312285" y="3268980"/>
-            <a:ext cx="732155" cy="736600"/>
-          </a:xfrm>
-          <a:prstGeom prst="roundRect"/>
-          <a:solidFill>
-            <a:srgbClr val="EDEDED"/>
-          </a:solidFill>
-        </p:spPr>
-      </p:pic>
-      <p:cxnSp>
-        <p:nvCxnSpPr>
-          <p:cNvPr id="94" name="도형 26"/>
-          <p:cNvCxnSpPr>
-            <a:stCxn id="93" idx="0"/>
-            <a:endCxn id="92" idx="2"/>
-          </p:cNvCxnSpPr>
-          <p:nvPr/>
-        </p:nvCxnSpPr>
-        <p:spPr>
-          <a:xfrm rot="0" flipV="1">
-            <a:off x="4678045" y="2828925"/>
-            <a:ext cx="1905" cy="440690"/>
-          </a:xfrm>
-          <a:prstGeom prst="straightConnector1"/>
-          <a:ln w="6350" cap="flat" cmpd="sng">
-            <a:prstDash/>
-            <a:tailEnd type="triangle" w="med" len="med"/>
-          </a:ln>
-        </p:spPr>
-        <p:style>
-          <a:lnRef idx="1">
-            <a:schemeClr val="accent1"/>
-          </a:lnRef>
-          <a:fillRef idx="0">
-            <a:schemeClr val="accent1"/>
-          </a:fillRef>
-          <a:effectRef idx="0">
-            <a:schemeClr val="accent1"/>
-          </a:effectRef>
-          <a:fontRef idx="minor">
-            <a:schemeClr val="tx1"/>
-          </a:fontRef>
-        </p:style>
-      </p:cxnSp>
-      <p:pic>
-        <p:nvPicPr>
-          <p:cNvPr id="95" name="그림 28" descr="C:/Users/Admin1/AppData/Roaming/PolarisOffice/ETemp/20852_9486176/fImage191382645705.png"/>
+          <p:cNvPr id="95" name="그림 28" descr="C:/Users/Admin1/AppData/Roaming/PolarisOffice/ETemp/25668_19456376/fImage191382645705.png"/>
           <p:cNvPicPr>
             <a:picLocks noChangeAspect="1"/>
           </p:cNvPicPr>
@@ -9547,8 +9187,8 @@
         </p:blipFill>
         <p:spPr>
           <a:xfrm rot="0">
-            <a:off x="6806565" y="1445895"/>
-            <a:ext cx="2655570" cy="2551430"/>
+            <a:off x="1240790" y="1438275"/>
+            <a:ext cx="2679065" cy="3636010"/>
           </a:xfrm>
           <a:prstGeom prst="roundRect"/>
           <a:solidFill>
@@ -9558,14 +9198,45 @@
       </p:pic>
       <p:pic>
         <p:nvPicPr>
-          <p:cNvPr id="96" name="그림 19" descr="C:/Users/Admin1/AppData/Roaming/PolarisOffice/ETemp/20852_9486176/fImage1082530741.png"/>
+          <p:cNvPr id="97" name="그림 5" descr="C:/Users/Admin1/AppData/Roaming/PolarisOffice/ETemp/25668_19456376/fImage937124941.png"/>
           <p:cNvPicPr>
             <a:picLocks noChangeAspect="1"/>
           </p:cNvPicPr>
           <p:nvPr/>
         </p:nvPicPr>
         <p:blipFill rotWithShape="1">
-          <a:blip r:embed="rId8" cstate="hqprint">
+          <a:blip r:embed="rId9" cstate="print">
+            <a:extLst>
+              <a:ext uri="{28A0092B-C50C-407E-A947-70E740481C1C}">
+                <a14:useLocalDpi xmlns:a14="http://schemas.microsoft.com/office/drawing/2010/main" val="0"/>
+              </a:ext>
+            </a:extLst>
+          </a:blip>
+          <a:stretch>
+            <a:fillRect/>
+          </a:stretch>
+        </p:blipFill>
+        <p:spPr>
+          <a:xfrm rot="0">
+            <a:off x="4065905" y="2273935"/>
+            <a:ext cx="1318895" cy="1981835"/>
+          </a:xfrm>
+          <a:prstGeom prst="roundRect"/>
+          <a:solidFill>
+            <a:srgbClr val="EDEDED"/>
+          </a:solidFill>
+        </p:spPr>
+      </p:pic>
+      <p:pic>
+        <p:nvPicPr>
+          <p:cNvPr id="98" name="그림 8" descr="C:/Users/Admin1/AppData/Roaming/PolarisOffice/ETemp/25668_19456376/fImage191382645705.png"/>
+          <p:cNvPicPr>
+            <a:picLocks noChangeAspect="1"/>
+          </p:cNvPicPr>
+          <p:nvPr/>
+        </p:nvPicPr>
+        <p:blipFill rotWithShape="1">
+          <a:blip r:embed="rId5" cstate="hqprint">
             <a:extLst>
               <a:ext uri="{28A0092B-C50C-407E-A947-70E740481C1C}">
                 <a14:useLocalDpi xmlns:a14="http://schemas.microsoft.com/office/drawing/2010/main"/>
@@ -9578,8 +9249,39 @@
         </p:blipFill>
         <p:spPr>
           <a:xfrm rot="0">
-            <a:off x="9625965" y="1866900"/>
-            <a:ext cx="1337310" cy="1732915"/>
+            <a:off x="6813550" y="1441450"/>
+            <a:ext cx="2627630" cy="3636010"/>
+          </a:xfrm>
+          <a:prstGeom prst="roundRect"/>
+          <a:solidFill>
+            <a:srgbClr val="EDEDED"/>
+          </a:solidFill>
+        </p:spPr>
+      </p:pic>
+      <p:pic>
+        <p:nvPicPr>
+          <p:cNvPr id="99" name="그림 9" descr="C:/Users/Admin1/AppData/Roaming/PolarisOffice/ETemp/25668_19456376/fImage104452518467.png"/>
+          <p:cNvPicPr>
+            <a:picLocks noChangeAspect="1"/>
+          </p:cNvPicPr>
+          <p:nvPr/>
+        </p:nvPicPr>
+        <p:blipFill rotWithShape="1">
+          <a:blip r:embed="rId10" cstate="print">
+            <a:extLst>
+              <a:ext uri="{28A0092B-C50C-407E-A947-70E740481C1C}">
+                <a14:useLocalDpi xmlns:a14="http://schemas.microsoft.com/office/drawing/2010/main" val="0"/>
+              </a:ext>
+            </a:extLst>
+          </a:blip>
+          <a:stretch>
+            <a:fillRect/>
+          </a:stretch>
+        </p:blipFill>
+        <p:spPr>
+          <a:xfrm rot="0">
+            <a:off x="9587230" y="2273935"/>
+            <a:ext cx="1378585" cy="1981835"/>
           </a:xfrm>
           <a:prstGeom prst="roundRect"/>
           <a:solidFill>
@@ -9638,7 +9340,7 @@
         <p:spPr>
           <a:xfrm rot="0">
             <a:off x="4332605" y="367030"/>
-            <a:ext cx="3539490" cy="554990"/>
+            <a:ext cx="3526155" cy="554990"/>
           </a:xfrm>
           <a:prstGeom prst="rect"/>
           <a:noFill/>
@@ -9662,7 +9364,14 @@
                 <a:latin typeface="나눔바른고딕" charset="0"/>
                 <a:ea typeface="나눔바른고딕" charset="0"/>
               </a:rPr>
-              <a:t>열세 번째 튜토리얼</a:t>
+              <a:t>열세</a:t>
+            </a:r>
+            <a:r>
+              <a:rPr lang="ko-KR" sz="2500" b="1">
+                <a:latin typeface="나눔바른고딕" charset="0"/>
+                <a:ea typeface="나눔바른고딕" charset="0"/>
+              </a:rPr>
+              <a:t> 번째 튜토리얼</a:t>
             </a:r>
             <a:r>
               <a:rPr lang="ko-KR" sz="3000" b="1">
@@ -9688,8 +9397,8 @@
         </p:nvSpPr>
         <p:spPr>
           <a:xfrm rot="0">
-            <a:off x="1229995" y="4271645"/>
-            <a:ext cx="4150995" cy="2031365"/>
+            <a:off x="1229995" y="4233545"/>
+            <a:ext cx="4137025" cy="2031365"/>
           </a:xfrm>
           <a:prstGeom prst="rect"/>
           <a:noFill/>
@@ -9740,42 +9449,91 @@
                 <a:latin typeface="맑은 고딕" charset="0"/>
                 <a:ea typeface="맑은 고딕" charset="0"/>
               </a:rPr>
-              <a:t>이제</a:t>
+              <a:t>그러고 나서</a:t>
             </a:r>
             <a:r>
               <a:rPr sz="1800">
                 <a:latin typeface="맑은 고딕" charset="0"/>
                 <a:ea typeface="맑은 고딕" charset="0"/>
               </a:rPr>
-              <a:t> 빈 게임 오브젝트를 생성하</a:t>
-            </a:r>
-            <a:r>
-              <a:rPr lang="ko-KR" sz="1800">
-                <a:latin typeface="맑은 고딕" charset="0"/>
-                <a:ea typeface="맑은 고딕" charset="0"/>
-              </a:rPr>
-              <a:t>고</a:t>
+              <a:t> 빈 게임 오브젝트를 </a:t>
             </a:r>
             <a:r>
               <a:rPr sz="1800">
                 <a:latin typeface="맑은 고딕" charset="0"/>
                 <a:ea typeface="맑은 고딕" charset="0"/>
               </a:rPr>
+              <a:t>생성한</a:t>
+            </a:r>
+            <a:r>
+              <a:rPr sz="1800">
+                <a:latin typeface="맑은 고딕" charset="0"/>
+                <a:ea typeface="맑은 고딕" charset="0"/>
+              </a:rPr>
               <a:t> </a:t>
             </a:r>
             <a:r>
-              <a:rPr lang="ko-KR" sz="1800">
-                <a:latin typeface="맑은 고딕" charset="0"/>
-                <a:ea typeface="맑은 고딕" charset="0"/>
-              </a:rPr>
-              <a:t>Animator Control이라는</a:t>
-            </a:r>
-            <a:r>
               <a:rPr sz="1800">
                 <a:latin typeface="맑은 고딕" charset="0"/>
                 <a:ea typeface="맑은 고딕" charset="0"/>
               </a:rPr>
-              <a:t> 이름을 정의합니다.</a:t>
+              <a:t>다</a:t>
+            </a:r>
+            <a:r>
+              <a:rPr sz="1800">
+                <a:latin typeface="맑은 고딕" charset="0"/>
+                <a:ea typeface="맑은 고딕" charset="0"/>
+              </a:rPr>
+              <a:t>음</a:t>
+            </a:r>
+            <a:r>
+              <a:rPr sz="1800">
+                <a:latin typeface="맑은 고딕" charset="0"/>
+                <a:ea typeface="맑은 고딕" charset="0"/>
+              </a:rPr>
+              <a:t> </a:t>
+            </a:r>
+            <a:r>
+              <a:rPr lang="ko-KR" sz="1800">
+                <a:latin typeface="맑은 고딕" charset="0"/>
+                <a:ea typeface="맑은 고딕" charset="0"/>
+              </a:rPr>
+              <a:t>Animator</a:t>
+            </a:r>
+            <a:r>
+              <a:rPr lang="ko-KR" sz="1800">
+                <a:latin typeface="맑은 고딕" charset="0"/>
+                <a:ea typeface="맑은 고딕" charset="0"/>
+              </a:rPr>
+              <a:t> Manager라는</a:t>
+            </a:r>
+            <a:r>
+              <a:rPr sz="1800">
+                <a:latin typeface="맑은 고딕" charset="0"/>
+                <a:ea typeface="맑은 고딕" charset="0"/>
+              </a:rPr>
+              <a:t> </a:t>
+            </a:r>
+            <a:r>
+              <a:rPr sz="1800">
+                <a:latin typeface="맑은 고딕" charset="0"/>
+                <a:ea typeface="맑은 고딕" charset="0"/>
+              </a:rPr>
+              <a:t>이름을</a:t>
+            </a:r>
+            <a:r>
+              <a:rPr sz="1800">
+                <a:latin typeface="맑은 고딕" charset="0"/>
+                <a:ea typeface="맑은 고딕" charset="0"/>
+              </a:rPr>
+              <a:t> </a:t>
+            </a:r>
+            <a:r>
+              <a:rPr sz="1800">
+                <a:latin typeface="맑은 고딕" charset="0"/>
+                <a:ea typeface="맑은 고딕" charset="0"/>
+              </a:rPr>
+              <a:t>정의합니다.</a:t>
             </a:r>
             <a:endParaRPr lang="ko-KR" altLang="en-US" sz="1800">
               <a:latin typeface="맑은 고딕" charset="0"/>
@@ -9802,34 +9560,55 @@
                 <a:latin typeface="맑은 고딕" charset="0"/>
                 <a:ea typeface="맑은 고딕" charset="0"/>
               </a:rPr>
-              <a:t>그리고 </a:t>
-            </a:r>
-            <a:r>
-              <a:rPr lang="ko-KR" sz="1800">
-                <a:latin typeface="맑은 고딕" charset="0"/>
-                <a:ea typeface="맑은 고딕" charset="0"/>
-              </a:rPr>
-              <a:t>AnimationSpeed</a:t>
+              <a:t>이</a:t>
+            </a:r>
+            <a:r>
+              <a:rPr lang="ko-KR" sz="1800">
+                <a:latin typeface="맑은 고딕" charset="0"/>
+                <a:ea typeface="맑은 고딕" charset="0"/>
+              </a:rPr>
+              <a:t>제</a:t>
             </a:r>
             <a:r>
               <a:rPr sz="1800">
                 <a:latin typeface="맑은 고딕" charset="0"/>
                 <a:ea typeface="맑은 고딕" charset="0"/>
               </a:rPr>
-              <a:t> 스크립트를 생성</a:t>
-            </a:r>
-            <a:r>
-              <a:rPr lang="ko-KR" sz="1800">
-                <a:latin typeface="맑은 고딕" charset="0"/>
-                <a:ea typeface="맑은 고딕" charset="0"/>
-              </a:rPr>
-              <a:t>한 다음</a:t>
+              <a:t> </a:t>
+            </a:r>
+            <a:r>
+              <a:rPr lang="ko-KR" sz="1800">
+                <a:latin typeface="맑은 고딕" charset="0"/>
+                <a:ea typeface="맑은 고딕" charset="0"/>
+              </a:rPr>
+              <a:t>AnimationManager</a:t>
             </a:r>
             <a:r>
               <a:rPr sz="1800">
                 <a:latin typeface="맑은 고딕" charset="0"/>
                 <a:ea typeface="맑은 고딕" charset="0"/>
               </a:rPr>
+              <a:t> 스크립트를 </a:t>
+            </a:r>
+            <a:r>
+              <a:rPr sz="1800">
+                <a:latin typeface="맑은 고딕" charset="0"/>
+                <a:ea typeface="맑은 고딕" charset="0"/>
+              </a:rPr>
+              <a:t>생성</a:t>
+            </a:r>
+            <a:r>
+              <a:rPr lang="ko-KR" sz="1800">
+                <a:latin typeface="맑은 고딕" charset="0"/>
+                <a:ea typeface="맑은 고딕" charset="0"/>
+              </a:rPr>
+              <a:t>하고</a:t>
+            </a:r>
+            <a:r>
+              <a:rPr sz="1800">
+                <a:latin typeface="맑은 고딕" charset="0"/>
+                <a:ea typeface="맑은 고딕" charset="0"/>
+              </a:rPr>
               <a:t> </a:t>
             </a:r>
             <a:r>
@@ -9837,14 +9616,35 @@
                 <a:latin typeface="맑은 고딕" charset="0"/>
                 <a:ea typeface="맑은 고딕" charset="0"/>
               </a:rPr>
-              <a:t>Animator Control</a:t>
+              <a:t>AnimatorManager</a:t>
+            </a:r>
+            <a:r>
+              <a:rPr lang="ko-KR" sz="1800">
+                <a:latin typeface="맑은 고딕" charset="0"/>
+                <a:ea typeface="맑은 고딕" charset="0"/>
+              </a:rPr>
+              <a:t> </a:t>
             </a:r>
             <a:r>
               <a:rPr sz="1800">
                 <a:latin typeface="맑은 고딕" charset="0"/>
                 <a:ea typeface="맑은 고딕" charset="0"/>
               </a:rPr>
-              <a:t> 오브젝트에 넣어줍니다.</a:t>
+              <a:t>오브젝트에</a:t>
+            </a:r>
+            <a:r>
+              <a:rPr sz="1800">
+                <a:latin typeface="맑은 고딕" charset="0"/>
+                <a:ea typeface="맑은 고딕" charset="0"/>
+              </a:rPr>
+              <a:t> </a:t>
+            </a:r>
+            <a:r>
+              <a:rPr sz="1800">
+                <a:latin typeface="맑은 고딕" charset="0"/>
+                <a:ea typeface="맑은 고딕" charset="0"/>
+              </a:rPr>
+              <a:t>넣어줍니다.</a:t>
             </a:r>
             <a:endParaRPr lang="ko-KR" altLang="en-US" sz="1800">
               <a:latin typeface="맑은 고딕" charset="0"/>
@@ -9863,8 +9663,8 @@
         </p:nvSpPr>
         <p:spPr>
           <a:xfrm rot="0">
-            <a:off x="6806565" y="4540885"/>
-            <a:ext cx="4139565" cy="1772285"/>
+            <a:off x="6822440" y="5338445"/>
+            <a:ext cx="4152265" cy="929640"/>
           </a:xfrm>
           <a:prstGeom prst="rect"/>
           <a:noFill/>
@@ -9904,80 +9704,95 @@
                 <a:latin typeface="맑은 고딕" charset="0"/>
                 <a:ea typeface="맑은 고딕" charset="0"/>
               </a:rPr>
-              <a:t>그다음 </a:t>
-            </a:r>
-            <a:r>
-              <a:rPr lang="ko-KR" sz="1800">
-                <a:latin typeface="맑은 고딕" charset="0"/>
-                <a:ea typeface="맑은 고딕" charset="0"/>
-              </a:rPr>
-              <a:t>DataSystem</a:t>
+              <a:t>그리고 UI에서 Button </a:t>
             </a:r>
             <a:r>
               <a:rPr sz="1800">
                 <a:latin typeface="맑은 고딕" charset="0"/>
                 <a:ea typeface="맑은 고딕" charset="0"/>
               </a:rPr>
-              <a:t> 스크립트</a:t>
-            </a:r>
-            <a:r>
-              <a:rPr lang="ko-KR" sz="1800">
-                <a:latin typeface="맑은 고딕" charset="0"/>
-                <a:ea typeface="맑은 고딕" charset="0"/>
-              </a:rPr>
-              <a:t>에서 speed 변수를 선언하고 Save( ) 함수와 Load( ) 함수를 선언합니다.</a:t>
+              <a:t>오브젝트</a:t>
+            </a:r>
+            <a:r>
+              <a:rPr lang="ko-KR" sz="1800">
+                <a:latin typeface="맑은 고딕" charset="0"/>
+                <a:ea typeface="맑은 고딕" charset="0"/>
+              </a:rPr>
+              <a:t>를</a:t>
+            </a:r>
+            <a:r>
+              <a:rPr sz="1800">
+                <a:latin typeface="맑은 고딕" charset="0"/>
+                <a:ea typeface="맑은 고딕" charset="0"/>
+              </a:rPr>
+              <a:t> </a:t>
+            </a:r>
+            <a:r>
+              <a:rPr sz="1800">
+                <a:latin typeface="맑은 고딕" charset="0"/>
+                <a:ea typeface="맑은 고딕" charset="0"/>
+              </a:rPr>
+              <a:t>생성</a:t>
+            </a:r>
+            <a:r>
+              <a:rPr lang="ko-KR" sz="1800">
+                <a:latin typeface="맑은 고딕" charset="0"/>
+                <a:ea typeface="맑은 고딕" charset="0"/>
+              </a:rPr>
+              <a:t>한</a:t>
+            </a:r>
+            <a:r>
+              <a:rPr lang="ko-KR" sz="1800">
+                <a:latin typeface="맑은 고딕" charset="0"/>
+                <a:ea typeface="맑은 고딕" charset="0"/>
+              </a:rPr>
+              <a:t> </a:t>
+            </a:r>
+            <a:r>
+              <a:rPr lang="ko-KR" sz="1800">
+                <a:latin typeface="맑은 고딕" charset="0"/>
+                <a:ea typeface="맑은 고딕" charset="0"/>
+              </a:rPr>
+              <a:t>다음</a:t>
+            </a:r>
+            <a:r>
+              <a:rPr sz="1800">
+                <a:latin typeface="맑은 고딕" charset="0"/>
+                <a:ea typeface="맑은 고딕" charset="0"/>
+              </a:rPr>
+              <a:t> Everything Culling </a:t>
+            </a:r>
+            <a:r>
+              <a:rPr sz="1800">
+                <a:latin typeface="맑은 고딕" charset="0"/>
+                <a:ea typeface="맑은 고딕" charset="0"/>
+              </a:rPr>
+              <a:t>Button이라는</a:t>
+            </a:r>
+            <a:r>
+              <a:rPr sz="1800">
+                <a:latin typeface="맑은 고딕" charset="0"/>
+                <a:ea typeface="맑은 고딕" charset="0"/>
+              </a:rPr>
+              <a:t> 이름으로 정의합니</a:t>
+            </a:r>
+            <a:r>
+              <a:rPr sz="1800">
+                <a:latin typeface="맑은 고딕" charset="0"/>
+                <a:ea typeface="맑은 고딕" charset="0"/>
+              </a:rPr>
+              <a:t>다.</a:t>
             </a:r>
             <a:endParaRPr lang="ko-KR" altLang="en-US" sz="1800">
               <a:latin typeface="맑은 고딕" charset="0"/>
               <a:ea typeface="맑은 고딕" charset="0"/>
             </a:endParaRPr>
           </a:p>
-          <a:p>
-            <a:pPr marL="0" indent="0" rtl="0" algn="l" defTabSz="914400" eaLnBrk="1" latinLnBrk="0" hangingPunct="1">
-              <a:buFontTx/>
-              <a:buNone/>
-            </a:pPr>
-            <a:endParaRPr lang="ko-KR" altLang="en-US" sz="1800">
-              <a:latin typeface="맑은 고딕" charset="0"/>
-              <a:ea typeface="맑은 고딕" charset="0"/>
-            </a:endParaRPr>
-          </a:p>
-          <a:p>
-            <a:pPr marL="0" indent="0" rtl="0" algn="l" defTabSz="914400" eaLnBrk="1" latinLnBrk="0" hangingPunct="1">
-              <a:buFontTx/>
-              <a:buNone/>
-            </a:pPr>
-            <a:r>
-              <a:rPr sz="1800">
-                <a:latin typeface="맑은 고딕" charset="0"/>
-                <a:ea typeface="맑은 고딕" charset="0"/>
-              </a:rPr>
-              <a:t>그</a:t>
-            </a:r>
-            <a:r>
-              <a:rPr lang="ko-KR" sz="1800">
-                <a:latin typeface="맑은 고딕" charset="0"/>
-                <a:ea typeface="맑은 고딕" charset="0"/>
-              </a:rPr>
-              <a:t>런 다음 PlayerPrefs로 speed 변수를 저장합니다. </a:t>
-            </a:r>
-            <a:r>
-              <a:rPr sz="1800">
-                <a:latin typeface="맑은 고딕" charset="0"/>
-                <a:ea typeface="맑은 고딕" charset="0"/>
-              </a:rPr>
-              <a:t> </a:t>
-            </a:r>
-            <a:endParaRPr lang="ko-KR" altLang="en-US" sz="1800">
-              <a:latin typeface="맑은 고딕" charset="0"/>
-              <a:ea typeface="맑은 고딕" charset="0"/>
-            </a:endParaRPr>
-          </a:p>
         </p:txBody>
       </p:sp>
       <p:pic>
         <p:nvPicPr>
-          <p:cNvPr id="91" name="Picture " descr="C:/Users/Admin1/AppData/Roaming/PolarisOffice/ETemp/20852_9486176/fImage85062693281.png"/>
+          <p:cNvPr id="91" name="Picture " descr="C:/Users/Admin1/AppData/Roaming/PolarisOffice/ETemp/25668_19456376/fImage85062693281.png"/>
           <p:cNvPicPr>
             <a:picLocks noChangeAspect="1"/>
           </p:cNvPicPr>
@@ -9997,8 +9812,8 @@
         </p:blipFill>
         <p:spPr>
           <a:xfrm rot="0">
-            <a:off x="1238250" y="1444625"/>
-            <a:ext cx="2364740" cy="2565400"/>
+            <a:off x="1238250" y="1438275"/>
+            <a:ext cx="2365375" cy="2572385"/>
           </a:xfrm>
           <a:prstGeom prst="roundRect"/>
           <a:solidFill>
@@ -10008,38 +9823,7 @@
       </p:pic>
       <p:pic>
         <p:nvPicPr>
-          <p:cNvPr id="97" name="그림 32" descr="C:/Users/Admin1/AppData/Roaming/PolarisOffice/ETemp/20852_9486176/fImage107932786827.png"/>
-          <p:cNvPicPr>
-            <a:picLocks noChangeAspect="1"/>
-          </p:cNvPicPr>
-          <p:nvPr/>
-        </p:nvPicPr>
-        <p:blipFill rotWithShape="1">
-          <a:blip r:embed="rId3" cstate="hqprint">
-            <a:extLst>
-              <a:ext uri="{28A0092B-C50C-407E-A947-70E740481C1C}">
-                <a14:useLocalDpi xmlns:a14="http://schemas.microsoft.com/office/drawing/2010/main"/>
-              </a:ext>
-            </a:extLst>
-          </a:blip>
-          <a:stretch>
-            <a:fillRect/>
-          </a:stretch>
-        </p:blipFill>
-        <p:spPr>
-          <a:xfrm rot="0">
-            <a:off x="3909060" y="1445895"/>
-            <a:ext cx="1471930" cy="1576705"/>
-          </a:xfrm>
-          <a:prstGeom prst="roundRect"/>
-          <a:solidFill>
-            <a:srgbClr val="EDEDED"/>
-          </a:solidFill>
-        </p:spPr>
-      </p:pic>
-      <p:pic>
-        <p:nvPicPr>
-          <p:cNvPr id="98" name="그림 35" descr="C:/Users/Admin1/AppData/Roaming/PolarisOffice/ETemp/20852_9486176/fImage21192799961.png"/>
+          <p:cNvPr id="98" name="그림 35" descr="C:/Users/Admin1/AppData/Roaming/PolarisOffice/ETemp/25668_19456376/fImage21192799961.png"/>
           <p:cNvPicPr>
             <a:picLocks noChangeAspect="1"/>
           </p:cNvPicPr>
@@ -10060,7 +9844,7 @@
         <p:spPr>
           <a:xfrm rot="0">
             <a:off x="4290060" y="3333750"/>
-            <a:ext cx="698500" cy="663575"/>
+            <a:ext cx="663575" cy="680720"/>
           </a:xfrm>
           <a:prstGeom prst="roundRect"/>
           <a:solidFill>
@@ -10073,14 +9857,14 @@
           <p:cNvPr id="99" name="도형 38"/>
           <p:cNvCxnSpPr>
             <a:stCxn id="98" idx="0"/>
-            <a:endCxn id="97" idx="2"/>
+            <a:endCxn id="101" idx="2"/>
           </p:cNvCxnSpPr>
           <p:nvPr/>
         </p:nvCxnSpPr>
         <p:spPr>
           <a:xfrm rot="0" flipV="1">
-            <a:off x="4638675" y="3021965"/>
-            <a:ext cx="6350" cy="312420"/>
+            <a:off x="4621530" y="2985770"/>
+            <a:ext cx="3175" cy="348615"/>
           </a:xfrm>
           <a:prstGeom prst="straightConnector1"/>
           <a:ln w="6350" cap="flat" cmpd="sng">
@@ -10105,14 +9889,45 @@
       </p:cxnSp>
       <p:pic>
         <p:nvPicPr>
-          <p:cNvPr id="100" name="그림 39" descr="C:/Users/Admin1/AppData/Roaming/PolarisOffice/ETemp/20852_9486176/fImage9327281491.png"/>
+          <p:cNvPr id="101" name="그림 12" descr="C:/Users/Admin1/AppData/Roaming/PolarisOffice/ETemp/25668_19456376/fImage112212526334.png"/>
           <p:cNvPicPr>
             <a:picLocks noChangeAspect="1"/>
           </p:cNvPicPr>
           <p:nvPr/>
         </p:nvPicPr>
         <p:blipFill rotWithShape="1">
-          <a:blip r:embed="rId5" cstate="hqprint">
+          <a:blip r:embed="rId7" cstate="print">
+            <a:extLst>
+              <a:ext uri="{28A0092B-C50C-407E-A947-70E740481C1C}">
+                <a14:useLocalDpi xmlns:a14="http://schemas.microsoft.com/office/drawing/2010/main" val="0"/>
+              </a:ext>
+            </a:extLst>
+          </a:blip>
+          <a:stretch>
+            <a:fillRect/>
+          </a:stretch>
+        </p:blipFill>
+        <p:spPr>
+          <a:xfrm rot="0">
+            <a:off x="3873500" y="1430020"/>
+            <a:ext cx="1502410" cy="1556385"/>
+          </a:xfrm>
+          <a:prstGeom prst="roundRect"/>
+          <a:solidFill>
+            <a:srgbClr val="EDEDED"/>
+          </a:solidFill>
+        </p:spPr>
+      </p:pic>
+      <p:pic>
+        <p:nvPicPr>
+          <p:cNvPr id="102" name="그림 15" descr="C:/Users/Admin1/AppData/Roaming/PolarisOffice/ETemp/25668_19456376/fImage191382645705.png"/>
+          <p:cNvPicPr>
+            <a:picLocks noChangeAspect="1"/>
+          </p:cNvPicPr>
+          <p:nvPr/>
+        </p:nvPicPr>
+        <p:blipFill rotWithShape="1">
+          <a:blip r:embed="rId8" cstate="hqprint">
             <a:extLst>
               <a:ext uri="{28A0092B-C50C-407E-A947-70E740481C1C}">
                 <a14:useLocalDpi xmlns:a14="http://schemas.microsoft.com/office/drawing/2010/main"/>
@@ -10125,8 +9940,39 @@
         </p:blipFill>
         <p:spPr>
           <a:xfrm rot="0">
-            <a:off x="6815455" y="1446530"/>
-            <a:ext cx="4138930" cy="2892425"/>
+            <a:off x="6822440" y="1441450"/>
+            <a:ext cx="2618740" cy="3636010"/>
+          </a:xfrm>
+          <a:prstGeom prst="roundRect"/>
+          <a:solidFill>
+            <a:srgbClr val="EDEDED"/>
+          </a:solidFill>
+        </p:spPr>
+      </p:pic>
+      <p:pic>
+        <p:nvPicPr>
+          <p:cNvPr id="103" name="그림 17" descr="C:/Users/Admin1/AppData/Roaming/PolarisOffice/ETemp/25668_19456376/fImage120502556500.png"/>
+          <p:cNvPicPr>
+            <a:picLocks noChangeAspect="1"/>
+          </p:cNvPicPr>
+          <p:nvPr/>
+        </p:nvPicPr>
+        <p:blipFill rotWithShape="1">
+          <a:blip r:embed="rId9" cstate="print">
+            <a:extLst>
+              <a:ext uri="{28A0092B-C50C-407E-A947-70E740481C1C}">
+                <a14:useLocalDpi xmlns:a14="http://schemas.microsoft.com/office/drawing/2010/main" val="0"/>
+              </a:ext>
+            </a:extLst>
+          </a:blip>
+          <a:stretch>
+            <a:fillRect/>
+          </a:stretch>
+        </p:blipFill>
+        <p:spPr>
+          <a:xfrm rot="0">
+            <a:off x="9604375" y="2255520"/>
+            <a:ext cx="1358265" cy="2155190"/>
           </a:xfrm>
           <a:prstGeom prst="roundRect"/>
           <a:solidFill>
@@ -10184,8 +10030,8 @@
         </p:nvSpPr>
         <p:spPr>
           <a:xfrm rot="0">
-            <a:off x="4332605" y="453390"/>
-            <a:ext cx="3538855" cy="554990"/>
+            <a:off x="4332605" y="386715"/>
+            <a:ext cx="3539490" cy="554990"/>
           </a:xfrm>
           <a:prstGeom prst="rect"/>
           <a:noFill/>
@@ -10200,30 +10046,30 @@
           </a:bodyPr>
           <a:lstStyle/>
           <a:p>
-            <a:pPr marL="0" indent="0" algn="l" latinLnBrk="0" hangingPunct="1">
-              <a:buFontTx/>
-              <a:buNone/>
-            </a:pPr>
+            <a:pPr marL="0" indent="0" algn="ctr" latinLnBrk="0" hangingPunct="1">
+              <a:buFontTx/>
+              <a:buNone/>
+            </a:pPr>
+            <a:r>
+              <a:rPr lang="ko-KR" sz="2500" b="1">
+                <a:latin typeface="나눔바른고딕" charset="0"/>
+                <a:ea typeface="나눔바른고딕" charset="0"/>
+              </a:rPr>
+              <a:t>열네</a:t>
+            </a:r>
+            <a:r>
+              <a:rPr lang="ko-KR" sz="2500" b="1">
+                <a:latin typeface="나눔바른고딕" charset="0"/>
+                <a:ea typeface="나눔바른고딕" charset="0"/>
+              </a:rPr>
+              <a:t> 번째 튜토리얼</a:t>
+            </a:r>
             <a:r>
               <a:rPr lang="ko-KR" sz="3000" b="1">
                 <a:latin typeface="맑은 고딕" charset="0"/>
                 <a:ea typeface="맑은 고딕" charset="0"/>
               </a:rPr>
-              <a:t>열</a:t>
-            </a:r>
-            <a:r>
-              <a:rPr lang="ko-KR" sz="3000" b="1">
-                <a:latin typeface="맑은 고딕" charset="0"/>
-                <a:ea typeface="맑은 고딕" charset="0"/>
-              </a:rPr>
-              <a:t>네</a:t>
-            </a:r>
-            <a:r>
-              <a:rPr lang="ko-KR" sz="3000" b="1">
-                <a:latin typeface="맑은 고딕" charset="0"/>
-                <a:ea typeface="맑은 고딕" charset="0"/>
-              </a:rPr>
-              <a:t> 번째 튜토리얼 </a:t>
+              <a:t> </a:t>
             </a:r>
             <a:endParaRPr lang="ko-KR" altLang="en-US" sz="3000" b="1">
               <a:latin typeface="맑은 고딕" charset="0"/>
@@ -10234,7 +10080,7 @@
       </p:sp>
       <p:sp>
         <p:nvSpPr>
-          <p:cNvPr id="54" name="Rect 0"/>
+          <p:cNvPr id="103" name="텍스트 상자 48"/>
           <p:cNvSpPr txBox="1">
             <a:spLocks/>
           </p:cNvSpPr>
@@ -10242,8 +10088,8 @@
         </p:nvSpPr>
         <p:spPr>
           <a:xfrm rot="0">
-            <a:off x="6817360" y="5257165"/>
-            <a:ext cx="4349115" cy="923925"/>
+            <a:off x="1228725" y="3058795"/>
+            <a:ext cx="4153535" cy="647065"/>
           </a:xfrm>
           <a:prstGeom prst="rect"/>
           <a:noFill/>
@@ -10270,17 +10116,7 @@
                 <a:latin typeface="맑은 고딕" charset="0"/>
                 <a:ea typeface="맑은 고딕" charset="0"/>
               </a:rPr>
-              <a:t>3</a:t>
-            </a:r>
-            <a:r>
-              <a:rPr lang="ko-KR" sz="1800" b="1">
-                <a:solidFill>
-                  <a:srgbClr val="0611F2"/>
-                </a:solidFill>
-                <a:latin typeface="맑은 고딕" charset="0"/>
-                <a:ea typeface="맑은 고딕" charset="0"/>
-              </a:rPr>
-              <a:t>6</a:t>
+              <a:t>33</a:t>
             </a:r>
             <a:r>
               <a:rPr sz="1800" b="1">
@@ -10297,6 +10133,27 @@
                 <a:latin typeface="맑은 고딕" charset="0"/>
                 <a:ea typeface="맑은 고딕" charset="0"/>
               </a:rPr>
+              <a:t> 그런 다음</a:t>
+            </a:r>
+            <a:r>
+              <a:rPr lang="ko-KR" sz="1800">
+                <a:latin typeface="맑은 고딕" charset="0"/>
+                <a:ea typeface="맑은 고딕" charset="0"/>
+              </a:rPr>
+              <a:t> Ch14_nonPBR </a:t>
+            </a:r>
+            <a:r>
+              <a:rPr lang="ko-KR" sz="1800">
+                <a:latin typeface="맑은 고딕" charset="0"/>
+                <a:ea typeface="맑은 고딕" charset="0"/>
+              </a:rPr>
+              <a:t>오브젝트의</a:t>
+            </a:r>
+            <a:r>
+              <a:rPr lang="ko-KR" sz="1800">
+                <a:latin typeface="맑은 고딕" charset="0"/>
+                <a:ea typeface="맑은 고딕" charset="0"/>
+              </a:rPr>
               <a:t> </a:t>
             </a:r>
             <a:r>
@@ -10304,21 +10161,28 @@
                 <a:latin typeface="맑은 고딕" charset="0"/>
                 <a:ea typeface="맑은 고딕" charset="0"/>
               </a:rPr>
-              <a:t>그</a:t>
-            </a:r>
-            <a:r>
-              <a:rPr lang="ko-KR" sz="1800">
-                <a:latin typeface="맑은 고딕" charset="0"/>
-                <a:ea typeface="맑은 고딕" charset="0"/>
-              </a:rPr>
-              <a:t>리고</a:t>
-            </a:r>
-            <a:r>
-              <a:rPr lang="ko-KR" sz="1800">
-                <a:latin typeface="맑은 고딕" charset="0"/>
-                <a:ea typeface="맑은 고딕" charset="0"/>
-              </a:rPr>
-              <a:t> AnimationSpeed 스크립트에 Text 변수와 DataSystem 변수 그리고 Animator 변수를 배열로 선언합니다.</a:t>
+              <a:t>위치</a:t>
+            </a:r>
+            <a:r>
+              <a:rPr lang="ko-KR" sz="1800">
+                <a:latin typeface="맑은 고딕" charset="0"/>
+                <a:ea typeface="맑은 고딕" charset="0"/>
+              </a:rPr>
+              <a:t> </a:t>
+            </a:r>
+            <a:r>
+              <a:rPr lang="ko-KR" sz="1800">
+                <a:latin typeface="맑은 고딕" charset="0"/>
+                <a:ea typeface="맑은 고딕" charset="0"/>
+              </a:rPr>
+              <a:t>값을</a:t>
+            </a:r>
+            <a:r>
+              <a:rPr lang="ko-KR" sz="1800">
+                <a:latin typeface="맑은 고딕" charset="0"/>
+                <a:ea typeface="맑은 고딕" charset="0"/>
+              </a:rPr>
+              <a:t> 설정합니다.</a:t>
             </a:r>
             <a:endParaRPr lang="ko-KR" altLang="en-US" sz="1800">
               <a:latin typeface="맑은 고딕" charset="0"/>
@@ -10327,40 +10191,9 @@
           </a:p>
         </p:txBody>
       </p:sp>
-      <p:pic>
-        <p:nvPicPr>
-          <p:cNvPr id="101" name="그림 42"/>
-          <p:cNvPicPr>
-            <a:picLocks noChangeAspect="1"/>
-          </p:cNvPicPr>
-          <p:nvPr/>
-        </p:nvPicPr>
-        <p:blipFill rotWithShape="1">
-          <a:blip r:embed="rId2" cstate="hqprint">
-            <a:extLst>
-              <a:ext uri="{28A0092B-C50C-407E-A947-70E740481C1C}">
-                <a14:useLocalDpi xmlns:a14="http://schemas.microsoft.com/office/drawing/2010/main"/>
-              </a:ext>
-            </a:extLst>
-          </a:blip>
-          <a:stretch>
-            <a:fillRect/>
-          </a:stretch>
-        </p:blipFill>
-        <p:spPr>
-          <a:xfrm rot="0">
-            <a:off x="6815455" y="3779520"/>
-            <a:ext cx="4351020" cy="1376045"/>
-          </a:xfrm>
-          <a:prstGeom prst="roundRect"/>
-          <a:solidFill>
-            <a:srgbClr val="EDEDED"/>
-          </a:solidFill>
-        </p:spPr>
-      </p:pic>
-      <p:sp>
-        <p:nvSpPr>
-          <p:cNvPr id="103" name="텍스트 상자 48"/>
+      <p:sp>
+        <p:nvSpPr>
+          <p:cNvPr id="109" name="텍스트 상자 20"/>
           <p:cNvSpPr txBox="1">
             <a:spLocks/>
           </p:cNvSpPr>
@@ -10368,8 +10201,8 @@
         </p:nvSpPr>
         <p:spPr>
           <a:xfrm rot="0">
-            <a:off x="1105535" y="3106420"/>
-            <a:ext cx="4283075" cy="647065"/>
+            <a:off x="1224280" y="5565140"/>
+            <a:ext cx="4148455" cy="647065"/>
           </a:xfrm>
           <a:prstGeom prst="rect"/>
           <a:noFill/>
@@ -10396,7 +10229,7 @@
                 <a:latin typeface="맑은 고딕" charset="0"/>
                 <a:ea typeface="맑은 고딕" charset="0"/>
               </a:rPr>
-              <a:t>33</a:t>
+              <a:t>34</a:t>
             </a:r>
             <a:r>
               <a:rPr sz="1800" b="1">
@@ -10413,14 +10246,56 @@
                 <a:latin typeface="맑은 고딕" charset="0"/>
                 <a:ea typeface="맑은 고딕" charset="0"/>
               </a:rPr>
-              <a:t> 이</a:t>
-            </a:r>
-            <a:r>
-              <a:rPr lang="ko-KR" sz="1800">
-                <a:latin typeface="맑은 고딕" charset="0"/>
-                <a:ea typeface="맑은 고딕" charset="0"/>
-              </a:rPr>
-              <a:t>제 Ch19_nonPBR 오브젝트의 위치 값을 설정합니다.</a:t>
+              <a:t> 그다음으로</a:t>
+            </a:r>
+            <a:r>
+              <a:rPr lang="ko-KR" sz="1800">
+                <a:latin typeface="맑은 고딕" charset="0"/>
+                <a:ea typeface="맑은 고딕" charset="0"/>
+              </a:rPr>
+              <a:t> Ch19_nonPBR </a:t>
+            </a:r>
+            <a:r>
+              <a:rPr lang="ko-KR" sz="1800">
+                <a:latin typeface="맑은 고딕" charset="0"/>
+                <a:ea typeface="맑은 고딕" charset="0"/>
+              </a:rPr>
+              <a:t>오브젝트의</a:t>
+            </a:r>
+            <a:r>
+              <a:rPr lang="ko-KR" sz="1800">
+                <a:latin typeface="맑은 고딕" charset="0"/>
+                <a:ea typeface="맑은 고딕" charset="0"/>
+              </a:rPr>
+              <a:t> </a:t>
+            </a:r>
+            <a:r>
+              <a:rPr lang="ko-KR" sz="1800">
+                <a:latin typeface="맑은 고딕" charset="0"/>
+                <a:ea typeface="맑은 고딕" charset="0"/>
+              </a:rPr>
+              <a:t>위치</a:t>
+            </a:r>
+            <a:r>
+              <a:rPr lang="ko-KR" sz="1800">
+                <a:latin typeface="맑은 고딕" charset="0"/>
+                <a:ea typeface="맑은 고딕" charset="0"/>
+              </a:rPr>
+              <a:t> </a:t>
+            </a:r>
+            <a:r>
+              <a:rPr lang="ko-KR" sz="1800">
+                <a:latin typeface="맑은 고딕" charset="0"/>
+                <a:ea typeface="맑은 고딕" charset="0"/>
+              </a:rPr>
+              <a:t>값을</a:t>
+            </a:r>
+            <a:r>
+              <a:rPr lang="ko-KR" sz="1800">
+                <a:latin typeface="맑은 고딕" charset="0"/>
+                <a:ea typeface="맑은 고딕" charset="0"/>
+              </a:rPr>
+              <a:t> 설정합니다.</a:t>
             </a:r>
             <a:endParaRPr lang="ko-KR" altLang="en-US" sz="1800">
               <a:latin typeface="맑은 고딕" charset="0"/>
@@ -10431,7 +10306,7 @@
       </p:sp>
       <p:pic>
         <p:nvPicPr>
-          <p:cNvPr id="104" name="그림 49"/>
+          <p:cNvPr id="110" name="그림 21" descr="C:/Users/Admin1/AppData/Roaming/PolarisOffice/ETemp/25668_19456376/fImage162492964827.png"/>
           <p:cNvPicPr>
             <a:picLocks noChangeAspect="1"/>
           </p:cNvPicPr>
@@ -10451,8 +10326,8 @@
         </p:blipFill>
         <p:spPr>
           <a:xfrm rot="0">
-            <a:off x="1106805" y="1400810"/>
-            <a:ext cx="4273550" cy="1617980"/>
+            <a:off x="1233805" y="3848100"/>
+            <a:ext cx="4134485" cy="1576705"/>
           </a:xfrm>
           <a:prstGeom prst="roundRect"/>
           <a:solidFill>
@@ -10462,116 +10337,14 @@
       </p:pic>
       <p:pic>
         <p:nvPicPr>
-          <p:cNvPr id="105" name="그림 52"/>
+          <p:cNvPr id="111" name="그림 22" descr="C:/Users/Admin1/AppData/Roaming/PolarisOffice/ETemp/25668_19456376/fImage156622589169.png"/>
           <p:cNvPicPr>
             <a:picLocks noChangeAspect="1"/>
           </p:cNvPicPr>
           <p:nvPr/>
         </p:nvPicPr>
         <p:blipFill rotWithShape="1">
-          <a:blip r:embed="rId5" cstate="hqprint">
-            <a:extLst>
-              <a:ext uri="{28A0092B-C50C-407E-A947-70E740481C1C}">
-                <a14:useLocalDpi xmlns:a14="http://schemas.microsoft.com/office/drawing/2010/main"/>
-              </a:ext>
-            </a:extLst>
-          </a:blip>
-          <a:stretch>
-            <a:fillRect/>
-          </a:stretch>
-        </p:blipFill>
-        <p:spPr>
-          <a:xfrm rot="0">
-            <a:off x="1111250" y="3917950"/>
-            <a:ext cx="4261485" cy="1489075"/>
-          </a:xfrm>
-          <a:prstGeom prst="roundRect"/>
-          <a:solidFill>
-            <a:srgbClr val="EDEDED"/>
-          </a:solidFill>
-        </p:spPr>
-      </p:pic>
-      <p:sp>
-        <p:nvSpPr>
-          <p:cNvPr id="106" name="텍스트 상자 55"/>
-          <p:cNvSpPr txBox="1">
-            <a:spLocks/>
-          </p:cNvSpPr>
-          <p:nvPr/>
-        </p:nvSpPr>
-        <p:spPr>
-          <a:xfrm rot="0">
-            <a:off x="1108075" y="5539105"/>
-            <a:ext cx="4277995" cy="647700"/>
-          </a:xfrm>
-          <a:prstGeom prst="rect"/>
-          <a:noFill/>
-          <a:ln w="0">
-            <a:noFill/>
-            <a:prstDash/>
-          </a:ln>
-        </p:spPr>
-        <p:txBody>
-          <a:bodyPr wrap="square" lIns="89535" tIns="46355" rIns="89535" bIns="46355" numCol="1" vert="horz" anchor="t">
-            <a:spAutoFit/>
-          </a:bodyPr>
-          <a:lstStyle/>
-          <a:p>
-            <a:pPr marL="0" indent="0" rtl="0" algn="l" defTabSz="914400" eaLnBrk="1" latinLnBrk="0" hangingPunct="1">
-              <a:buFontTx/>
-              <a:buNone/>
-            </a:pPr>
-            <a:r>
-              <a:rPr lang="ko-KR" sz="1800" b="1">
-                <a:solidFill>
-                  <a:srgbClr val="0611F2"/>
-                </a:solidFill>
-                <a:latin typeface="맑은 고딕" charset="0"/>
-                <a:ea typeface="맑은 고딕" charset="0"/>
-              </a:rPr>
-              <a:t>34</a:t>
-            </a:r>
-            <a:r>
-              <a:rPr sz="1800" b="1">
-                <a:solidFill>
-                  <a:srgbClr val="0611F2"/>
-                </a:solidFill>
-                <a:latin typeface="맑은 고딕" charset="0"/>
-                <a:ea typeface="맑은 고딕" charset="0"/>
-              </a:rPr>
-              <a:t>.</a:t>
-            </a:r>
-            <a:r>
-              <a:rPr sz="1800">
-                <a:latin typeface="맑은 고딕" charset="0"/>
-                <a:ea typeface="맑은 고딕" charset="0"/>
-              </a:rPr>
-              <a:t> </a:t>
-            </a:r>
-            <a:r>
-              <a:rPr lang="ko-KR" sz="1800">
-                <a:latin typeface="맑은 고딕" charset="0"/>
-                <a:ea typeface="맑은 고딕" charset="0"/>
-              </a:rPr>
-              <a:t>그다음 Animation Speed Button의 위치와 크기 그리고 앵커를 설정합니다.</a:t>
-            </a:r>
-            <a:endParaRPr lang="ko-KR" altLang="en-US" sz="1800">
-              <a:latin typeface="맑은 고딕" charset="0"/>
-              <a:ea typeface="맑은 고딕" charset="0"/>
-            </a:endParaRPr>
-          </a:p>
-        </p:txBody>
-      </p:sp>
-      <p:pic>
-        <p:nvPicPr>
-          <p:cNvPr id="107" name="그림 3"/>
-          <p:cNvPicPr>
-            <a:picLocks noChangeAspect="1"/>
-          </p:cNvPicPr>
-          <p:nvPr/>
-        </p:nvPicPr>
-        <p:blipFill rotWithShape="1">
-          <a:blip r:embed="rId7" cstate="print">
+          <a:blip r:embed="rId8" cstate="print">
             <a:extLst>
               <a:ext uri="{28A0092B-C50C-407E-A947-70E740481C1C}">
                 <a14:useLocalDpi xmlns:a14="http://schemas.microsoft.com/office/drawing/2010/main" val="0"/>
@@ -10584,8 +10357,8 @@
         </p:blipFill>
         <p:spPr>
           <a:xfrm rot="0">
-            <a:off x="6815455" y="1401445"/>
-            <a:ext cx="4351020" cy="1504950"/>
+            <a:off x="1242695" y="1447800"/>
+            <a:ext cx="4130040" cy="1486535"/>
           </a:xfrm>
           <a:prstGeom prst="roundRect"/>
           <a:solidFill>
@@ -10593,9 +10366,40 @@
           </a:solidFill>
         </p:spPr>
       </p:pic>
-      <p:sp>
-        <p:nvSpPr>
-          <p:cNvPr id="108" name="텍스트 상자 6"/>
+      <p:pic>
+        <p:nvPicPr>
+          <p:cNvPr id="112" name="그림 25" descr="C:/Users/Admin1/AppData/Roaming/PolarisOffice/ETemp/25668_19456376/fImage125342595724.png"/>
+          <p:cNvPicPr>
+            <a:picLocks noChangeAspect="1"/>
+          </p:cNvPicPr>
+          <p:nvPr/>
+        </p:nvPicPr>
+        <p:blipFill rotWithShape="1">
+          <a:blip r:embed="rId9" cstate="print">
+            <a:extLst>
+              <a:ext uri="{28A0092B-C50C-407E-A947-70E740481C1C}">
+                <a14:useLocalDpi xmlns:a14="http://schemas.microsoft.com/office/drawing/2010/main" val="0"/>
+              </a:ext>
+            </a:extLst>
+          </a:blip>
+          <a:stretch>
+            <a:fillRect/>
+          </a:stretch>
+        </p:blipFill>
+        <p:spPr>
+          <a:xfrm rot="0">
+            <a:off x="6810375" y="1454785"/>
+            <a:ext cx="4144010" cy="1241425"/>
+          </a:xfrm>
+          <a:prstGeom prst="roundRect"/>
+          <a:solidFill>
+            <a:srgbClr val="EDEDED"/>
+          </a:solidFill>
+        </p:spPr>
+      </p:pic>
+      <p:sp>
+        <p:nvSpPr>
+          <p:cNvPr id="113" name="텍스트 상자 28"/>
           <p:cNvSpPr txBox="1">
             <a:spLocks/>
           </p:cNvSpPr>
@@ -10603,8 +10407,8 @@
         </p:nvSpPr>
         <p:spPr>
           <a:xfrm rot="0">
-            <a:off x="6824980" y="3004185"/>
-            <a:ext cx="4341495" cy="647065"/>
+            <a:off x="6805930" y="2778125"/>
+            <a:ext cx="4157980" cy="923925"/>
           </a:xfrm>
           <a:prstGeom prst="rect"/>
           <a:noFill/>
@@ -10631,8 +10435,149 @@
                 <a:latin typeface="맑은 고딕" charset="0"/>
                 <a:ea typeface="맑은 고딕" charset="0"/>
               </a:rPr>
-              <a:t>3</a:t>
-            </a:r>
+              <a:t>35</a:t>
+            </a:r>
+            <a:r>
+              <a:rPr sz="1800" b="1">
+                <a:solidFill>
+                  <a:srgbClr val="0611F2"/>
+                </a:solidFill>
+                <a:latin typeface="맑은 고딕" charset="0"/>
+                <a:ea typeface="맑은 고딕" charset="0"/>
+              </a:rPr>
+              <a:t>.</a:t>
+            </a:r>
+            <a:r>
+              <a:rPr sz="1800">
+                <a:latin typeface="맑은 고딕" charset="0"/>
+                <a:ea typeface="맑은 고딕" charset="0"/>
+              </a:rPr>
+              <a:t> 그러고 나서</a:t>
+            </a:r>
+            <a:r>
+              <a:rPr lang="ko-KR" sz="1800">
+                <a:latin typeface="맑은 고딕" charset="0"/>
+                <a:ea typeface="맑은 고딕" charset="0"/>
+              </a:rPr>
+              <a:t> Animation Speed </a:t>
+            </a:r>
+            <a:r>
+              <a:rPr lang="ko-KR" sz="1800">
+                <a:latin typeface="맑은 고딕" charset="0"/>
+                <a:ea typeface="맑은 고딕" charset="0"/>
+              </a:rPr>
+              <a:t>Button의</a:t>
+            </a:r>
+            <a:r>
+              <a:rPr lang="ko-KR" sz="1800">
+                <a:latin typeface="맑은 고딕" charset="0"/>
+                <a:ea typeface="맑은 고딕" charset="0"/>
+              </a:rPr>
+              <a:t> </a:t>
+            </a:r>
+            <a:r>
+              <a:rPr lang="ko-KR" sz="1800">
+                <a:latin typeface="맑은 고딕" charset="0"/>
+                <a:ea typeface="맑은 고딕" charset="0"/>
+              </a:rPr>
+              <a:t>앵커를 지정하고 위치와 </a:t>
+            </a:r>
+            <a:r>
+              <a:rPr lang="ko-KR" sz="1800">
+                <a:latin typeface="맑은 고딕" charset="0"/>
+                <a:ea typeface="맑은 고딕" charset="0"/>
+              </a:rPr>
+              <a:t>크기</a:t>
+            </a:r>
+            <a:r>
+              <a:rPr lang="ko-KR" sz="1800">
+                <a:latin typeface="맑은 고딕" charset="0"/>
+                <a:ea typeface="맑은 고딕" charset="0"/>
+              </a:rPr>
+              <a:t>를</a:t>
+            </a:r>
+            <a:r>
+              <a:rPr lang="ko-KR" sz="1800">
+                <a:latin typeface="맑은 고딕" charset="0"/>
+                <a:ea typeface="맑은 고딕" charset="0"/>
+              </a:rPr>
+              <a:t> </a:t>
+            </a:r>
+            <a:r>
+              <a:rPr lang="ko-KR" sz="1800">
+                <a:latin typeface="맑은 고딕" charset="0"/>
+                <a:ea typeface="맑은 고딕" charset="0"/>
+              </a:rPr>
+              <a:t>설정합니다.</a:t>
+            </a:r>
+            <a:endParaRPr lang="ko-KR" altLang="en-US" sz="1800">
+              <a:latin typeface="맑은 고딕" charset="0"/>
+              <a:ea typeface="맑은 고딕" charset="0"/>
+            </a:endParaRPr>
+          </a:p>
+        </p:txBody>
+      </p:sp>
+      <p:pic>
+        <p:nvPicPr>
+          <p:cNvPr id="114" name="그림 29" descr="C:/Users/Admin1/AppData/Roaming/PolarisOffice/ETemp/25668_19456376/fImage187802611478.png"/>
+          <p:cNvPicPr>
+            <a:picLocks noChangeAspect="1"/>
+          </p:cNvPicPr>
+          <p:nvPr/>
+        </p:nvPicPr>
+        <p:blipFill rotWithShape="1">
+          <a:blip r:embed="rId10" cstate="print">
+            <a:extLst>
+              <a:ext uri="{28A0092B-C50C-407E-A947-70E740481C1C}">
+                <a14:useLocalDpi xmlns:a14="http://schemas.microsoft.com/office/drawing/2010/main" val="0"/>
+              </a:ext>
+            </a:extLst>
+          </a:blip>
+          <a:stretch>
+            <a:fillRect/>
+          </a:stretch>
+        </p:blipFill>
+        <p:spPr>
+          <a:xfrm rot="0">
+            <a:off x="6810375" y="3836035"/>
+            <a:ext cx="4152900" cy="1346200"/>
+          </a:xfrm>
+          <a:prstGeom prst="roundRect"/>
+          <a:solidFill>
+            <a:srgbClr val="EDEDED"/>
+          </a:solidFill>
+        </p:spPr>
+      </p:pic>
+      <p:sp>
+        <p:nvSpPr>
+          <p:cNvPr id="115" name="텍스트 상자 32"/>
+          <p:cNvSpPr txBox="1">
+            <a:spLocks/>
+          </p:cNvSpPr>
+          <p:nvPr/>
+        </p:nvSpPr>
+        <p:spPr>
+          <a:xfrm rot="0">
+            <a:off x="6794500" y="5285105"/>
+            <a:ext cx="4168775" cy="923925"/>
+          </a:xfrm>
+          <a:prstGeom prst="rect"/>
+          <a:noFill/>
+          <a:ln w="0">
+            <a:noFill/>
+            <a:prstDash/>
+          </a:ln>
+        </p:spPr>
+        <p:txBody>
+          <a:bodyPr wrap="square" lIns="89535" tIns="46355" rIns="89535" bIns="46355" numCol="1" vert="horz" anchor="t">
+            <a:spAutoFit/>
+          </a:bodyPr>
+          <a:lstStyle/>
+          <a:p>
+            <a:pPr marL="0" indent="0" rtl="0" algn="l" defTabSz="914400" eaLnBrk="1" latinLnBrk="0" hangingPunct="1">
+              <a:buFontTx/>
+              <a:buNone/>
+            </a:pPr>
             <a:r>
               <a:rPr lang="ko-KR" sz="1800" b="1">
                 <a:solidFill>
@@ -10641,7 +10586,7 @@
                 <a:latin typeface="맑은 고딕" charset="0"/>
                 <a:ea typeface="맑은 고딕" charset="0"/>
               </a:rPr>
-              <a:t>5</a:t>
+              <a:t>36</a:t>
             </a:r>
             <a:r>
               <a:rPr sz="1800" b="1">
@@ -10658,6 +10603,34 @@
                 <a:latin typeface="맑은 고딕" charset="0"/>
                 <a:ea typeface="맑은 고딕" charset="0"/>
               </a:rPr>
+              <a:t> 이제</a:t>
+            </a:r>
+            <a:r>
+              <a:rPr lang="ko-KR" sz="1800">
+                <a:latin typeface="맑은 고딕" charset="0"/>
+                <a:ea typeface="맑은 고딕" charset="0"/>
+              </a:rPr>
+              <a:t> Ch14_nonPBR </a:t>
+            </a:r>
+            <a:r>
+              <a:rPr lang="ko-KR" sz="1800">
+                <a:latin typeface="맑은 고딕" charset="0"/>
+                <a:ea typeface="맑은 고딕" charset="0"/>
+              </a:rPr>
+              <a:t>오브젝트에 </a:t>
+            </a:r>
+            <a:r>
+              <a:rPr lang="ko-KR" sz="1800">
+                <a:latin typeface="맑은 고딕" charset="0"/>
+                <a:ea typeface="맑은 고딕" charset="0"/>
+              </a:rPr>
+              <a:t>있는</a:t>
+            </a:r>
+            <a:r>
+              <a:rPr lang="ko-KR" sz="1800">
+                <a:latin typeface="맑은 고딕" charset="0"/>
+                <a:ea typeface="맑은 고딕" charset="0"/>
+              </a:rPr>
               <a:t> </a:t>
             </a:r>
             <a:r>
@@ -10665,28 +10638,28 @@
                 <a:latin typeface="맑은 고딕" charset="0"/>
                 <a:ea typeface="맑은 고딕" charset="0"/>
               </a:rPr>
-              <a:t>그런 다음</a:t>
-            </a:r>
-            <a:r>
-              <a:rPr lang="ko-KR" sz="1800">
-                <a:latin typeface="맑은 고딕" charset="0"/>
-                <a:ea typeface="맑은 고딕" charset="0"/>
-              </a:rPr>
-              <a:t> Data Manager </a:t>
-            </a:r>
-            <a:r>
-              <a:rPr lang="ko-KR" sz="1800">
-                <a:latin typeface="맑은 고딕" charset="0"/>
-                <a:ea typeface="맑은 고딕" charset="0"/>
-              </a:rPr>
-              <a:t>오브젝트의 </a:t>
-            </a:r>
-            <a:r>
-              <a:rPr lang="ko-KR" sz="1800">
-                <a:latin typeface="맑은 고딕" charset="0"/>
-                <a:ea typeface="맑은 고딕" charset="0"/>
-              </a:rPr>
-              <a:t>Transform을 초기화합니다.</a:t>
+              <a:t>Animator의 Culling Mode를 Cull </a:t>
+            </a:r>
+            <a:r>
+              <a:rPr lang="ko-KR" sz="1800">
+                <a:latin typeface="맑은 고딕" charset="0"/>
+                <a:ea typeface="맑은 고딕" charset="0"/>
+              </a:rPr>
+              <a:t>C</a:t>
+            </a:r>
+            <a:r>
+              <a:rPr lang="ko-KR" sz="1800">
+                <a:latin typeface="맑은 고딕" charset="0"/>
+                <a:ea typeface="맑은 고딕" charset="0"/>
+              </a:rPr>
+              <a:t>ompletely</a:t>
+            </a:r>
+            <a:r>
+              <a:rPr lang="ko-KR" sz="1800">
+                <a:latin typeface="맑은 고딕" charset="0"/>
+                <a:ea typeface="맑은 고딕" charset="0"/>
+              </a:rPr>
+              <a:t>로</a:t>
             </a:r>
             <a:r>
               <a:rPr lang="ko-KR" sz="1800">
@@ -10694,6 +10667,13 @@
                 <a:ea typeface="맑은 고딕" charset="0"/>
               </a:rPr>
               <a:t> </a:t>
+            </a:r>
+            <a:r>
+              <a:rPr lang="ko-KR" sz="1800">
+                <a:latin typeface="맑은 고딕" charset="0"/>
+                <a:ea typeface="맑은 고딕" charset="0"/>
+              </a:rPr>
+              <a:t>설정합니다.</a:t>
             </a:r>
             <a:endParaRPr lang="ko-KR" altLang="en-US" sz="1800">
               <a:latin typeface="맑은 고딕" charset="0"/>
@@ -10726,7 +10706,7 @@
 </file>
 
 <file path=ppt/slides/slide15.xml><?xml version="1.0" encoding="utf-8"?>
-<p:sld xmlns:a="http://schemas.openxmlformats.org/drawingml/2006/main" xmlns:r="http://schemas.openxmlformats.org/officeDocument/2006/relationships" xmlns:p="http://schemas.openxmlformats.org/presentationml/2006/main" xmlns:p14="http://schemas.microsoft.com/office/powerpoint/2010/main">
+<p:sld xmlns:a="http://schemas.openxmlformats.org/drawingml/2006/main" xmlns:r="http://schemas.openxmlformats.org/officeDocument/2006/relationships" xmlns:p="http://schemas.openxmlformats.org/presentationml/2006/main">
   <p:cSld>
     <p:spTree>
       <p:nvGrpSpPr>
@@ -10752,8 +10732,8 @@
         </p:nvSpPr>
         <p:spPr>
           <a:xfrm rot="0">
-            <a:off x="4107815" y="444500"/>
-            <a:ext cx="3988435" cy="554990"/>
+            <a:off x="4332605" y="386715"/>
+            <a:ext cx="3539490" cy="554990"/>
           </a:xfrm>
           <a:prstGeom prst="rect"/>
           <a:noFill/>
@@ -10768,30 +10748,30 @@
           </a:bodyPr>
           <a:lstStyle/>
           <a:p>
-            <a:pPr marL="0" indent="0" algn="l" latinLnBrk="0" hangingPunct="1">
-              <a:buFontTx/>
-              <a:buNone/>
-            </a:pPr>
+            <a:pPr marL="0" indent="0" algn="ctr" latinLnBrk="0" hangingPunct="1">
+              <a:buFontTx/>
+              <a:buNone/>
+            </a:pPr>
+            <a:r>
+              <a:rPr lang="ko-KR" sz="2500" b="1">
+                <a:latin typeface="나눔바른고딕" charset="0"/>
+                <a:ea typeface="나눔바른고딕" charset="0"/>
+              </a:rPr>
+              <a:t>열다섯</a:t>
+            </a:r>
+            <a:r>
+              <a:rPr lang="ko-KR" sz="2500" b="1">
+                <a:latin typeface="나눔바른고딕" charset="0"/>
+                <a:ea typeface="나눔바른고딕" charset="0"/>
+              </a:rPr>
+              <a:t> 번째 튜토리얼</a:t>
+            </a:r>
             <a:r>
               <a:rPr lang="ko-KR" sz="3000" b="1">
                 <a:latin typeface="맑은 고딕" charset="0"/>
                 <a:ea typeface="맑은 고딕" charset="0"/>
               </a:rPr>
-              <a:t>열</a:t>
-            </a:r>
-            <a:r>
-              <a:rPr lang="ko-KR" sz="3000" b="1">
-                <a:latin typeface="맑은 고딕" charset="0"/>
-                <a:ea typeface="맑은 고딕" charset="0"/>
-              </a:rPr>
-              <a:t>다섯</a:t>
-            </a:r>
-            <a:r>
-              <a:rPr lang="ko-KR" sz="3000" b="1">
-                <a:latin typeface="맑은 고딕" charset="0"/>
-                <a:ea typeface="맑은 고딕" charset="0"/>
-              </a:rPr>
-              <a:t> 번째 튜토리얼 </a:t>
+              <a:t> </a:t>
             </a:r>
             <a:endParaRPr lang="ko-KR" altLang="en-US" sz="3000" b="1">
               <a:latin typeface="맑은 고딕" charset="0"/>
@@ -10802,7 +10782,7 @@
       </p:sp>
       <p:sp>
         <p:nvSpPr>
-          <p:cNvPr id="54" name="Rect 0"/>
+          <p:cNvPr id="103" name="Rect 0"/>
           <p:cNvSpPr txBox="1">
             <a:spLocks/>
           </p:cNvSpPr>
@@ -10810,8 +10790,8 @@
         </p:nvSpPr>
         <p:spPr>
           <a:xfrm rot="0">
-            <a:off x="6817360" y="5335270"/>
-            <a:ext cx="4349115" cy="923925"/>
+            <a:off x="1221105" y="2799715"/>
+            <a:ext cx="4148455" cy="923925"/>
           </a:xfrm>
           <a:prstGeom prst="rect"/>
           <a:noFill/>
@@ -10838,17 +10818,7 @@
                 <a:latin typeface="맑은 고딕" charset="0"/>
                 <a:ea typeface="맑은 고딕" charset="0"/>
               </a:rPr>
-              <a:t>3</a:t>
-            </a:r>
-            <a:r>
-              <a:rPr lang="ko-KR" sz="1800" b="1">
-                <a:solidFill>
-                  <a:srgbClr val="0611F2"/>
-                </a:solidFill>
-                <a:latin typeface="맑은 고딕" charset="0"/>
-                <a:ea typeface="맑은 고딕" charset="0"/>
-              </a:rPr>
-              <a:t>8</a:t>
+              <a:t>37</a:t>
             </a:r>
             <a:r>
               <a:rPr sz="1800" b="1">
@@ -10865,6 +10835,27 @@
                 <a:latin typeface="맑은 고딕" charset="0"/>
                 <a:ea typeface="맑은 고딕" charset="0"/>
               </a:rPr>
+              <a:t> 그리고</a:t>
+            </a:r>
+            <a:r>
+              <a:rPr lang="ko-KR" sz="1800">
+                <a:latin typeface="맑은 고딕" charset="0"/>
+                <a:ea typeface="맑은 고딕" charset="0"/>
+              </a:rPr>
+              <a:t> Animator Manager </a:t>
+            </a:r>
+            <a:r>
+              <a:rPr lang="ko-KR" sz="1800">
+                <a:latin typeface="맑은 고딕" charset="0"/>
+                <a:ea typeface="맑은 고딕" charset="0"/>
+              </a:rPr>
+              <a:t>오브젝트의</a:t>
+            </a:r>
+            <a:r>
+              <a:rPr lang="ko-KR" sz="1800">
+                <a:latin typeface="맑은 고딕" charset="0"/>
+                <a:ea typeface="맑은 고딕" charset="0"/>
+              </a:rPr>
               <a:t> </a:t>
             </a:r>
             <a:r>
@@ -10872,42 +10863,21 @@
                 <a:latin typeface="맑은 고딕" charset="0"/>
                 <a:ea typeface="맑은 고딕" charset="0"/>
               </a:rPr>
-              <a:t>그</a:t>
-            </a:r>
-            <a:r>
-              <a:rPr lang="ko-KR" sz="1800">
-                <a:latin typeface="맑은 고딕" charset="0"/>
-                <a:ea typeface="맑은 고딕" charset="0"/>
-              </a:rPr>
-              <a:t>리고</a:t>
-            </a:r>
-            <a:r>
-              <a:rPr lang="ko-KR" sz="1800">
-                <a:latin typeface="맑은 고딕" charset="0"/>
-                <a:ea typeface="맑은 고딕" charset="0"/>
-              </a:rPr>
-              <a:t> Animation</a:t>
-            </a:r>
-            <a:r>
-              <a:rPr lang="ko-KR" sz="1800">
-                <a:latin typeface="맑은 고딕" charset="0"/>
-                <a:ea typeface="맑은 고딕" charset="0"/>
-              </a:rPr>
-              <a:t> </a:t>
-            </a:r>
-            <a:r>
-              <a:rPr lang="ko-KR" sz="1800">
-                <a:latin typeface="맑은 고딕" charset="0"/>
-                <a:ea typeface="맑은 고딕" charset="0"/>
-              </a:rPr>
-              <a:t>Speed</a:t>
-            </a:r>
-            <a:r>
-              <a:rPr lang="ko-KR" sz="1800">
-                <a:latin typeface="맑은 고딕" charset="0"/>
-                <a:ea typeface="맑은 고딕" charset="0"/>
-              </a:rPr>
-              <a:t> Button의 이미지에 Texture 폴더에 있는 Switch Button 텍스처를 넣어줍니다.</a:t>
+              <a:t>위치와 회전 값을 </a:t>
+            </a:r>
+            <a:r>
+              <a:rPr lang="ko-KR" sz="1800">
+                <a:latin typeface="맑은 고딕" charset="0"/>
+                <a:ea typeface="맑은 고딕" charset="0"/>
+              </a:rPr>
+              <a:t>초기화합니</a:t>
+            </a:r>
+            <a:r>
+              <a:rPr lang="ko-KR" sz="1800">
+                <a:latin typeface="맑은 고딕" charset="0"/>
+                <a:ea typeface="맑은 고딕" charset="0"/>
+              </a:rPr>
+              <a:t>다.</a:t>
             </a:r>
             <a:endParaRPr lang="ko-KR" altLang="en-US" sz="1800">
               <a:latin typeface="맑은 고딕" charset="0"/>
@@ -10918,7 +10888,7 @@
       </p:sp>
       <p:sp>
         <p:nvSpPr>
-          <p:cNvPr id="106" name="Rect 0"/>
+          <p:cNvPr id="109" name="Rect 0"/>
           <p:cNvSpPr txBox="1">
             <a:spLocks/>
           </p:cNvSpPr>
@@ -10926,8 +10896,8 @@
         </p:nvSpPr>
         <p:spPr>
           <a:xfrm rot="0">
-            <a:off x="1116965" y="3956685"/>
-            <a:ext cx="4277995" cy="2308225"/>
+            <a:off x="1229995" y="5288280"/>
+            <a:ext cx="4156710" cy="923925"/>
           </a:xfrm>
           <a:prstGeom prst="rect"/>
           <a:noFill/>
@@ -10954,8 +10924,132 @@
                 <a:latin typeface="맑은 고딕" charset="0"/>
                 <a:ea typeface="맑은 고딕" charset="0"/>
               </a:rPr>
-              <a:t>3</a:t>
-            </a:r>
+              <a:t>38</a:t>
+            </a:r>
+            <a:r>
+              <a:rPr sz="1800" b="1">
+                <a:solidFill>
+                  <a:srgbClr val="0611F2"/>
+                </a:solidFill>
+                <a:latin typeface="맑은 고딕" charset="0"/>
+                <a:ea typeface="맑은 고딕" charset="0"/>
+              </a:rPr>
+              <a:t>.</a:t>
+            </a:r>
+            <a:r>
+              <a:rPr sz="1800">
+                <a:latin typeface="맑은 고딕" charset="0"/>
+                <a:ea typeface="맑은 고딕" charset="0"/>
+              </a:rPr>
+              <a:t> 그다음</a:t>
+            </a:r>
+            <a:r>
+              <a:rPr lang="ko-KR" sz="1800">
+                <a:latin typeface="맑은 고딕" charset="0"/>
+                <a:ea typeface="맑은 고딕" charset="0"/>
+              </a:rPr>
+              <a:t> Ch19_nonPBR </a:t>
+            </a:r>
+            <a:r>
+              <a:rPr lang="ko-KR" sz="1800">
+                <a:latin typeface="맑은 고딕" charset="0"/>
+                <a:ea typeface="맑은 고딕" charset="0"/>
+              </a:rPr>
+              <a:t>오브젝트에 </a:t>
+            </a:r>
+            <a:r>
+              <a:rPr lang="ko-KR" sz="1800">
+                <a:latin typeface="맑은 고딕" charset="0"/>
+                <a:ea typeface="맑은 고딕" charset="0"/>
+              </a:rPr>
+              <a:t>있는</a:t>
+            </a:r>
+            <a:r>
+              <a:rPr lang="ko-KR" sz="1800">
+                <a:latin typeface="맑은 고딕" charset="0"/>
+                <a:ea typeface="맑은 고딕" charset="0"/>
+              </a:rPr>
+              <a:t> </a:t>
+            </a:r>
+            <a:r>
+              <a:rPr lang="ko-KR" sz="1800">
+                <a:latin typeface="맑은 고딕" charset="0"/>
+                <a:ea typeface="맑은 고딕" charset="0"/>
+              </a:rPr>
+              <a:t>Animator의 Culling Mode를 Cull </a:t>
+            </a:r>
+            <a:r>
+              <a:rPr lang="ko-KR" sz="1800">
+                <a:latin typeface="맑은 고딕" charset="0"/>
+                <a:ea typeface="맑은 고딕" charset="0"/>
+              </a:rPr>
+              <a:t>C</a:t>
+            </a:r>
+            <a:r>
+              <a:rPr lang="ko-KR" sz="1800">
+                <a:latin typeface="맑은 고딕" charset="0"/>
+                <a:ea typeface="맑은 고딕" charset="0"/>
+              </a:rPr>
+              <a:t>ompletely</a:t>
+            </a:r>
+            <a:r>
+              <a:rPr lang="ko-KR" sz="1800">
+                <a:latin typeface="맑은 고딕" charset="0"/>
+                <a:ea typeface="맑은 고딕" charset="0"/>
+              </a:rPr>
+              <a:t>로</a:t>
+            </a:r>
+            <a:r>
+              <a:rPr lang="ko-KR" sz="1800">
+                <a:latin typeface="맑은 고딕" charset="0"/>
+                <a:ea typeface="맑은 고딕" charset="0"/>
+              </a:rPr>
+              <a:t> </a:t>
+            </a:r>
+            <a:r>
+              <a:rPr lang="ko-KR" sz="1800">
+                <a:latin typeface="맑은 고딕" charset="0"/>
+                <a:ea typeface="맑은 고딕" charset="0"/>
+              </a:rPr>
+              <a:t>설정합니다.</a:t>
+            </a:r>
+            <a:endParaRPr lang="ko-KR" altLang="en-US" sz="1800">
+              <a:latin typeface="맑은 고딕" charset="0"/>
+              <a:ea typeface="맑은 고딕" charset="0"/>
+            </a:endParaRPr>
+          </a:p>
+        </p:txBody>
+      </p:sp>
+      <p:sp>
+        <p:nvSpPr>
+          <p:cNvPr id="115" name="Rect 0"/>
+          <p:cNvSpPr txBox="1">
+            <a:spLocks/>
+          </p:cNvSpPr>
+          <p:nvPr/>
+        </p:nvSpPr>
+        <p:spPr>
+          <a:xfrm rot="0">
+            <a:off x="6814820" y="5293995"/>
+            <a:ext cx="4148455" cy="923925"/>
+          </a:xfrm>
+          <a:prstGeom prst="rect"/>
+          <a:noFill/>
+          <a:ln w="0">
+            <a:noFill/>
+            <a:prstDash/>
+          </a:ln>
+        </p:spPr>
+        <p:txBody>
+          <a:bodyPr wrap="square" lIns="89535" tIns="46355" rIns="89535" bIns="46355" numCol="1" vert="horz" anchor="t">
+            <a:spAutoFit/>
+          </a:bodyPr>
+          <a:lstStyle/>
+          <a:p>
+            <a:pPr marL="0" indent="0" rtl="0" algn="l" defTabSz="914400" eaLnBrk="1" latinLnBrk="0" hangingPunct="1">
+              <a:buFontTx/>
+              <a:buNone/>
+            </a:pPr>
             <a:r>
               <a:rPr lang="ko-KR" sz="1800" b="1">
                 <a:solidFill>
@@ -10964,7 +11058,17 @@
                 <a:latin typeface="맑은 고딕" charset="0"/>
                 <a:ea typeface="맑은 고딕" charset="0"/>
               </a:rPr>
-              <a:t>7</a:t>
+              <a:t>4</a:t>
+            </a:r>
+            <a:r>
+              <a:rPr lang="ko-KR" sz="1800" b="1">
+                <a:solidFill>
+                  <a:srgbClr val="0611F2"/>
+                </a:solidFill>
+                <a:latin typeface="맑은 고딕" charset="0"/>
+                <a:ea typeface="맑은 고딕" charset="0"/>
+              </a:rPr>
+              <a:t>0</a:t>
             </a:r>
             <a:r>
               <a:rPr sz="1800" b="1">
@@ -10981,62 +11085,56 @@
                 <a:latin typeface="맑은 고딕" charset="0"/>
                 <a:ea typeface="맑은 고딕" charset="0"/>
               </a:rPr>
-              <a:t> </a:t>
-            </a:r>
-            <a:r>
-              <a:rPr lang="ko-KR" sz="1800">
-                <a:latin typeface="맑은 고딕" charset="0"/>
-                <a:ea typeface="맑은 고딕" charset="0"/>
-              </a:rPr>
-              <a:t>마지막으로 함수를 호출할 때마다 data 클래스에 있는 speed 변수의 값을 증가시키고 10보다 크거나 같아졌을 때 다시 1로 초기화합니다.</a:t>
+              <a:t> 그러고 나서</a:t>
+            </a:r>
+            <a:r>
+              <a:rPr lang="ko-KR" sz="1800">
+                <a:latin typeface="맑은 고딕" charset="0"/>
+                <a:ea typeface="맑은 고딕" charset="0"/>
+              </a:rPr>
+              <a:t> Character Culling </a:t>
+            </a:r>
+            <a:r>
+              <a:rPr lang="ko-KR" sz="1800">
+                <a:latin typeface="맑은 고딕" charset="0"/>
+                <a:ea typeface="맑은 고딕" charset="0"/>
+              </a:rPr>
+              <a:t>Button</a:t>
+            </a:r>
+            <a:r>
+              <a:rPr lang="ko-KR" sz="1800">
+                <a:latin typeface="맑은 고딕" charset="0"/>
+                <a:ea typeface="맑은 고딕" charset="0"/>
+              </a:rPr>
+              <a:t> 오브젝트의 On Click( ) 함수를 </a:t>
+            </a:r>
+            <a:r>
+              <a:rPr lang="ko-KR" sz="1800">
+                <a:latin typeface="맑은 고딕" charset="0"/>
+                <a:ea typeface="맑은 고딕" charset="0"/>
+              </a:rPr>
+              <a:t>추가합니다.</a:t>
             </a:r>
             <a:endParaRPr lang="ko-KR" altLang="en-US" sz="1800">
               <a:latin typeface="맑은 고딕" charset="0"/>
               <a:ea typeface="맑은 고딕" charset="0"/>
             </a:endParaRPr>
           </a:p>
-          <a:p>
-            <a:pPr marL="0" indent="0" rtl="0" algn="l" defTabSz="914400" eaLnBrk="1" latinLnBrk="0" hangingPunct="1">
-              <a:buFontTx/>
-              <a:buNone/>
-            </a:pPr>
-            <a:endParaRPr lang="ko-KR" altLang="en-US" sz="1800">
-              <a:latin typeface="맑은 고딕" charset="0"/>
-              <a:ea typeface="맑은 고딕" charset="0"/>
-            </a:endParaRPr>
-          </a:p>
-          <a:p>
-            <a:pPr marL="0" indent="0" rtl="0" algn="l" defTabSz="914400" eaLnBrk="1" latinLnBrk="0" hangingPunct="1">
-              <a:buFontTx/>
-              <a:buNone/>
-            </a:pPr>
-            <a:r>
-              <a:rPr lang="ko-KR" sz="1800">
-                <a:latin typeface="맑은 고딕" charset="0"/>
-                <a:ea typeface="맑은 고딕" charset="0"/>
-              </a:rPr>
-              <a:t>그런 다음 data 클래스의 speed를 10으로 나누어 애니메이션의 속도로 설정합니다.</a:t>
-            </a:r>
-            <a:endParaRPr lang="ko-KR" altLang="en-US" sz="1800">
-              <a:latin typeface="맑은 고딕" charset="0"/>
-              <a:ea typeface="맑은 고딕" charset="0"/>
-            </a:endParaRPr>
-          </a:p>
         </p:txBody>
       </p:sp>
       <p:pic>
         <p:nvPicPr>
-          <p:cNvPr id="109" name="그림 7" descr="C:/Users/Admin1/AppData/Roaming/PolarisOffice/ETemp/20852_9486176/fImage80712926334.png"/>
+          <p:cNvPr id="116" name="그림 33" descr="C:/Users/Admin1/AppData/Roaming/PolarisOffice/ETemp/25668_19456376/fImage122043479358.png"/>
           <p:cNvPicPr>
             <a:picLocks noChangeAspect="1"/>
           </p:cNvPicPr>
           <p:nvPr/>
         </p:nvPicPr>
         <p:blipFill rotWithShape="1">
-          <a:blip r:embed="rId2" cstate="hqprint">
+          <a:blip r:embed="rId2" cstate="print">
             <a:extLst>
               <a:ext uri="{28A0092B-C50C-407E-A947-70E740481C1C}">
-                <a14:useLocalDpi xmlns:a14="http://schemas.microsoft.com/office/drawing/2010/main"/>
+                <a14:useLocalDpi xmlns:a14="http://schemas.microsoft.com/office/drawing/2010/main" val="0"/>
               </a:ext>
             </a:extLst>
           </a:blip>
@@ -11046,16 +11144,18 @@
         </p:blipFill>
         <p:spPr>
           <a:xfrm rot="0">
-            <a:off x="1115060" y="1400810"/>
-            <a:ext cx="4274185" cy="2414905"/>
-          </a:xfrm>
-          <a:prstGeom prst="rect"/>
-          <a:noFill/>
+            <a:off x="1229995" y="1454785"/>
+            <a:ext cx="4148455" cy="1238885"/>
+          </a:xfrm>
+          <a:prstGeom prst="roundRect"/>
+          <a:solidFill>
+            <a:srgbClr val="EDEDED"/>
+          </a:solidFill>
         </p:spPr>
       </p:pic>
       <p:pic>
         <p:nvPicPr>
-          <p:cNvPr id="110" name="그림 9"/>
+          <p:cNvPr id="117" name="그림 36" descr="C:/Users/Admin1/AppData/Roaming/PolarisOffice/ETemp/25668_19456376/fImage189593486962.png"/>
           <p:cNvPicPr>
             <a:picLocks noChangeAspect="1"/>
           </p:cNvPicPr>
@@ -11075,8 +11175,8 @@
         </p:blipFill>
         <p:spPr>
           <a:xfrm rot="0">
-            <a:off x="6831965" y="4264025"/>
-            <a:ext cx="4338320" cy="1029970"/>
+            <a:off x="1229995" y="3844925"/>
+            <a:ext cx="4156710" cy="1334135"/>
           </a:xfrm>
           <a:prstGeom prst="roundRect"/>
           <a:solidFill>
@@ -11086,14 +11186,45 @@
       </p:pic>
       <p:pic>
         <p:nvPicPr>
-          <p:cNvPr id="111" name="그림 12"/>
+          <p:cNvPr id="118" name="그림 40" descr="C:/Users/Admin1/AppData/Roaming/PolarisOffice/ETemp/25668_19456376/fImage30173514464.png"/>
           <p:cNvPicPr>
             <a:picLocks noChangeAspect="1"/>
           </p:cNvPicPr>
           <p:nvPr/>
         </p:nvPicPr>
         <p:blipFill rotWithShape="1">
-          <a:blip r:embed="rId4" cstate="print">
+          <a:blip r:embed="rId4" cstate="hqprint">
+            <a:extLst>
+              <a:ext uri="{28A0092B-C50C-407E-A947-70E740481C1C}">
+                <a14:useLocalDpi xmlns:a14="http://schemas.microsoft.com/office/drawing/2010/main"/>
+              </a:ext>
+            </a:extLst>
+          </a:blip>
+          <a:stretch>
+            <a:fillRect/>
+          </a:stretch>
+        </p:blipFill>
+        <p:spPr>
+          <a:xfrm rot="0">
+            <a:off x="8200390" y="1454785"/>
+            <a:ext cx="2763520" cy="1282065"/>
+          </a:xfrm>
+          <a:prstGeom prst="roundRect"/>
+          <a:solidFill>
+            <a:srgbClr val="EDEDED"/>
+          </a:solidFill>
+        </p:spPr>
+      </p:pic>
+      <p:pic>
+        <p:nvPicPr>
+          <p:cNvPr id="119" name="그림 41" descr="C:/Users/Admin1/AppData/Roaming/PolarisOffice/ETemp/25668_19456376/fImage121193525705.png"/>
+          <p:cNvPicPr>
+            <a:picLocks noChangeAspect="1"/>
+          </p:cNvPicPr>
+          <p:nvPr/>
+        </p:nvPicPr>
+        <p:blipFill rotWithShape="1">
+          <a:blip r:embed="rId5" cstate="print">
             <a:extLst>
               <a:ext uri="{28A0092B-C50C-407E-A947-70E740481C1C}">
                 <a14:useLocalDpi xmlns:a14="http://schemas.microsoft.com/office/drawing/2010/main" val="0"/>
@@ -11106,8 +11237,8 @@
         </p:blipFill>
         <p:spPr>
           <a:xfrm rot="0">
-            <a:off x="6823710" y="1374775"/>
-            <a:ext cx="4342765" cy="2699385"/>
+            <a:off x="6814820" y="1454785"/>
+            <a:ext cx="1282065" cy="1287780"/>
           </a:xfrm>
           <a:prstGeom prst="roundRect"/>
           <a:solidFill>
@@ -11115,39 +11246,167 @@
           </a:solidFill>
         </p:spPr>
       </p:pic>
-      <p:cxnSp>
-        <p:nvCxnSpPr>
-          <p:cNvPr id="112" name="도형 15"/>
-          <p:cNvCxnSpPr/>
+      <p:sp>
+        <p:nvSpPr>
+          <p:cNvPr id="120" name="텍스트 상자 44"/>
+          <p:cNvSpPr txBox="1">
+            <a:spLocks/>
+          </p:cNvSpPr>
           <p:nvPr/>
-        </p:nvCxnSpPr>
-        <p:spPr>
-          <a:xfrm rot="0" flipV="1">
-            <a:off x="10854055" y="1807845"/>
-            <a:ext cx="208280" cy="2681605"/>
-          </a:xfrm>
-          <a:prstGeom prst="straightConnector1"/>
-          <a:ln w="6350" cap="flat" cmpd="sng">
+        </p:nvSpPr>
+        <p:spPr>
+          <a:xfrm rot="0">
+            <a:off x="6823075" y="2854325"/>
+            <a:ext cx="4140200" cy="923925"/>
+          </a:xfrm>
+          <a:prstGeom prst="rect"/>
+          <a:noFill/>
+          <a:ln w="0">
+            <a:noFill/>
             <a:prstDash/>
-            <a:headEnd type="none" w="med" len="med"/>
-            <a:tailEnd type="triangle" w="med" len="med"/>
           </a:ln>
         </p:spPr>
-        <p:style>
-          <a:lnRef idx="1">
-            <a:schemeClr val="accent1"/>
-          </a:lnRef>
-          <a:fillRef idx="0">
-            <a:schemeClr val="accent1"/>
-          </a:fillRef>
-          <a:effectRef idx="0">
-            <a:schemeClr val="accent1"/>
-          </a:effectRef>
-          <a:fontRef idx="minor">
-            <a:schemeClr val="tx1"/>
-          </a:fontRef>
-        </p:style>
-      </p:cxnSp>
+        <p:txBody>
+          <a:bodyPr wrap="square" lIns="89535" tIns="46355" rIns="89535" bIns="46355" numCol="1" vert="horz" anchor="t">
+            <a:spAutoFit/>
+          </a:bodyPr>
+          <a:lstStyle/>
+          <a:p>
+            <a:pPr marL="0" indent="0" rtl="0" algn="l" defTabSz="914400" eaLnBrk="1" latinLnBrk="0" hangingPunct="1">
+              <a:buFontTx/>
+              <a:buNone/>
+            </a:pPr>
+            <a:r>
+              <a:rPr lang="ko-KR" sz="1800" b="1">
+                <a:solidFill>
+                  <a:srgbClr val="0611F2"/>
+                </a:solidFill>
+                <a:latin typeface="맑은 고딕" charset="0"/>
+                <a:ea typeface="맑은 고딕" charset="0"/>
+              </a:rPr>
+              <a:t>39</a:t>
+            </a:r>
+            <a:r>
+              <a:rPr sz="1800" b="1">
+                <a:solidFill>
+                  <a:srgbClr val="0611F2"/>
+                </a:solidFill>
+                <a:latin typeface="맑은 고딕" charset="0"/>
+                <a:ea typeface="맑은 고딕" charset="0"/>
+              </a:rPr>
+              <a:t>.</a:t>
+            </a:r>
+            <a:r>
+              <a:rPr sz="1800">
+                <a:latin typeface="맑은 고딕" charset="0"/>
+                <a:ea typeface="맑은 고딕" charset="0"/>
+              </a:rPr>
+              <a:t> 그런 다음</a:t>
+            </a:r>
+            <a:r>
+              <a:rPr lang="ko-KR" sz="1800">
+                <a:latin typeface="맑은 고딕" charset="0"/>
+                <a:ea typeface="맑은 고딕" charset="0"/>
+              </a:rPr>
+              <a:t> Animation Speed </a:t>
+            </a:r>
+            <a:r>
+              <a:rPr lang="ko-KR" sz="1800">
+                <a:latin typeface="맑은 고딕" charset="0"/>
+                <a:ea typeface="맑은 고딕" charset="0"/>
+              </a:rPr>
+              <a:t>Button</a:t>
+            </a:r>
+            <a:r>
+              <a:rPr lang="ko-KR" sz="1800">
+                <a:latin typeface="맑은 고딕" charset="0"/>
+                <a:ea typeface="맑은 고딕" charset="0"/>
+              </a:rPr>
+              <a:t> </a:t>
+            </a:r>
+            <a:r>
+              <a:rPr lang="ko-KR" sz="1800">
+                <a:latin typeface="맑은 고딕" charset="0"/>
+                <a:ea typeface="맑은 고딕" charset="0"/>
+              </a:rPr>
+              <a:t>오브젝트의 On Click( ) 함수를 </a:t>
+            </a:r>
+            <a:r>
+              <a:rPr lang="ko-KR" sz="1800">
+                <a:latin typeface="맑은 고딕" charset="0"/>
+                <a:ea typeface="맑은 고딕" charset="0"/>
+              </a:rPr>
+              <a:t>추가합니다.</a:t>
+            </a:r>
+            <a:endParaRPr lang="ko-KR" altLang="en-US" sz="1800">
+              <a:latin typeface="맑은 고딕" charset="0"/>
+              <a:ea typeface="맑은 고딕" charset="0"/>
+            </a:endParaRPr>
+          </a:p>
+        </p:txBody>
+      </p:sp>
+      <p:pic>
+        <p:nvPicPr>
+          <p:cNvPr id="121" name="그림 45" descr="C:/Users/Admin1/AppData/Roaming/PolarisOffice/ETemp/25668_19456376/fImage120483548145.png"/>
+          <p:cNvPicPr>
+            <a:picLocks noChangeAspect="1"/>
+          </p:cNvPicPr>
+          <p:nvPr/>
+        </p:nvPicPr>
+        <p:blipFill rotWithShape="1">
+          <a:blip r:embed="rId6" cstate="print">
+            <a:extLst>
+              <a:ext uri="{28A0092B-C50C-407E-A947-70E740481C1C}">
+                <a14:useLocalDpi xmlns:a14="http://schemas.microsoft.com/office/drawing/2010/main" val="0"/>
+              </a:ext>
+            </a:extLst>
+          </a:blip>
+          <a:stretch>
+            <a:fillRect/>
+          </a:stretch>
+        </p:blipFill>
+        <p:spPr>
+          <a:xfrm rot="0">
+            <a:off x="6823710" y="3904615"/>
+            <a:ext cx="1264920" cy="1282700"/>
+          </a:xfrm>
+          <a:prstGeom prst="roundRect"/>
+          <a:solidFill>
+            <a:srgbClr val="EDEDED"/>
+          </a:solidFill>
+        </p:spPr>
+      </p:pic>
+      <p:pic>
+        <p:nvPicPr>
+          <p:cNvPr id="122" name="그림 48" descr="C:/Users/Admin1/AppData/Roaming/PolarisOffice/ETemp/25668_19456376/fImage30173553281.png"/>
+          <p:cNvPicPr>
+            <a:picLocks noChangeAspect="1"/>
+          </p:cNvPicPr>
+          <p:nvPr/>
+        </p:nvPicPr>
+        <p:blipFill rotWithShape="1">
+          <a:blip r:embed="rId7" cstate="hqprint">
+            <a:extLst>
+              <a:ext uri="{28A0092B-C50C-407E-A947-70E740481C1C}">
+                <a14:useLocalDpi xmlns:a14="http://schemas.microsoft.com/office/drawing/2010/main"/>
+              </a:ext>
+            </a:extLst>
+          </a:blip>
+          <a:stretch>
+            <a:fillRect/>
+          </a:stretch>
+        </p:blipFill>
+        <p:spPr>
+          <a:xfrm rot="0">
+            <a:off x="8200390" y="3905250"/>
+            <a:ext cx="2762885" cy="1292860"/>
+          </a:xfrm>
+          <a:prstGeom prst="roundRect"/>
+          <a:solidFill>
+            <a:srgbClr val="EDEDED"/>
+          </a:solidFill>
+        </p:spPr>
+      </p:pic>
     </p:spTree>
   </p:cSld>
   <p:clrMapOvr>
@@ -11198,8 +11457,8 @@
         </p:nvSpPr>
         <p:spPr>
           <a:xfrm rot="0">
-            <a:off x="4107815" y="444500"/>
-            <a:ext cx="3988435" cy="554990"/>
+            <a:off x="4107815" y="367030"/>
+            <a:ext cx="3990340" cy="554990"/>
           </a:xfrm>
           <a:prstGeom prst="rect"/>
           <a:noFill/>
@@ -11214,30 +11473,30 @@
           </a:bodyPr>
           <a:lstStyle/>
           <a:p>
-            <a:pPr marL="0" indent="0" algn="l" latinLnBrk="0" hangingPunct="1">
-              <a:buFontTx/>
-              <a:buNone/>
-            </a:pPr>
+            <a:pPr marL="0" indent="0" algn="ctr" latinLnBrk="0" hangingPunct="1">
+              <a:buFontTx/>
+              <a:buNone/>
+            </a:pPr>
+            <a:r>
+              <a:rPr lang="ko-KR" sz="2500" b="1">
+                <a:latin typeface="나눔바른고딕" charset="0"/>
+                <a:ea typeface="나눔바른고딕" charset="0"/>
+              </a:rPr>
+              <a:t>열여섯</a:t>
+            </a:r>
+            <a:r>
+              <a:rPr lang="ko-KR" sz="2500" b="1">
+                <a:latin typeface="나눔바른고딕" charset="0"/>
+                <a:ea typeface="나눔바른고딕" charset="0"/>
+              </a:rPr>
+              <a:t> 번째 튜토리얼</a:t>
+            </a:r>
             <a:r>
               <a:rPr lang="ko-KR" sz="3000" b="1">
                 <a:latin typeface="맑은 고딕" charset="0"/>
                 <a:ea typeface="맑은 고딕" charset="0"/>
               </a:rPr>
-              <a:t>열</a:t>
-            </a:r>
-            <a:r>
-              <a:rPr lang="ko-KR" sz="3000" b="1">
-                <a:latin typeface="맑은 고딕" charset="0"/>
-                <a:ea typeface="맑은 고딕" charset="0"/>
-              </a:rPr>
-              <a:t>여섯</a:t>
-            </a:r>
-            <a:r>
-              <a:rPr lang="ko-KR" sz="3000" b="1">
-                <a:latin typeface="맑은 고딕" charset="0"/>
-                <a:ea typeface="맑은 고딕" charset="0"/>
-              </a:rPr>
-              <a:t> 번째 튜토리얼 </a:t>
+              <a:t> </a:t>
             </a:r>
             <a:endParaRPr lang="ko-KR" altLang="en-US" sz="3000" b="1">
               <a:latin typeface="맑은 고딕" charset="0"/>
@@ -11248,7 +11507,7 @@
       </p:sp>
       <p:sp>
         <p:nvSpPr>
-          <p:cNvPr id="106" name="Rect 0"/>
+          <p:cNvPr id="128" name="텍스트 상자 7"/>
           <p:cNvSpPr txBox="1">
             <a:spLocks/>
           </p:cNvSpPr>
@@ -11256,8 +11515,8 @@
         </p:nvSpPr>
         <p:spPr>
           <a:xfrm rot="0">
-            <a:off x="1116965" y="2875280"/>
-            <a:ext cx="4280535" cy="923925"/>
+            <a:off x="1247140" y="4972050"/>
+            <a:ext cx="4131310" cy="1200785"/>
           </a:xfrm>
           <a:prstGeom prst="rect"/>
           <a:noFill/>
@@ -11284,17 +11543,7 @@
                 <a:latin typeface="맑은 고딕" charset="0"/>
                 <a:ea typeface="맑은 고딕" charset="0"/>
               </a:rPr>
-              <a:t>3</a:t>
-            </a:r>
-            <a:r>
-              <a:rPr lang="ko-KR" sz="1800" b="1">
-                <a:solidFill>
-                  <a:srgbClr val="0611F2"/>
-                </a:solidFill>
-                <a:latin typeface="맑은 고딕" charset="0"/>
-                <a:ea typeface="맑은 고딕" charset="0"/>
-              </a:rPr>
-              <a:t>9</a:t>
+              <a:t>42</a:t>
             </a:r>
             <a:r>
               <a:rPr sz="1800" b="1">
@@ -11318,7 +11567,77 @@
                 <a:latin typeface="맑은 고딕" charset="0"/>
                 <a:ea typeface="맑은 고딕" charset="0"/>
               </a:rPr>
-              <a:t>그다음으로 Animation Control 오브젝트에 있는 Animation Speed 스크립트에 각각의 속성을 넣어줍니다.</a:t>
+              <a:t>그리고 AnimationManager </a:t>
+            </a:r>
+            <a:r>
+              <a:rPr lang="ko-KR" sz="1800">
+                <a:latin typeface="맑은 고딕" charset="0"/>
+                <a:ea typeface="맑은 고딕" charset="0"/>
+              </a:rPr>
+              <a:t>스크립트에서</a:t>
+            </a:r>
+            <a:r>
+              <a:rPr lang="ko-KR" sz="1800">
+                <a:latin typeface="맑은 고딕" charset="0"/>
+                <a:ea typeface="맑은 고딕" charset="0"/>
+              </a:rPr>
+              <a:t> </a:t>
+            </a:r>
+            <a:r>
+              <a:rPr lang="ko-KR" sz="1800">
+                <a:latin typeface="맑은 고딕" charset="0"/>
+                <a:ea typeface="맑은 고딕" charset="0"/>
+              </a:rPr>
+              <a:t>bool 변수를 선언한 </a:t>
+            </a:r>
+            <a:r>
+              <a:rPr lang="ko-KR" sz="1800">
+                <a:latin typeface="맑은 고딕" charset="0"/>
+                <a:ea typeface="맑은 고딕" charset="0"/>
+              </a:rPr>
+              <a:t>다음</a:t>
+            </a:r>
+            <a:r>
+              <a:rPr lang="ko-KR" sz="1800">
+                <a:latin typeface="맑은 고딕" charset="0"/>
+                <a:ea typeface="맑은 고딕" charset="0"/>
+              </a:rPr>
+              <a:t> </a:t>
+            </a:r>
+            <a:r>
+              <a:rPr lang="ko-KR" sz="1800">
+                <a:latin typeface="맑은 고딕" charset="0"/>
+                <a:ea typeface="맑은 고딕" charset="0"/>
+              </a:rPr>
+              <a:t>float 변수와 Animator 변수를 </a:t>
+            </a:r>
+            <a:r>
+              <a:rPr lang="ko-KR" sz="1800">
+                <a:latin typeface="맑은 고딕" charset="0"/>
+                <a:ea typeface="맑은 고딕" charset="0"/>
+              </a:rPr>
+              <a:t>배열</a:t>
+            </a:r>
+            <a:r>
+              <a:rPr lang="ko-KR" sz="1800">
+                <a:latin typeface="맑은 고딕" charset="0"/>
+                <a:ea typeface="맑은 고딕" charset="0"/>
+              </a:rPr>
+              <a:t>로</a:t>
+            </a:r>
+            <a:r>
+              <a:rPr lang="ko-KR" sz="1800">
+                <a:latin typeface="맑은 고딕" charset="0"/>
+                <a:ea typeface="맑은 고딕" charset="0"/>
+              </a:rPr>
+              <a:t> </a:t>
+            </a:r>
+            <a:r>
+              <a:rPr lang="ko-KR" sz="1800">
+                <a:latin typeface="맑은 고딕" charset="0"/>
+                <a:ea typeface="맑은 고딕" charset="0"/>
+              </a:rPr>
+              <a:t>선언합니다.</a:t>
             </a:r>
             <a:endParaRPr lang="ko-KR" altLang="en-US" sz="1800">
               <a:latin typeface="맑은 고딕" charset="0"/>
@@ -11329,232 +11648,7 @@
       </p:sp>
       <p:pic>
         <p:nvPicPr>
-          <p:cNvPr id="113" name="그림 16"/>
-          <p:cNvPicPr>
-            <a:picLocks noChangeAspect="1"/>
-          </p:cNvPicPr>
-          <p:nvPr/>
-        </p:nvPicPr>
-        <p:blipFill rotWithShape="1">
-          <a:blip r:embed="rId2" cstate="print">
-            <a:extLst>
-              <a:ext uri="{28A0092B-C50C-407E-A947-70E740481C1C}">
-                <a14:useLocalDpi xmlns:a14="http://schemas.microsoft.com/office/drawing/2010/main" val="0"/>
-              </a:ext>
-            </a:extLst>
-          </a:blip>
-          <a:stretch>
-            <a:fillRect/>
-          </a:stretch>
-        </p:blipFill>
-        <p:spPr>
-          <a:xfrm rot="0">
-            <a:off x="2646680" y="1374775"/>
-            <a:ext cx="2753360" cy="1419225"/>
-          </a:xfrm>
-          <a:prstGeom prst="roundRect"/>
-          <a:solidFill>
-            <a:srgbClr val="EDEDED"/>
-          </a:solidFill>
-        </p:spPr>
-      </p:pic>
-      <p:pic>
-        <p:nvPicPr>
-          <p:cNvPr id="114" name="그림 22"/>
-          <p:cNvPicPr>
-            <a:picLocks noChangeAspect="1"/>
-          </p:cNvPicPr>
-          <p:nvPr/>
-        </p:nvPicPr>
-        <p:blipFill rotWithShape="1">
-          <a:blip r:embed="rId3" cstate="print">
-            <a:extLst>
-              <a:ext uri="{28A0092B-C50C-407E-A947-70E740481C1C}">
-                <a14:useLocalDpi xmlns:a14="http://schemas.microsoft.com/office/drawing/2010/main" val="0"/>
-              </a:ext>
-            </a:extLst>
-          </a:blip>
-          <a:stretch>
-            <a:fillRect/>
-          </a:stretch>
-        </p:blipFill>
-        <p:spPr>
-          <a:xfrm rot="0">
-            <a:off x="1115695" y="1386840"/>
-            <a:ext cx="1384300" cy="1394460"/>
-          </a:xfrm>
-          <a:prstGeom prst="roundRect"/>
-          <a:solidFill>
-            <a:srgbClr val="EDEDED"/>
-          </a:solidFill>
-        </p:spPr>
-      </p:pic>
-      <p:cxnSp>
-        <p:nvCxnSpPr>
-          <p:cNvPr id="115" name="도형 27"/>
-          <p:cNvCxnSpPr/>
-          <p:nvPr/>
-        </p:nvCxnSpPr>
-        <p:spPr>
-          <a:xfrm rot="0">
-            <a:off x="1971675" y="1816100"/>
-            <a:ext cx="3365500" cy="675005"/>
-          </a:xfrm>
-          <a:prstGeom prst="straightConnector1"/>
-          <a:ln w="6350" cap="flat" cmpd="sng">
-            <a:prstDash/>
-            <a:headEnd type="none" w="med" len="med"/>
-            <a:tailEnd type="triangle" w="med" len="med"/>
-          </a:ln>
-        </p:spPr>
-        <p:style>
-          <a:lnRef idx="1">
-            <a:schemeClr val="accent1"/>
-          </a:lnRef>
-          <a:fillRef idx="0">
-            <a:schemeClr val="accent1"/>
-          </a:fillRef>
-          <a:effectRef idx="0">
-            <a:schemeClr val="accent1"/>
-          </a:effectRef>
-          <a:fontRef idx="minor">
-            <a:schemeClr val="tx1"/>
-          </a:fontRef>
-        </p:style>
-      </p:cxnSp>
-      <p:cxnSp>
-        <p:nvCxnSpPr>
-          <p:cNvPr id="116" name="도형 28"/>
-          <p:cNvCxnSpPr/>
-          <p:nvPr/>
-        </p:nvCxnSpPr>
-        <p:spPr>
-          <a:xfrm rot="0">
-            <a:off x="1980565" y="1946275"/>
-            <a:ext cx="3356610" cy="718185"/>
-          </a:xfrm>
-          <a:prstGeom prst="straightConnector1"/>
-          <a:ln w="6350" cap="flat" cmpd="sng">
-            <a:prstDash/>
-            <a:headEnd type="none" w="med" len="med"/>
-            <a:tailEnd type="triangle" w="med" len="med"/>
-          </a:ln>
-        </p:spPr>
-        <p:style>
-          <a:lnRef idx="1">
-            <a:schemeClr val="accent1"/>
-          </a:lnRef>
-          <a:fillRef idx="0">
-            <a:schemeClr val="accent1"/>
-          </a:fillRef>
-          <a:effectRef idx="0">
-            <a:schemeClr val="accent1"/>
-          </a:effectRef>
-          <a:fontRef idx="minor">
-            <a:schemeClr val="tx1"/>
-          </a:fontRef>
-        </p:style>
-      </p:cxnSp>
-      <p:cxnSp>
-        <p:nvCxnSpPr>
-          <p:cNvPr id="117" name="도형 29"/>
-          <p:cNvCxnSpPr/>
-          <p:nvPr/>
-        </p:nvCxnSpPr>
-        <p:spPr>
-          <a:xfrm rot="0" flipV="1">
-            <a:off x="1937385" y="1997710"/>
-            <a:ext cx="3399790" cy="86995"/>
-          </a:xfrm>
-          <a:prstGeom prst="straightConnector1"/>
-          <a:ln w="6350" cap="flat" cmpd="sng">
-            <a:prstDash/>
-            <a:headEnd type="none" w="med" len="med"/>
-            <a:tailEnd type="triangle" w="med" len="med"/>
-          </a:ln>
-        </p:spPr>
-        <p:style>
-          <a:lnRef idx="1">
-            <a:schemeClr val="accent1"/>
-          </a:lnRef>
-          <a:fillRef idx="0">
-            <a:schemeClr val="accent1"/>
-          </a:fillRef>
-          <a:effectRef idx="0">
-            <a:schemeClr val="accent1"/>
-          </a:effectRef>
-          <a:fontRef idx="minor">
-            <a:schemeClr val="tx1"/>
-          </a:fontRef>
-        </p:style>
-      </p:cxnSp>
-      <p:cxnSp>
-        <p:nvCxnSpPr>
-          <p:cNvPr id="118" name="도형 30"/>
-          <p:cNvCxnSpPr/>
-          <p:nvPr/>
-        </p:nvCxnSpPr>
-        <p:spPr>
-          <a:xfrm rot="0" flipV="1">
-            <a:off x="2473325" y="1824990"/>
-            <a:ext cx="2863850" cy="623570"/>
-          </a:xfrm>
-          <a:prstGeom prst="straightConnector1"/>
-          <a:ln w="6350" cap="flat" cmpd="sng">
-            <a:prstDash/>
-            <a:headEnd type="none" w="med" len="med"/>
-            <a:tailEnd type="triangle" w="med" len="med"/>
-          </a:ln>
-        </p:spPr>
-        <p:style>
-          <a:lnRef idx="1">
-            <a:schemeClr val="accent1"/>
-          </a:lnRef>
-          <a:fillRef idx="0">
-            <a:schemeClr val="accent1"/>
-          </a:fillRef>
-          <a:effectRef idx="0">
-            <a:schemeClr val="accent1"/>
-          </a:effectRef>
-          <a:fontRef idx="minor">
-            <a:schemeClr val="tx1"/>
-          </a:fontRef>
-        </p:style>
-      </p:cxnSp>
-      <p:pic>
-        <p:nvPicPr>
-          <p:cNvPr id="119" name="그림 32"/>
-          <p:cNvPicPr>
-            <a:picLocks noChangeAspect="1"/>
-          </p:cNvPicPr>
-          <p:nvPr/>
-        </p:nvPicPr>
-        <p:blipFill rotWithShape="1">
-          <a:blip r:embed="rId4" cstate="hqprint">
-            <a:extLst>
-              <a:ext uri="{28A0092B-C50C-407E-A947-70E740481C1C}">
-                <a14:useLocalDpi xmlns:a14="http://schemas.microsoft.com/office/drawing/2010/main"/>
-              </a:ext>
-            </a:extLst>
-          </a:blip>
-          <a:stretch>
-            <a:fillRect/>
-          </a:stretch>
-        </p:blipFill>
-        <p:spPr>
-          <a:xfrm rot="0">
-            <a:off x="8260715" y="1375410"/>
-            <a:ext cx="2820670" cy="1297940"/>
-          </a:xfrm>
-          <a:prstGeom prst="roundRect"/>
-          <a:solidFill>
-            <a:srgbClr val="EDEDED"/>
-          </a:solidFill>
-        </p:spPr>
-      </p:pic>
-      <p:pic>
-        <p:nvPicPr>
-          <p:cNvPr id="120" name="그림 33"/>
+          <p:cNvPr id="129" name="그림 1" descr="C:/Users/Admin1/AppData/Roaming/PolarisOffice/ETemp/25668_19456376/fImage18096424741.png"/>
           <p:cNvPicPr>
             <a:picLocks noChangeAspect="1"/>
           </p:cNvPicPr>
@@ -11574,8 +11668,8 @@
         </p:blipFill>
         <p:spPr>
           <a:xfrm rot="0">
-            <a:off x="8269605" y="2871470"/>
-            <a:ext cx="2811145" cy="1306830"/>
+            <a:off x="6808470" y="1463040"/>
+            <a:ext cx="4146550" cy="3576320"/>
           </a:xfrm>
           <a:prstGeom prst="roundRect"/>
           <a:solidFill>
@@ -11583,9 +11677,98 @@
           </a:solidFill>
         </p:spPr>
       </p:pic>
+      <p:sp>
+        <p:nvSpPr>
+          <p:cNvPr id="130" name="텍스트 상자 4"/>
+          <p:cNvSpPr txBox="1">
+            <a:spLocks/>
+          </p:cNvSpPr>
+          <p:nvPr/>
+        </p:nvSpPr>
+        <p:spPr>
+          <a:xfrm rot="0">
+            <a:off x="6805930" y="5248910"/>
+            <a:ext cx="4131945" cy="924560"/>
+          </a:xfrm>
+          <a:prstGeom prst="rect"/>
+          <a:noFill/>
+          <a:ln w="0">
+            <a:noFill/>
+            <a:prstDash/>
+          </a:ln>
+        </p:spPr>
+        <p:txBody>
+          <a:bodyPr wrap="square" lIns="89535" tIns="46355" rIns="89535" bIns="46355" numCol="1" vert="horz" anchor="t">
+            <a:spAutoFit/>
+          </a:bodyPr>
+          <a:lstStyle/>
+          <a:p>
+            <a:pPr marL="0" indent="0" rtl="0" algn="l" defTabSz="914400" eaLnBrk="1" latinLnBrk="0" hangingPunct="1">
+              <a:buFontTx/>
+              <a:buNone/>
+            </a:pPr>
+            <a:r>
+              <a:rPr lang="ko-KR" sz="1800">
+                <a:latin typeface="맑은 고딕" charset="0"/>
+                <a:ea typeface="맑은 고딕" charset="0"/>
+              </a:rPr>
+              <a:t>애니메이션</a:t>
+            </a:r>
+            <a:r>
+              <a:rPr lang="ko-KR" sz="1800">
+                <a:latin typeface="맑은 고딕" charset="0"/>
+                <a:ea typeface="맑은 고딕" charset="0"/>
+              </a:rPr>
+              <a:t> 리타켓팅이란?</a:t>
+            </a:r>
+            <a:endParaRPr lang="ko-KR" altLang="en-US" sz="1800">
+              <a:latin typeface="맑은 고딕" charset="0"/>
+              <a:ea typeface="맑은 고딕" charset="0"/>
+            </a:endParaRPr>
+          </a:p>
+          <a:p>
+            <a:pPr marL="0" indent="0" rtl="0" algn="l" defTabSz="914400" eaLnBrk="1" latinLnBrk="0" hangingPunct="1">
+              <a:buFontTx/>
+              <a:buNone/>
+            </a:pPr>
+            <a:r>
+              <a:rPr lang="ko-KR" sz="1800">
+                <a:latin typeface="맑은 고딕" charset="0"/>
+                <a:ea typeface="맑은 고딕" charset="0"/>
+              </a:rPr>
+              <a:t>같은</a:t>
+            </a:r>
+            <a:r>
+              <a:rPr lang="ko-KR" sz="1800">
+                <a:latin typeface="맑은 고딕" charset="0"/>
+                <a:ea typeface="맑은 고딕" charset="0"/>
+              </a:rPr>
+              <a:t> 애니메이션을 다양한 캐릭터 </a:t>
+            </a:r>
+            <a:r>
+              <a:rPr lang="ko-KR" sz="1800">
+                <a:latin typeface="맑은 고딕" charset="0"/>
+                <a:ea typeface="맑은 고딕" charset="0"/>
+              </a:rPr>
+              <a:t>모델에</a:t>
+            </a:r>
+            <a:r>
+              <a:rPr lang="ko-KR" sz="1800">
+                <a:latin typeface="맑은 고딕" charset="0"/>
+                <a:ea typeface="맑은 고딕" charset="0"/>
+              </a:rPr>
+              <a:t> 동시에 적용하는 기법입니다.</a:t>
+            </a:r>
+            <a:endParaRPr lang="ko-KR" altLang="en-US" sz="1800">
+              <a:latin typeface="맑은 고딕" charset="0"/>
+              <a:ea typeface="맑은 고딕" charset="0"/>
+            </a:endParaRPr>
+          </a:p>
+        </p:txBody>
+      </p:sp>
       <p:pic>
         <p:nvPicPr>
-          <p:cNvPr id="121" name="그림 34"/>
+          <p:cNvPr id="131" name="그림 49" descr="C:/Users/Admin1/AppData/Roaming/PolarisOffice/ETemp/25668_19456376/fImage552443566827.png"/>
           <p:cNvPicPr>
             <a:picLocks noChangeAspect="1"/>
           </p:cNvPicPr>
@@ -11605,8 +11788,8 @@
         </p:blipFill>
         <p:spPr>
           <a:xfrm rot="0">
-            <a:off x="6806565" y="1366520"/>
-            <a:ext cx="1332865" cy="2820035"/>
+            <a:off x="1247140" y="3714750"/>
+            <a:ext cx="4139565" cy="1169035"/>
           </a:xfrm>
           <a:prstGeom prst="roundRect"/>
           <a:solidFill>
@@ -11614,210 +11797,47 @@
           </a:solidFill>
         </p:spPr>
       </p:pic>
-      <p:cxnSp>
-        <p:nvCxnSpPr>
-          <p:cNvPr id="122" name="도형 37"/>
-          <p:cNvCxnSpPr/>
-          <p:nvPr/>
-        </p:nvCxnSpPr>
-        <p:spPr>
-          <a:xfrm rot="0" flipV="1">
-            <a:off x="7740650" y="3658235"/>
-            <a:ext cx="1341120" cy="294640"/>
-          </a:xfrm>
-          <a:prstGeom prst="straightConnector1"/>
-          <a:ln w="6350" cap="flat" cmpd="sng">
-            <a:prstDash/>
-            <a:headEnd type="none" w="med" len="med"/>
-            <a:tailEnd type="triangle" w="med" len="med"/>
-          </a:ln>
-        </p:spPr>
-        <p:style>
-          <a:lnRef idx="1">
-            <a:schemeClr val="accent1"/>
-          </a:lnRef>
-          <a:fillRef idx="0">
-            <a:schemeClr val="accent1"/>
-          </a:fillRef>
-          <a:effectRef idx="0">
-            <a:schemeClr val="accent1"/>
-          </a:effectRef>
-          <a:fontRef idx="minor">
-            <a:schemeClr val="tx1"/>
-          </a:fontRef>
-        </p:style>
-      </p:cxnSp>
-      <p:sp>
-        <p:nvSpPr>
-          <p:cNvPr id="123" name="텍스트 상자 38"/>
-          <p:cNvSpPr txBox="1">
-            <a:spLocks/>
-          </p:cNvSpPr>
-          <p:nvPr/>
-        </p:nvSpPr>
-        <p:spPr>
-          <a:xfrm rot="0">
-            <a:off x="6806565" y="4330065"/>
-            <a:ext cx="4282440" cy="1754505"/>
-          </a:xfrm>
-          <a:prstGeom prst="rect"/>
-          <a:noFill/>
-          <a:ln w="0">
-            <a:noFill/>
-            <a:prstDash/>
-          </a:ln>
-        </p:spPr>
-        <p:txBody>
-          <a:bodyPr wrap="square" lIns="89535" tIns="46355" rIns="89535" bIns="46355" vert="horz" anchor="t">
-            <a:spAutoFit/>
-          </a:bodyPr>
-          <a:lstStyle/>
-          <a:p>
-            <a:pPr marL="0" indent="0" rtl="0" algn="l" defTabSz="914400" eaLnBrk="1" latinLnBrk="0" hangingPunct="1">
-              <a:buFontTx/>
-              <a:buNone/>
-            </a:pPr>
-            <a:r>
-              <a:rPr sz="1800" b="1">
-                <a:solidFill>
-                  <a:srgbClr val="0611F2"/>
-                </a:solidFill>
-                <a:latin typeface="맑은 고딕" charset="0"/>
-                <a:ea typeface="맑은 고딕" charset="0"/>
-              </a:rPr>
-              <a:t>41</a:t>
-            </a:r>
-            <a:r>
-              <a:rPr sz="1800" b="1">
-                <a:solidFill>
-                  <a:srgbClr val="0611F2"/>
-                </a:solidFill>
-                <a:latin typeface="맑은 고딕" charset="0"/>
-                <a:ea typeface="맑은 고딕" charset="0"/>
-              </a:rPr>
-              <a:t>.</a:t>
-            </a:r>
-            <a:r>
-              <a:rPr sz="1800">
-                <a:latin typeface="맑은 고딕" charset="0"/>
-                <a:ea typeface="맑은 고딕" charset="0"/>
-              </a:rPr>
-              <a:t> </a:t>
-            </a:r>
-            <a:r>
-              <a:rPr sz="1800">
-                <a:latin typeface="맑은 고딕" charset="0"/>
-                <a:ea typeface="맑은 고딕" charset="0"/>
-              </a:rPr>
-              <a:t>마지막으</a:t>
-            </a:r>
-            <a:r>
-              <a:rPr lang="ko-KR" sz="1800">
-                <a:latin typeface="맑은 고딕" charset="0"/>
-                <a:ea typeface="맑은 고딕" charset="0"/>
-              </a:rPr>
-              <a:t>로</a:t>
-            </a:r>
-            <a:r>
-              <a:rPr sz="1800">
-                <a:latin typeface="맑은 고딕" charset="0"/>
-                <a:ea typeface="맑은 고딕" charset="0"/>
-              </a:rPr>
-              <a:t> </a:t>
-            </a:r>
-            <a:r>
-              <a:rPr lang="ko-KR" sz="1800">
-                <a:latin typeface="맑은 고딕" charset="0"/>
-                <a:ea typeface="맑은 고딕" charset="0"/>
-              </a:rPr>
-              <a:t>Animation Speed Button</a:t>
-            </a:r>
-            <a:r>
-              <a:rPr sz="1800">
-                <a:latin typeface="맑은 고딕" charset="0"/>
-                <a:ea typeface="맑은 고딕" charset="0"/>
-              </a:rPr>
-              <a:t>의 On Click( ) 함수를 생성합니다.</a:t>
-            </a:r>
-            <a:endParaRPr lang="ko-KR" altLang="en-US" sz="1800">
-              <a:latin typeface="맑은 고딕" charset="0"/>
-              <a:ea typeface="맑은 고딕" charset="0"/>
-            </a:endParaRPr>
-          </a:p>
-          <a:p>
-            <a:pPr marL="0" indent="0" rtl="0" algn="l" defTabSz="914400" eaLnBrk="1" latinLnBrk="0" hangingPunct="1">
-              <a:buFontTx/>
-              <a:buNone/>
-            </a:pPr>
-            <a:endParaRPr lang="ko-KR" altLang="en-US" sz="1800">
-              <a:latin typeface="맑은 고딕" charset="0"/>
-              <a:ea typeface="맑은 고딕" charset="0"/>
-            </a:endParaRPr>
-          </a:p>
-          <a:p>
-            <a:pPr marL="0" indent="0" rtl="0" algn="l" defTabSz="914400" eaLnBrk="1" latinLnBrk="0" hangingPunct="1">
-              <a:buFontTx/>
-              <a:buNone/>
-            </a:pPr>
-            <a:r>
-              <a:rPr sz="1800">
-                <a:latin typeface="맑은 고딕" charset="0"/>
-                <a:ea typeface="맑은 고딕" charset="0"/>
-              </a:rPr>
-              <a:t>그런 다음 </a:t>
-            </a:r>
-            <a:r>
-              <a:rPr lang="ko-KR" sz="1800">
-                <a:latin typeface="맑은 고딕" charset="0"/>
-                <a:ea typeface="맑은 고딕" charset="0"/>
-              </a:rPr>
-              <a:t>Animation Speed Button</a:t>
-            </a:r>
-            <a:r>
-              <a:rPr sz="1800">
-                <a:latin typeface="맑은 고딕" charset="0"/>
-                <a:ea typeface="맑은 고딕" charset="0"/>
-              </a:rPr>
-              <a:t>에 있는 On Click( ) 함수에 </a:t>
-            </a:r>
-            <a:r>
-              <a:rPr sz="1800">
-                <a:latin typeface="맑은 고딕" charset="0"/>
-                <a:ea typeface="맑은 고딕" charset="0"/>
-              </a:rPr>
-              <a:t>A</a:t>
-            </a:r>
-            <a:r>
-              <a:rPr lang="ko-KR" sz="1800">
-                <a:latin typeface="맑은 고딕" charset="0"/>
-                <a:ea typeface="맑은 고딕" charset="0"/>
-              </a:rPr>
-              <a:t>nimator Control</a:t>
-            </a:r>
-            <a:r>
-              <a:rPr sz="1800">
-                <a:latin typeface="맑은 고딕" charset="0"/>
-                <a:ea typeface="맑은 고딕" charset="0"/>
-              </a:rPr>
-              <a:t> 오브젝트를 넣어줍니다.</a:t>
-            </a:r>
-            <a:endParaRPr lang="ko-KR" altLang="en-US" sz="1800">
-              <a:latin typeface="맑은 고딕" charset="0"/>
-              <a:ea typeface="맑은 고딕" charset="0"/>
-            </a:endParaRPr>
-          </a:p>
-        </p:txBody>
-      </p:sp>
       <p:pic>
         <p:nvPicPr>
-          <p:cNvPr id="124" name="그림 39"/>
+          <p:cNvPr id="132" name="그림 52" descr="C:/Users/Admin1/AppData/Roaming/PolarisOffice/ETemp/25668_19456376/fImage30173579961.png"/>
           <p:cNvPicPr>
             <a:picLocks noChangeAspect="1"/>
           </p:cNvPicPr>
           <p:nvPr/>
         </p:nvPicPr>
         <p:blipFill rotWithShape="1">
-          <a:blip r:embed="rId7" cstate="print">
+          <a:blip r:embed="rId7" cstate="hqprint">
+            <a:extLst>
+              <a:ext uri="{28A0092B-C50C-407E-A947-70E740481C1C}">
+                <a14:useLocalDpi xmlns:a14="http://schemas.microsoft.com/office/drawing/2010/main"/>
+              </a:ext>
+            </a:extLst>
+          </a:blip>
+          <a:stretch>
+            <a:fillRect/>
+          </a:stretch>
+        </p:blipFill>
+        <p:spPr>
+          <a:xfrm rot="0">
+            <a:off x="2658745" y="1445895"/>
+            <a:ext cx="2719705" cy="1135380"/>
+          </a:xfrm>
+          <a:prstGeom prst="roundRect"/>
+          <a:solidFill>
+            <a:srgbClr val="EDEDED"/>
+          </a:solidFill>
+        </p:spPr>
+      </p:pic>
+      <p:pic>
+        <p:nvPicPr>
+          <p:cNvPr id="133" name="그림 53" descr="C:/Users/Admin1/AppData/Roaming/PolarisOffice/ETemp/25668_19456376/fImage12139358491.png"/>
+          <p:cNvPicPr>
+            <a:picLocks noChangeAspect="1"/>
+          </p:cNvPicPr>
+          <p:nvPr/>
+        </p:nvPicPr>
+        <p:blipFill rotWithShape="1">
+          <a:blip r:embed="rId8" cstate="print">
             <a:extLst>
               <a:ext uri="{28A0092B-C50C-407E-A947-70E740481C1C}">
                 <a14:useLocalDpi xmlns:a14="http://schemas.microsoft.com/office/drawing/2010/main" val="0"/>
@@ -11830,8 +11850,8 @@
         </p:blipFill>
         <p:spPr>
           <a:xfrm rot="0">
-            <a:off x="1118870" y="3922395"/>
-            <a:ext cx="4269740" cy="1423670"/>
+            <a:off x="1250950" y="1445895"/>
+            <a:ext cx="1304290" cy="1135380"/>
           </a:xfrm>
           <a:prstGeom prst="roundRect"/>
           <a:solidFill>
@@ -11841,7 +11861,7 @@
       </p:pic>
       <p:sp>
         <p:nvSpPr>
-          <p:cNvPr id="125" name="텍스트 상자 42"/>
+          <p:cNvPr id="134" name="텍스트 상자 56"/>
           <p:cNvSpPr txBox="1">
             <a:spLocks/>
           </p:cNvSpPr>
@@ -11849,8 +11869,8 @@
         </p:nvSpPr>
         <p:spPr>
           <a:xfrm rot="0">
-            <a:off x="1116965" y="5443220"/>
-            <a:ext cx="4271645" cy="647065"/>
+            <a:off x="1249045" y="2662555"/>
+            <a:ext cx="4131310" cy="923925"/>
           </a:xfrm>
           <a:prstGeom prst="rect"/>
           <a:noFill/>
@@ -11877,7 +11897,17 @@
                 <a:latin typeface="맑은 고딕" charset="0"/>
                 <a:ea typeface="맑은 고딕" charset="0"/>
               </a:rPr>
-              <a:t>40</a:t>
+              <a:t>4</a:t>
+            </a:r>
+            <a:r>
+              <a:rPr lang="ko-KR" sz="1800" b="1">
+                <a:solidFill>
+                  <a:srgbClr val="0611F2"/>
+                </a:solidFill>
+                <a:latin typeface="맑은 고딕" charset="0"/>
+                <a:ea typeface="맑은 고딕" charset="0"/>
+              </a:rPr>
+              <a:t>1</a:t>
             </a:r>
             <a:r>
               <a:rPr sz="1800" b="1">
@@ -11901,21 +11931,14 @@
                 <a:latin typeface="맑은 고딕" charset="0"/>
                 <a:ea typeface="맑은 고딕" charset="0"/>
               </a:rPr>
-              <a:t>이제 Animator Control </a:t>
-            </a:r>
-            <a:r>
-              <a:rPr lang="ko-KR" sz="1800">
-                <a:latin typeface="맑은 고딕" charset="0"/>
-                <a:ea typeface="맑은 고딕" charset="0"/>
-              </a:rPr>
-              <a:t>오브젝트의 </a:t>
-            </a:r>
-            <a:r>
-              <a:rPr lang="ko-KR" sz="1800">
-                <a:latin typeface="맑은 고딕" charset="0"/>
-                <a:ea typeface="맑은 고딕" charset="0"/>
-              </a:rPr>
-              <a:t>Transform을 초기화합니다.</a:t>
+              <a:t>이제 Everything Culling </a:t>
+            </a:r>
+            <a:r>
+              <a:rPr lang="ko-KR" sz="1800">
+                <a:latin typeface="맑은 고딕" charset="0"/>
+                <a:ea typeface="맑은 고딕" charset="0"/>
+              </a:rPr>
+              <a:t>Button</a:t>
             </a:r>
             <a:r>
               <a:rPr lang="ko-KR" sz="1800">
@@ -11924,156 +11947,29 @@
               </a:rPr>
               <a:t> </a:t>
             </a:r>
-            <a:endParaRPr lang="ko-KR" altLang="en-US" sz="1800">
-              <a:latin typeface="맑은 고딕" charset="0"/>
-              <a:ea typeface="맑은 고딕" charset="0"/>
-            </a:endParaRPr>
-          </a:p>
-        </p:txBody>
-      </p:sp>
-    </p:spTree>
-  </p:cSld>
-  <p:clrMapOvr>
-    <a:masterClrMapping/>
-  </p:clrMapOvr>
-  <mc:AlternateContent xmlns:mc="http://schemas.openxmlformats.org/markup-compatibility/2006">
-    <mc:Choice xmlns:p14="http://schemas.microsoft.com/office/powerpoint/2010/main" Requires="p14">
-      <p:transition spd="slow" p14:dur="2000"/>
-    </mc:Choice>
-    <mc:Fallback>
-      <p:transition spd="slow"/>
-    </mc:Fallback>
-  </mc:AlternateContent>
-  <p:timing>
-    <p:tnLst>
-      <p:par>
-        <p:cTn id="1" dur="indefinite" restart="never" nodeType="tmRoot"/>
-      </p:par>
-    </p:tnLst>
-  </p:timing>
-</p:sld>
-</file>
-
-<file path=ppt/slides/slide17.xml><?xml version="1.0" encoding="utf-8"?>
-<p:sld xmlns:a="http://schemas.openxmlformats.org/drawingml/2006/main" xmlns:r="http://schemas.openxmlformats.org/officeDocument/2006/relationships" xmlns:p="http://schemas.openxmlformats.org/presentationml/2006/main" xmlns:p14="http://schemas.microsoft.com/office/powerpoint/2010/main">
-  <p:cSld>
-    <p:spTree>
-      <p:nvGrpSpPr>
-        <p:cNvPr id="1" name=""/>
-        <p:cNvGrpSpPr/>
-        <p:nvPr/>
-      </p:nvGrpSpPr>
-      <p:grpSpPr>
-        <a:xfrm>
-          <a:off x="0" y="0"/>
-          <a:ext cx="0" cy="0"/>
-          <a:chOff x="0" y="0"/>
-          <a:chExt cx="0" cy="0"/>
-        </a:xfrm>
-      </p:grpSpPr>
-      <p:sp>
-        <p:nvSpPr>
-          <p:cNvPr id="22" name="Rect 0"/>
-          <p:cNvSpPr txBox="1">
-            <a:spLocks/>
-          </p:cNvSpPr>
-          <p:nvPr/>
-        </p:nvSpPr>
-        <p:spPr>
-          <a:xfrm rot="0">
-            <a:off x="4107815" y="418465"/>
-            <a:ext cx="3989705" cy="554990"/>
-          </a:xfrm>
-          <a:prstGeom prst="rect"/>
-          <a:noFill/>
-          <a:ln w="0">
-            <a:noFill/>
-            <a:prstDash/>
-          </a:ln>
-        </p:spPr>
-        <p:txBody>
-          <a:bodyPr wrap="square" lIns="89535" tIns="46355" rIns="89535" bIns="46355" numCol="1" vert="horz" anchor="t">
-            <a:spAutoFit/>
-          </a:bodyPr>
-          <a:lstStyle/>
-          <a:p>
-            <a:pPr marL="0" indent="0" algn="ctr" latinLnBrk="0" hangingPunct="1">
-              <a:buFontTx/>
-              <a:buNone/>
-            </a:pPr>
-            <a:r>
-              <a:rPr lang="ko-KR" sz="2500" b="1">
-                <a:latin typeface="나눔바른고딕" charset="0"/>
-                <a:ea typeface="나눔바른고딕" charset="0"/>
-              </a:rPr>
-              <a:t>열일곱 번째 튜토리얼</a:t>
-            </a:r>
-            <a:r>
-              <a:rPr lang="ko-KR" sz="3000" b="1">
+            <a:r>
+              <a:rPr lang="ko-KR" sz="1800">
+                <a:latin typeface="맑은 고딕" charset="0"/>
+                <a:ea typeface="맑은 고딕" charset="0"/>
+              </a:rPr>
+              <a:t>오브젝트의</a:t>
+            </a:r>
+            <a:r>
+              <a:rPr lang="ko-KR" sz="1800">
                 <a:latin typeface="맑은 고딕" charset="0"/>
                 <a:ea typeface="맑은 고딕" charset="0"/>
               </a:rPr>
               <a:t> </a:t>
             </a:r>
-            <a:endParaRPr lang="ko-KR" altLang="en-US" sz="3000" b="1">
-              <a:latin typeface="맑은 고딕" charset="0"/>
-              <a:ea typeface="맑은 고딕" charset="0"/>
-            </a:endParaRPr>
-          </a:p>
-        </p:txBody>
-      </p:sp>
-      <p:sp>
-        <p:nvSpPr>
-          <p:cNvPr id="106" name="Rect 0"/>
-          <p:cNvSpPr txBox="1">
-            <a:spLocks/>
-          </p:cNvSpPr>
-          <p:nvPr/>
-        </p:nvSpPr>
-        <p:spPr>
-          <a:xfrm rot="0">
-            <a:off x="1238250" y="2751455"/>
-            <a:ext cx="4140200" cy="923925"/>
-          </a:xfrm>
-          <a:prstGeom prst="rect"/>
-          <a:noFill/>
-          <a:ln w="0">
-            <a:noFill/>
-            <a:prstDash/>
-          </a:ln>
-        </p:spPr>
-        <p:txBody>
-          <a:bodyPr wrap="square" lIns="89535" tIns="46355" rIns="89535" bIns="46355" numCol="1" vert="horz" anchor="t">
-            <a:spAutoFit/>
-          </a:bodyPr>
-          <a:lstStyle/>
-          <a:p>
-            <a:pPr marL="0" indent="0" rtl="0" algn="l" defTabSz="914400" eaLnBrk="1" latinLnBrk="0" hangingPunct="1">
-              <a:buFontTx/>
-              <a:buNone/>
-            </a:pPr>
-            <a:r>
-              <a:rPr lang="ko-KR" sz="1800" b="1">
-                <a:solidFill>
-                  <a:srgbClr val="0611F2"/>
-                </a:solidFill>
-                <a:latin typeface="맑은 고딕" charset="0"/>
-                <a:ea typeface="맑은 고딕" charset="0"/>
-              </a:rPr>
-              <a:t>42</a:t>
-            </a:r>
-            <a:r>
-              <a:rPr sz="1800" b="1">
-                <a:solidFill>
-                  <a:srgbClr val="0611F2"/>
-                </a:solidFill>
-                <a:latin typeface="맑은 고딕" charset="0"/>
-                <a:ea typeface="맑은 고딕" charset="0"/>
-              </a:rPr>
-              <a:t>.</a:t>
-            </a:r>
-            <a:r>
-              <a:rPr sz="1800">
+            <a:r>
+              <a:rPr lang="ko-KR" sz="1800">
+                <a:latin typeface="맑은 고딕" charset="0"/>
+                <a:ea typeface="맑은 고딕" charset="0"/>
+              </a:rPr>
+              <a:t>On</a:t>
+            </a:r>
+            <a:r>
+              <a:rPr lang="ko-KR" sz="1800">
                 <a:latin typeface="맑은 고딕" charset="0"/>
                 <a:ea typeface="맑은 고딕" charset="0"/>
               </a:rPr>
@@ -12084,239 +11980,28 @@
                 <a:latin typeface="맑은 고딕" charset="0"/>
                 <a:ea typeface="맑은 고딕" charset="0"/>
               </a:rPr>
-              <a:t>그다음 Animation Control</a:t>
-            </a:r>
-            <a:r>
-              <a:rPr sz="1800">
-                <a:latin typeface="맑은 고딕" charset="0"/>
-                <a:ea typeface="맑은 고딕" charset="0"/>
-              </a:rPr>
-              <a:t> 스크립트에 있는 SpeedSetting( ) 함수를 선택합니다.</a:t>
-            </a:r>
-            <a:endParaRPr lang="ko-KR" altLang="en-US" sz="1800">
-              <a:latin typeface="맑은 고딕" charset="0"/>
-              <a:ea typeface="맑은 고딕" charset="0"/>
-            </a:endParaRPr>
-          </a:p>
-        </p:txBody>
-      </p:sp>
-      <p:pic>
-        <p:nvPicPr>
-          <p:cNvPr id="126" name="그림 1" descr="C:/Users/Admin1/AppData/Roaming/PolarisOffice/ETemp/20852_9486176/fImage665532741.png"/>
-          <p:cNvPicPr>
-            <a:picLocks noChangeAspect="1"/>
-          </p:cNvPicPr>
-          <p:nvPr/>
-        </p:nvPicPr>
-        <p:blipFill rotWithShape="1">
-          <a:blip r:embed="rId2" cstate="hqprint">
-            <a:extLst>
-              <a:ext uri="{28A0092B-C50C-407E-A947-70E740481C1C}">
-                <a14:useLocalDpi xmlns:a14="http://schemas.microsoft.com/office/drawing/2010/main"/>
-              </a:ext>
-            </a:extLst>
-          </a:blip>
-          <a:stretch>
-            <a:fillRect/>
-          </a:stretch>
-        </p:blipFill>
-        <p:spPr>
-          <a:xfrm rot="0">
-            <a:off x="1238250" y="1445895"/>
-            <a:ext cx="4148455" cy="1187450"/>
-          </a:xfrm>
-          <a:prstGeom prst="roundRect"/>
-          <a:solidFill>
-            <a:srgbClr val="EDEDED"/>
-          </a:solidFill>
-        </p:spPr>
-      </p:pic>
-      <p:pic>
-        <p:nvPicPr>
-          <p:cNvPr id="127" name="그림 4" descr="C:/Users/Admin1/AppData/Roaming/PolarisOffice/ETemp/20852_9486176/fImage128363288467.png"/>
-          <p:cNvPicPr>
-            <a:picLocks noChangeAspect="1"/>
-          </p:cNvPicPr>
-          <p:nvPr/>
-        </p:nvPicPr>
-        <p:blipFill rotWithShape="1">
-          <a:blip r:embed="rId3" cstate="hqprint">
-            <a:extLst>
-              <a:ext uri="{28A0092B-C50C-407E-A947-70E740481C1C}">
-                <a14:useLocalDpi xmlns:a14="http://schemas.microsoft.com/office/drawing/2010/main"/>
-              </a:ext>
-            </a:extLst>
-          </a:blip>
-          <a:stretch>
-            <a:fillRect/>
-          </a:stretch>
-        </p:blipFill>
-        <p:spPr>
-          <a:xfrm rot="0">
-            <a:off x="1238250" y="3827145"/>
-            <a:ext cx="4148455" cy="1524635"/>
-          </a:xfrm>
-          <a:prstGeom prst="roundRect"/>
-          <a:solidFill>
-            <a:srgbClr val="EDEDED"/>
-          </a:solidFill>
-        </p:spPr>
-      </p:pic>
-      <p:sp>
-        <p:nvSpPr>
-          <p:cNvPr id="128" name="텍스트 상자 7"/>
-          <p:cNvSpPr txBox="1">
-            <a:spLocks/>
-          </p:cNvSpPr>
-          <p:nvPr/>
-        </p:nvSpPr>
-        <p:spPr>
-          <a:xfrm rot="0">
-            <a:off x="1238250" y="5482590"/>
-            <a:ext cx="4148455" cy="647065"/>
-          </a:xfrm>
-          <a:prstGeom prst="rect"/>
-          <a:noFill/>
-          <a:ln w="0">
-            <a:noFill/>
-            <a:prstDash/>
-          </a:ln>
-        </p:spPr>
-        <p:txBody>
-          <a:bodyPr wrap="square" lIns="89535" tIns="46355" rIns="89535" bIns="46355" numCol="1" vert="horz" anchor="t">
-            <a:spAutoFit/>
-          </a:bodyPr>
-          <a:lstStyle/>
-          <a:p>
-            <a:pPr marL="0" indent="0" rtl="0" algn="l" defTabSz="914400" eaLnBrk="1" latinLnBrk="0" hangingPunct="1">
-              <a:buFontTx/>
-              <a:buNone/>
-            </a:pPr>
-            <a:r>
-              <a:rPr lang="ko-KR" sz="1800" b="1">
-                <a:solidFill>
-                  <a:srgbClr val="0611F2"/>
-                </a:solidFill>
-                <a:latin typeface="맑은 고딕" charset="0"/>
-                <a:ea typeface="맑은 고딕" charset="0"/>
-              </a:rPr>
-              <a:t>43</a:t>
-            </a:r>
-            <a:r>
-              <a:rPr sz="1800" b="1">
-                <a:solidFill>
-                  <a:srgbClr val="0611F2"/>
-                </a:solidFill>
-                <a:latin typeface="맑은 고딕" charset="0"/>
-                <a:ea typeface="맑은 고딕" charset="0"/>
-              </a:rPr>
-              <a:t>.</a:t>
-            </a:r>
-            <a:r>
-              <a:rPr sz="1800">
+              <a:t>Click(</a:t>
+            </a:r>
+            <a:r>
+              <a:rPr lang="ko-KR" sz="1800">
+                <a:latin typeface="맑은 고딕" charset="0"/>
+                <a:ea typeface="맑은 고딕" charset="0"/>
+              </a:rPr>
+              <a:t> ) 함수를 </a:t>
+            </a:r>
+            <a:r>
+              <a:rPr lang="ko-KR" sz="1800">
+                <a:latin typeface="맑은 고딕" charset="0"/>
+                <a:ea typeface="맑은 고딕" charset="0"/>
+              </a:rPr>
+              <a:t>추가합니다.</a:t>
+            </a:r>
+            <a:r>
+              <a:rPr lang="ko-KR" sz="1800">
                 <a:latin typeface="맑은 고딕" charset="0"/>
                 <a:ea typeface="맑은 고딕" charset="0"/>
               </a:rPr>
               <a:t> </a:t>
-            </a:r>
-            <a:r>
-              <a:rPr lang="ko-KR" sz="1800">
-                <a:latin typeface="맑은 고딕" charset="0"/>
-                <a:ea typeface="맑은 고딕" charset="0"/>
-              </a:rPr>
-              <a:t>그리고 Animation Speed Text의 앵커와 크기를 설정합니다.</a:t>
-            </a:r>
-            <a:endParaRPr lang="ko-KR" altLang="en-US" sz="1800">
-              <a:latin typeface="맑은 고딕" charset="0"/>
-              <a:ea typeface="맑은 고딕" charset="0"/>
-            </a:endParaRPr>
-          </a:p>
-        </p:txBody>
-      </p:sp>
-      <p:pic>
-        <p:nvPicPr>
-          <p:cNvPr id="129" name="그림 1" descr="C:/Users/Admin1/AppData/Roaming/PolarisOffice/ETemp/20852_9486176/fImage18096424741.png"/>
-          <p:cNvPicPr>
-            <a:picLocks noChangeAspect="1"/>
-          </p:cNvPicPr>
-          <p:nvPr/>
-        </p:nvPicPr>
-        <p:blipFill rotWithShape="1">
-          <a:blip r:embed="rId5" cstate="hqprint">
-            <a:extLst>
-              <a:ext uri="{28A0092B-C50C-407E-A947-70E740481C1C}">
-                <a14:useLocalDpi xmlns:a14="http://schemas.microsoft.com/office/drawing/2010/main"/>
-              </a:ext>
-            </a:extLst>
-          </a:blip>
-          <a:stretch>
-            <a:fillRect/>
-          </a:stretch>
-        </p:blipFill>
-        <p:spPr>
-          <a:xfrm rot="0">
-            <a:off x="6808470" y="1445895"/>
-            <a:ext cx="4145915" cy="3575685"/>
-          </a:xfrm>
-          <a:prstGeom prst="roundRect"/>
-          <a:solidFill>
-            <a:srgbClr val="EDEDED"/>
-          </a:solidFill>
-        </p:spPr>
-      </p:pic>
-      <p:sp>
-        <p:nvSpPr>
-          <p:cNvPr id="130" name="텍스트 상자 4"/>
-          <p:cNvSpPr txBox="1">
-            <a:spLocks/>
-          </p:cNvSpPr>
-          <p:nvPr/>
-        </p:nvSpPr>
-        <p:spPr>
-          <a:xfrm rot="0">
-            <a:off x="6814820" y="5205730"/>
-            <a:ext cx="4131310" cy="923925"/>
-          </a:xfrm>
-          <a:prstGeom prst="rect"/>
-          <a:noFill/>
-          <a:ln w="0">
-            <a:noFill/>
-            <a:prstDash/>
-          </a:ln>
-        </p:spPr>
-        <p:txBody>
-          <a:bodyPr wrap="square" lIns="89535" tIns="46355" rIns="89535" bIns="46355" numCol="1" vert="horz" anchor="t">
-            <a:spAutoFit/>
-          </a:bodyPr>
-          <a:lstStyle/>
-          <a:p>
-            <a:pPr marL="0" indent="0" rtl="0" algn="l" defTabSz="914400" eaLnBrk="1" latinLnBrk="0" hangingPunct="1">
-              <a:buFontTx/>
-              <a:buNone/>
-            </a:pPr>
-            <a:r>
-              <a:rPr lang="ko-KR" sz="1800">
-                <a:latin typeface="맑은 고딕" charset="0"/>
-                <a:ea typeface="맑은 고딕" charset="0"/>
-              </a:rPr>
-              <a:t>애니메이션 리타켓팅이란?</a:t>
-            </a:r>
-            <a:endParaRPr lang="ko-KR" altLang="en-US" sz="1800">
-              <a:latin typeface="맑은 고딕" charset="0"/>
-              <a:ea typeface="맑은 고딕" charset="0"/>
-            </a:endParaRPr>
-          </a:p>
-          <a:p>
-            <a:pPr marL="0" indent="0" rtl="0" algn="l" defTabSz="914400" eaLnBrk="1" latinLnBrk="0" hangingPunct="1">
-              <a:buFontTx/>
-              <a:buNone/>
-            </a:pPr>
-            <a:r>
-              <a:rPr lang="ko-KR" sz="1800">
-                <a:latin typeface="맑은 고딕" charset="0"/>
-                <a:ea typeface="맑은 고딕" charset="0"/>
-              </a:rPr>
-              <a:t>같은 애니메이션을 다양한 캐릭터 모델에 동시에 적용하는 기법입니다.</a:t>
             </a:r>
             <a:endParaRPr lang="ko-KR" altLang="en-US" sz="1800">
               <a:latin typeface="맑은 고딕" charset="0"/>
@@ -13249,8 +12934,8 @@
         </p:nvSpPr>
         <p:spPr>
           <a:xfrm rot="0">
-            <a:off x="1238250" y="4102735"/>
-            <a:ext cx="4140200" cy="2061845"/>
+            <a:off x="1238250" y="4222750"/>
+            <a:ext cx="4140835" cy="2062480"/>
           </a:xfrm>
           <a:prstGeom prst="rect"/>
           <a:noFill/>
@@ -13277,7 +12962,17 @@
                 <a:latin typeface="맑은 고딕" charset="0"/>
                 <a:ea typeface="맑은 고딕" charset="0"/>
               </a:rPr>
-              <a:t>8. </a:t>
+              <a:t>8.</a:t>
+            </a:r>
+            <a:r>
+              <a:rPr sz="2000" b="1">
+                <a:solidFill>
+                  <a:srgbClr val="0611F2"/>
+                </a:solidFill>
+                <a:latin typeface="맑은 고딕" charset="0"/>
+                <a:ea typeface="맑은 고딕" charset="0"/>
+              </a:rPr>
+              <a:t> </a:t>
             </a:r>
             <a:r>
               <a:rPr sz="1800">
@@ -13312,14 +13007,35 @@
                 <a:latin typeface="맑은 고딕" charset="0"/>
                 <a:ea typeface="맑은 고딕" charset="0"/>
               </a:rPr>
-              <a:t>에 Animation </a:t>
-            </a:r>
-            <a:r>
-              <a:rPr lang="ko-KR" sz="1800">
-                <a:latin typeface="맑은 고딕" charset="0"/>
-                <a:ea typeface="맑은 고딕" charset="0"/>
-              </a:rPr>
-              <a:t>Type을 Humanoid로 설정합니다.</a:t>
+              <a:t>에 </a:t>
+            </a:r>
+            <a:r>
+              <a:rPr sz="1800">
+                <a:latin typeface="맑은 고딕" charset="0"/>
+                <a:ea typeface="맑은 고딕" charset="0"/>
+              </a:rPr>
+              <a:t>Animation</a:t>
+            </a:r>
+            <a:r>
+              <a:rPr sz="1800">
+                <a:latin typeface="맑은 고딕" charset="0"/>
+                <a:ea typeface="맑은 고딕" charset="0"/>
+              </a:rPr>
+              <a:t> </a:t>
+            </a:r>
+            <a:r>
+              <a:rPr lang="ko-KR" sz="1800">
+                <a:latin typeface="맑은 고딕" charset="0"/>
+                <a:ea typeface="맑은 고딕" charset="0"/>
+              </a:rPr>
+              <a:t>Type을 Humanoid로 </a:t>
+            </a:r>
+            <a:r>
+              <a:rPr lang="ko-KR" sz="1800">
+                <a:latin typeface="맑은 고딕" charset="0"/>
+                <a:ea typeface="맑은 고딕" charset="0"/>
+              </a:rPr>
+              <a:t>설정합니다.</a:t>
             </a:r>
             <a:endParaRPr lang="ko-KR" altLang="en-US" sz="1800">
               <a:latin typeface="맑은 고딕" charset="0"/>
@@ -13346,21 +13062,35 @@
                 <a:latin typeface="맑은 고딕" charset="0"/>
                 <a:ea typeface="맑은 고딕" charset="0"/>
               </a:rPr>
-              <a:t>그</a:t>
-            </a:r>
-            <a:r>
-              <a:rPr lang="ko-KR" sz="1800">
-                <a:latin typeface="맑은 고딕" charset="0"/>
-                <a:ea typeface="맑은 고딕" charset="0"/>
-              </a:rPr>
-              <a:t>다음으로</a:t>
-            </a:r>
-            <a:r>
-              <a:rPr lang="ko-KR" sz="1800">
-                <a:latin typeface="맑은 고딕" charset="0"/>
-                <a:ea typeface="맑은 고딕" charset="0"/>
-              </a:rPr>
-              <a:t> Avatar Definition을 Create From This Model로 설정하고 Apply를 선택합니다.</a:t>
+              <a:t>그다음으로</a:t>
+            </a:r>
+            <a:r>
+              <a:rPr lang="ko-KR" sz="1800">
+                <a:latin typeface="맑은 고딕" charset="0"/>
+                <a:ea typeface="맑은 고딕" charset="0"/>
+              </a:rPr>
+              <a:t> Avatar Definition을 Create </a:t>
+            </a:r>
+            <a:r>
+              <a:rPr lang="ko-KR" sz="1800">
+                <a:latin typeface="맑은 고딕" charset="0"/>
+                <a:ea typeface="맑은 고딕" charset="0"/>
+              </a:rPr>
+              <a:t>From</a:t>
+            </a:r>
+            <a:r>
+              <a:rPr lang="ko-KR" sz="1800">
+                <a:latin typeface="맑은 고딕" charset="0"/>
+                <a:ea typeface="맑은 고딕" charset="0"/>
+              </a:rPr>
+              <a:t> This Model로 설정하고 Apply를 </a:t>
+            </a:r>
+            <a:r>
+              <a:rPr lang="ko-KR" sz="1800">
+                <a:latin typeface="맑은 고딕" charset="0"/>
+                <a:ea typeface="맑은 고딕" charset="0"/>
+              </a:rPr>
+              <a:t>선택합니다.</a:t>
             </a:r>
             <a:endParaRPr lang="ko-KR" altLang="en-US" sz="1800">
               <a:latin typeface="맑은 고딕" charset="0"/>
@@ -13371,7 +13101,7 @@
       </p:sp>
       <p:pic>
         <p:nvPicPr>
-          <p:cNvPr id="44" name="그림 46" descr="C:/Users/Admin1/AppData/Roaming/PolarisOffice/ETemp/20852_9486176/fImage201613635705.png"/>
+          <p:cNvPr id="44" name="그림 46" descr="C:/Users/Admin1/AppData/Roaming/PolarisOffice/ETemp/25668_19456376/fImage201613635705.png"/>
           <p:cNvPicPr>
             <a:picLocks noChangeAspect="1"/>
           </p:cNvPicPr>
@@ -13391,11 +13121,13 @@
         </p:blipFill>
         <p:spPr>
           <a:xfrm rot="0">
-            <a:off x="1238250" y="1454785"/>
-            <a:ext cx="4151630" cy="2525395"/>
-          </a:xfrm>
-          <a:prstGeom prst="rect"/>
-          <a:noFill/>
+            <a:off x="1238250" y="1455420"/>
+            <a:ext cx="4152265" cy="2602230"/>
+          </a:xfrm>
+          <a:prstGeom prst="roundRect"/>
+          <a:solidFill>
+            <a:srgbClr val="EDEDED"/>
+          </a:solidFill>
         </p:spPr>
       </p:pic>
       <p:sp>
@@ -13408,8 +13140,8 @@
         </p:nvSpPr>
         <p:spPr>
           <a:xfrm rot="0">
-            <a:off x="6819900" y="5205095"/>
-            <a:ext cx="4143375" cy="954405"/>
+            <a:off x="6819900" y="5325110"/>
+            <a:ext cx="4144010" cy="955040"/>
           </a:xfrm>
           <a:prstGeom prst="rect"/>
           <a:noFill/>
@@ -13446,42 +13178,59 @@
                 <a:latin typeface="맑은 고딕" charset="0"/>
                 <a:ea typeface="맑은 고딕" charset="0"/>
               </a:rPr>
-              <a:t>. </a:t>
-            </a:r>
-            <a:r>
-              <a:rPr lang="ko-KR" sz="1800">
-                <a:latin typeface="맑은 고딕" charset="0"/>
-                <a:ea typeface="맑은 고딕" charset="0"/>
-              </a:rPr>
-              <a:t>그러고 나서</a:t>
-            </a:r>
-            <a:r>
-              <a:rPr lang="ko-KR" sz="1800">
-                <a:latin typeface="맑은 고딕" charset="0"/>
-                <a:ea typeface="맑은 고딕" charset="0"/>
-              </a:rPr>
-              <a:t> Project 폴더</a:t>
-            </a:r>
-            <a:r>
-              <a:rPr lang="ko-KR" sz="1800">
-                <a:latin typeface="맑은 고딕" charset="0"/>
-                <a:ea typeface="맑은 고딕" charset="0"/>
-              </a:rPr>
-              <a:t> 아래에 </a:t>
-            </a:r>
-            <a:r>
-              <a:rPr lang="ko-KR" sz="1800">
-                <a:latin typeface="맑은 고딕" charset="0"/>
-                <a:ea typeface="맑은 고딕" charset="0"/>
-              </a:rPr>
-              <a:t>있는 Animator 폴더에</a:t>
+              <a:t>.</a:t>
+            </a:r>
+            <a:r>
+              <a:rPr sz="2000" b="1">
+                <a:solidFill>
+                  <a:srgbClr val="0611F2"/>
+                </a:solidFill>
+                <a:latin typeface="맑은 고딕" charset="0"/>
+                <a:ea typeface="맑은 고딕" charset="0"/>
+              </a:rPr>
+              <a:t> </a:t>
+            </a:r>
+            <a:r>
+              <a:rPr lang="ko-KR" sz="1800">
+                <a:latin typeface="맑은 고딕" charset="0"/>
+                <a:ea typeface="맑은 고딕" charset="0"/>
+              </a:rPr>
+              <a:t>그러고 나서 Project 폴더 아래에 </a:t>
+            </a:r>
+            <a:r>
+              <a:rPr lang="ko-KR" sz="1800">
+                <a:latin typeface="맑은 고딕" charset="0"/>
+                <a:ea typeface="맑은 고딕" charset="0"/>
+              </a:rPr>
+              <a:t>있는</a:t>
+            </a:r>
+            <a:r>
+              <a:rPr lang="ko-KR" sz="1800">
+                <a:latin typeface="맑은 고딕" charset="0"/>
+                <a:ea typeface="맑은 고딕" charset="0"/>
+              </a:rPr>
+              <a:t> Animator 폴더에</a:t>
             </a:r>
             <a:r>
               <a:rPr sz="1800">
                 <a:latin typeface="맑은 고딕" charset="0"/>
                 <a:ea typeface="맑은 고딕" charset="0"/>
               </a:rPr>
-              <a:t> Animator Controller를 생성합니다.</a:t>
+              <a:t> Animator </a:t>
+            </a:r>
+            <a:r>
+              <a:rPr sz="1800">
+                <a:latin typeface="맑은 고딕" charset="0"/>
+                <a:ea typeface="맑은 고딕" charset="0"/>
+              </a:rPr>
+              <a:t>Controller를</a:t>
+            </a:r>
+            <a:r>
+              <a:rPr sz="1800">
+                <a:latin typeface="맑은 고딕" charset="0"/>
+                <a:ea typeface="맑은 고딕" charset="0"/>
+              </a:rPr>
+              <a:t> 생성합니다.</a:t>
             </a:r>
             <a:endParaRPr lang="ko-KR" altLang="en-US" sz="1800">
               <a:latin typeface="맑은 고딕" charset="0"/>
@@ -13492,7 +13241,7 @@
       </p:sp>
       <p:pic>
         <p:nvPicPr>
-          <p:cNvPr id="46" name="그림 90" descr="C:/Users/Admin1/AppData/Roaming/PolarisOffice/ETemp/20852_9486176/fImage415714068145.png"/>
+          <p:cNvPr id="46" name="그림 90" descr="C:/Users/Admin1/AppData/Roaming/PolarisOffice/ETemp/25668_19456376/fImage415714068145.png"/>
           <p:cNvPicPr>
             <a:picLocks noChangeAspect="1"/>
           </p:cNvPicPr>
@@ -13513,7 +13262,7 @@
         <p:spPr>
           <a:xfrm rot="0">
             <a:off x="6819900" y="1454785"/>
-            <a:ext cx="4134485" cy="3646170"/>
+            <a:ext cx="4135120" cy="3688080"/>
           </a:xfrm>
           <a:prstGeom prst="roundRect"/>
           <a:solidFill>
@@ -14045,8 +13794,8 @@
         </p:nvSpPr>
         <p:spPr>
           <a:xfrm rot="0">
-            <a:off x="1247140" y="4639945"/>
-            <a:ext cx="4089400" cy="1508125"/>
+            <a:off x="1229995" y="4717415"/>
+            <a:ext cx="4090035" cy="1508760"/>
           </a:xfrm>
           <a:prstGeom prst="rect"/>
           <a:noFill/>
@@ -14093,35 +13842,52 @@
                 <a:latin typeface="맑은 고딕" charset="0"/>
                 <a:ea typeface="맑은 고딕" charset="0"/>
               </a:rPr>
-              <a:t>. </a:t>
+              <a:t>.</a:t>
+            </a:r>
+            <a:r>
+              <a:rPr sz="2000" b="1">
+                <a:solidFill>
+                  <a:srgbClr val="0611F2"/>
+                </a:solidFill>
+                <a:latin typeface="맑은 고딕" charset="0"/>
+                <a:ea typeface="맑은 고딕" charset="0"/>
+              </a:rPr>
+              <a:t> </a:t>
             </a:r>
             <a:r>
               <a:rPr sz="1800">
                 <a:latin typeface="맑은 고딕" charset="0"/>
                 <a:ea typeface="맑은 고딕" charset="0"/>
               </a:rPr>
-              <a:t>그다음</a:t>
+              <a:t>그다음으</a:t>
+            </a:r>
+            <a:r>
+              <a:rPr lang="ko-KR" sz="1800">
+                <a:latin typeface="맑은 고딕" charset="0"/>
+                <a:ea typeface="맑은 고딕" charset="0"/>
+              </a:rPr>
+              <a:t>로</a:t>
             </a:r>
             <a:r>
               <a:rPr sz="1800">
                 <a:latin typeface="맑은 고딕" charset="0"/>
                 <a:ea typeface="맑은 고딕" charset="0"/>
               </a:rPr>
-              <a:t>으</a:t>
-            </a:r>
-            <a:r>
-              <a:rPr lang="ko-KR" sz="1800">
-                <a:latin typeface="맑은 고딕" charset="0"/>
-                <a:ea typeface="맑은 고딕" charset="0"/>
-              </a:rPr>
-              <a:t>로</a:t>
+              <a:t> Format은 FBX for </a:t>
             </a:r>
             <a:r>
               <a:rPr sz="1800">
                 <a:latin typeface="맑은 고딕" charset="0"/>
                 <a:ea typeface="맑은 고딕" charset="0"/>
               </a:rPr>
-              <a:t> Format은 FBX for Unity(.fbx)로 설정합니다.</a:t>
+              <a:t>Unity(.fbx)로</a:t>
+            </a:r>
+            <a:r>
+              <a:rPr sz="1800">
+                <a:latin typeface="맑은 고딕" charset="0"/>
+                <a:ea typeface="맑은 고딕" charset="0"/>
+              </a:rPr>
+              <a:t> 설정합니다.</a:t>
             </a:r>
             <a:endParaRPr lang="ko-KR" altLang="en-US" sz="1800">
               <a:latin typeface="맑은 고딕" charset="0"/>
@@ -14148,14 +13914,35 @@
                 <a:latin typeface="맑은 고딕" charset="0"/>
                 <a:ea typeface="맑은 고딕" charset="0"/>
               </a:rPr>
-              <a:t>그러고 나서</a:t>
+              <a:t>그러고</a:t>
+            </a:r>
+            <a:r>
+              <a:rPr lang="ko-KR" sz="1800">
+                <a:latin typeface="맑은 고딕" charset="0"/>
+                <a:ea typeface="맑은 고딕" charset="0"/>
+              </a:rPr>
+              <a:t> 나서</a:t>
             </a:r>
             <a:r>
               <a:rPr sz="1800">
                 <a:latin typeface="맑은 고딕" charset="0"/>
                 <a:ea typeface="맑은 고딕" charset="0"/>
               </a:rPr>
-              <a:t> Skin은 Whitout Skin으로 설정한 다음 Download합니다.</a:t>
+              <a:t> Skin은 Whitout Skin으로 </a:t>
+            </a:r>
+            <a:r>
+              <a:rPr sz="1800">
+                <a:latin typeface="맑은 고딕" charset="0"/>
+                <a:ea typeface="맑은 고딕" charset="0"/>
+              </a:rPr>
+              <a:t>설정한</a:t>
+            </a:r>
+            <a:r>
+              <a:rPr sz="1800">
+                <a:latin typeface="맑은 고딕" charset="0"/>
+                <a:ea typeface="맑은 고딕" charset="0"/>
+              </a:rPr>
+              <a:t> 다음 Download합니다.</a:t>
             </a:r>
             <a:endParaRPr lang="ko-KR" altLang="en-US" sz="1800">
               <a:latin typeface="맑은 고딕" charset="0"/>
@@ -14166,7 +13953,7 @@
       </p:sp>
       <p:pic>
         <p:nvPicPr>
-          <p:cNvPr id="55" name="그림 72" descr="C:/Users/Admin1/AppData/Roaming/PolarisOffice/ETemp/20852_9486176/fImage113473822995.png"/>
+          <p:cNvPr id="55" name="그림 72" descr="C:/Users/Admin1/AppData/Roaming/PolarisOffice/ETemp/25668_19456376/fImage113473822995.png"/>
           <p:cNvPicPr>
             <a:picLocks noChangeAspect="1"/>
           </p:cNvPicPr>
@@ -14187,15 +13974,17 @@
         <p:spPr>
           <a:xfrm rot="0">
             <a:off x="1237615" y="1457325"/>
-            <a:ext cx="4099560" cy="3020060"/>
-          </a:xfrm>
-          <a:prstGeom prst="rect"/>
-          <a:noFill/>
+            <a:ext cx="4100195" cy="3082925"/>
+          </a:xfrm>
+          <a:prstGeom prst="roundRect"/>
+          <a:solidFill>
+            <a:srgbClr val="EDEDED"/>
+          </a:solidFill>
         </p:spPr>
       </p:pic>
       <p:pic>
         <p:nvPicPr>
-          <p:cNvPr id="56" name="그림 77" descr="C:/Users/Admin1/AppData/Roaming/PolarisOffice/ETemp/20852_9486176/fImage63353871942.png"/>
+          <p:cNvPr id="56" name="그림 77"/>
           <p:cNvPicPr>
             <a:picLocks noChangeAspect="1"/>
           </p:cNvPicPr>
@@ -14226,7 +14015,7 @@
       </p:pic>
       <p:pic>
         <p:nvPicPr>
-          <p:cNvPr id="57" name="그림 81" descr="C:/Users/Admin1/AppData/Roaming/PolarisOffice/ETemp/20852_9486176/fImage42543894827.png"/>
+          <p:cNvPr id="57" name="그림 81"/>
           <p:cNvPicPr>
             <a:picLocks noChangeAspect="1"/>
           </p:cNvPicPr>
@@ -14257,7 +14046,7 @@
       </p:pic>
       <p:pic>
         <p:nvPicPr>
-          <p:cNvPr id="58" name="그림 85" descr="C:/Users/Admin1/AppData/Roaming/PolarisOffice/ETemp/20852_9486176/fImage2242173905436.png"/>
+          <p:cNvPr id="58" name="그림 85"/>
           <p:cNvPicPr>
             <a:picLocks noChangeAspect="1"/>
           </p:cNvPicPr>
@@ -14358,8 +14147,8 @@
         </p:nvSpPr>
         <p:spPr>
           <a:xfrm rot="0">
-            <a:off x="6838950" y="5466080"/>
-            <a:ext cx="4133850" cy="677545"/>
+            <a:off x="6821805" y="5552440"/>
+            <a:ext cx="4134485" cy="678180"/>
           </a:xfrm>
           <a:prstGeom prst="rect"/>
           <a:noFill/>
@@ -14396,7 +14185,17 @@
                 <a:latin typeface="맑은 고딕" charset="0"/>
                 <a:ea typeface="맑은 고딕" charset="0"/>
               </a:rPr>
-              <a:t>. </a:t>
+              <a:t>.</a:t>
+            </a:r>
+            <a:r>
+              <a:rPr sz="2000" b="1">
+                <a:solidFill>
+                  <a:srgbClr val="0611F2"/>
+                </a:solidFill>
+                <a:latin typeface="맑은 고딕" charset="0"/>
+                <a:ea typeface="맑은 고딕" charset="0"/>
+              </a:rPr>
+              <a:t> </a:t>
             </a:r>
             <a:r>
               <a:rPr lang="ko-KR" sz="1800">
@@ -14417,7 +14216,21 @@
                 <a:latin typeface="맑은 고딕" charset="0"/>
                 <a:ea typeface="맑은 고딕" charset="0"/>
               </a:rPr>
-              <a:t>h14_nonPBR 오브젝트의 위치 값을 설정합니다.</a:t>
+              <a:t>h14_nonPBR </a:t>
+            </a:r>
+            <a:r>
+              <a:rPr lang="ko-KR" sz="1800">
+                <a:latin typeface="맑은 고딕" charset="0"/>
+                <a:ea typeface="맑은 고딕" charset="0"/>
+              </a:rPr>
+              <a:t>오브젝트의</a:t>
+            </a:r>
+            <a:r>
+              <a:rPr lang="ko-KR" sz="1800">
+                <a:latin typeface="맑은 고딕" charset="0"/>
+                <a:ea typeface="맑은 고딕" charset="0"/>
+              </a:rPr>
+              <a:t> 위치 값을 설정합니다.</a:t>
             </a:r>
             <a:endParaRPr lang="ko-KR" altLang="en-US" sz="1800">
               <a:latin typeface="맑은 고딕" charset="0"/>
@@ -14428,7 +14241,7 @@
       </p:sp>
       <p:pic>
         <p:nvPicPr>
-          <p:cNvPr id="61" name="그림 1" descr="C:/Users/Admin1/AppData/Roaming/PolarisOffice/ETemp/20852_9486176/fImage159682941942.png"/>
+          <p:cNvPr id="61" name="그림 1" descr="C:/Users/Admin1/AppData/Roaming/PolarisOffice/ETemp/25668_19456376/fImage159682941942.png"/>
           <p:cNvPicPr>
             <a:picLocks noChangeAspect="1"/>
           </p:cNvPicPr>
@@ -14449,7 +14262,7 @@
         <p:spPr>
           <a:xfrm rot="0">
             <a:off x="6832600" y="3770630"/>
-            <a:ext cx="4130675" cy="1573530"/>
+            <a:ext cx="4131310" cy="1656715"/>
           </a:xfrm>
           <a:prstGeom prst="roundRect"/>
           <a:solidFill>

</xml_diff>